<commit_message>
PPTs Aulas 2 e 7 Python
</commit_message>
<xml_diff>
--- a/01 Classes/Aula 07 Programação Python - Tipos de Dados Aglomerados.pptx
+++ b/01 Classes/Aula 07 Programação Python - Tipos de Dados Aglomerados.pptx
@@ -5,7 +5,7 @@
     <p:sldMasterId id="2147483671" r:id="rId1"/>
   </p:sldMasterIdLst>
   <p:notesMasterIdLst>
-    <p:notesMasterId r:id="rId25"/>
+    <p:notesMasterId r:id="rId26"/>
   </p:notesMasterIdLst>
   <p:sldIdLst>
     <p:sldId id="256" r:id="rId2"/>
@@ -26,11 +26,12 @@
     <p:sldId id="345" r:id="rId17"/>
     <p:sldId id="346" r:id="rId18"/>
     <p:sldId id="347" r:id="rId19"/>
-    <p:sldId id="323" r:id="rId20"/>
-    <p:sldId id="333" r:id="rId21"/>
-    <p:sldId id="334" r:id="rId22"/>
-    <p:sldId id="337" r:id="rId23"/>
-    <p:sldId id="309" r:id="rId24"/>
+    <p:sldId id="353" r:id="rId20"/>
+    <p:sldId id="323" r:id="rId21"/>
+    <p:sldId id="333" r:id="rId22"/>
+    <p:sldId id="334" r:id="rId23"/>
+    <p:sldId id="337" r:id="rId24"/>
+    <p:sldId id="309" r:id="rId25"/>
   </p:sldIdLst>
   <p:sldSz cx="9144000" cy="5143500" type="screen16x9"/>
   <p:notesSz cx="6858000" cy="9144000"/>
@@ -907,7 +908,7 @@
     </p:spTree>
     <p:extLst>
       <p:ext uri="{BB962C8B-B14F-4D97-AF65-F5344CB8AC3E}">
-        <p14:creationId xmlns:p14="http://schemas.microsoft.com/office/powerpoint/2010/main" val="2709569597"/>
+        <p14:creationId xmlns:p14="http://schemas.microsoft.com/office/powerpoint/2010/main" val="3398795520"/>
       </p:ext>
     </p:extLst>
   </p:cSld>
@@ -973,7 +974,7 @@
     </p:spTree>
     <p:extLst>
       <p:ext uri="{BB962C8B-B14F-4D97-AF65-F5344CB8AC3E}">
-        <p14:creationId xmlns:p14="http://schemas.microsoft.com/office/powerpoint/2010/main" val="585304384"/>
+        <p14:creationId xmlns:p14="http://schemas.microsoft.com/office/powerpoint/2010/main" val="2709569597"/>
       </p:ext>
     </p:extLst>
   </p:cSld>
@@ -1039,7 +1040,7 @@
     </p:spTree>
     <p:extLst>
       <p:ext uri="{BB962C8B-B14F-4D97-AF65-F5344CB8AC3E}">
-        <p14:creationId xmlns:p14="http://schemas.microsoft.com/office/powerpoint/2010/main" val="2296249050"/>
+        <p14:creationId xmlns:p14="http://schemas.microsoft.com/office/powerpoint/2010/main" val="585304384"/>
       </p:ext>
     </p:extLst>
   </p:cSld>
@@ -1171,6 +1172,72 @@
     </p:spTree>
     <p:extLst>
       <p:ext uri="{BB962C8B-B14F-4D97-AF65-F5344CB8AC3E}">
+        <p14:creationId xmlns:p14="http://schemas.microsoft.com/office/powerpoint/2010/main" val="2296249050"/>
+      </p:ext>
+    </p:extLst>
+  </p:cSld>
+  <p:clrMapOvr>
+    <a:masterClrMapping/>
+  </p:clrMapOvr>
+</p:notes>
+</file>
+
+<file path=ppt/notesSlides/notesSlide21.xml><?xml version="1.0" encoding="utf-8"?>
+<p:notes xmlns:a="http://schemas.openxmlformats.org/drawingml/2006/main" xmlns:r="http://schemas.openxmlformats.org/officeDocument/2006/relationships" xmlns:p="http://schemas.openxmlformats.org/presentationml/2006/main">
+  <p:cSld>
+    <p:spTree>
+      <p:nvGrpSpPr>
+        <p:cNvPr id="1" name=""/>
+        <p:cNvGrpSpPr/>
+        <p:nvPr/>
+      </p:nvGrpSpPr>
+      <p:grpSpPr>
+        <a:xfrm>
+          <a:off x="0" y="0"/>
+          <a:ext cx="0" cy="0"/>
+          <a:chOff x="0" y="0"/>
+          <a:chExt cx="0" cy="0"/>
+        </a:xfrm>
+      </p:grpSpPr>
+      <p:sp>
+        <p:nvSpPr>
+          <p:cNvPr id="2" name="Espaço Reservado para Imagem de Slide 1"/>
+          <p:cNvSpPr>
+            <a:spLocks noGrp="1" noRot="1" noChangeAspect="1"/>
+          </p:cNvSpPr>
+          <p:nvPr>
+            <p:ph type="sldImg"/>
+          </p:nvPr>
+        </p:nvSpPr>
+        <p:spPr>
+          <a:xfrm>
+            <a:off x="381000" y="685800"/>
+            <a:ext cx="6096000" cy="3429000"/>
+          </a:xfrm>
+        </p:spPr>
+      </p:sp>
+      <p:sp>
+        <p:nvSpPr>
+          <p:cNvPr id="3" name="Espaço Reservado para Anotações 2"/>
+          <p:cNvSpPr>
+            <a:spLocks noGrp="1"/>
+          </p:cNvSpPr>
+          <p:nvPr>
+            <p:ph type="body" idx="1"/>
+          </p:nvPr>
+        </p:nvSpPr>
+        <p:spPr/>
+        <p:txBody>
+          <a:bodyPr/>
+          <a:lstStyle/>
+          <a:p>
+            <a:endParaRPr lang="pt-BR" dirty="0"/>
+          </a:p>
+        </p:txBody>
+      </p:sp>
+    </p:spTree>
+    <p:extLst>
+      <p:ext uri="{BB962C8B-B14F-4D97-AF65-F5344CB8AC3E}">
         <p14:creationId xmlns:p14="http://schemas.microsoft.com/office/powerpoint/2010/main" val="4290351292"/>
       </p:ext>
     </p:extLst>
@@ -1782,7 +1849,7 @@
           <a:p>
             <a:fld id="{48A87A34-81AB-432B-8DAE-1953F412C126}" type="datetimeFigureOut">
               <a:rPr lang="en-US" smtClean="0"/>
-              <a:t>4/22/2022</a:t>
+              <a:t>8/23/2022</a:t>
             </a:fld>
             <a:endParaRPr lang="en-US" dirty="0"/>
           </a:p>
@@ -1993,7 +2060,7 @@
           <a:p>
             <a:fld id="{48A87A34-81AB-432B-8DAE-1953F412C126}" type="datetimeFigureOut">
               <a:rPr lang="en-US" smtClean="0"/>
-              <a:t>4/22/2022</a:t>
+              <a:t>8/23/2022</a:t>
             </a:fld>
             <a:endParaRPr lang="en-US" dirty="0"/>
           </a:p>
@@ -2208,7 +2275,7 @@
           <a:p>
             <a:fld id="{48A87A34-81AB-432B-8DAE-1953F412C126}" type="datetimeFigureOut">
               <a:rPr lang="en-US" smtClean="0"/>
-              <a:t>4/22/2022</a:t>
+              <a:t>8/23/2022</a:t>
             </a:fld>
             <a:endParaRPr lang="en-US" dirty="0"/>
           </a:p>
@@ -2576,7 +2643,7 @@
           <a:p>
             <a:fld id="{48A87A34-81AB-432B-8DAE-1953F412C126}" type="datetimeFigureOut">
               <a:rPr lang="en-US" smtClean="0"/>
-              <a:t>4/22/2022</a:t>
+              <a:t>8/23/2022</a:t>
             </a:fld>
             <a:endParaRPr lang="en-US" dirty="0"/>
           </a:p>
@@ -2855,7 +2922,7 @@
           <a:p>
             <a:fld id="{48A87A34-81AB-432B-8DAE-1953F412C126}" type="datetimeFigureOut">
               <a:rPr lang="en-US" smtClean="0"/>
-              <a:t>4/22/2022</a:t>
+              <a:t>8/23/2022</a:t>
             </a:fld>
             <a:endParaRPr lang="en-US" dirty="0"/>
           </a:p>
@@ -3123,7 +3190,7 @@
           <a:p>
             <a:fld id="{48A87A34-81AB-432B-8DAE-1953F412C126}" type="datetimeFigureOut">
               <a:rPr lang="en-US" smtClean="0"/>
-              <a:t>4/22/2022</a:t>
+              <a:t>8/23/2022</a:t>
             </a:fld>
             <a:endParaRPr lang="en-US" dirty="0"/>
           </a:p>
@@ -3539,7 +3606,7 @@
           <a:p>
             <a:fld id="{48A87A34-81AB-432B-8DAE-1953F412C126}" type="datetimeFigureOut">
               <a:rPr lang="en-US" smtClean="0"/>
-              <a:t>4/22/2022</a:t>
+              <a:t>8/23/2022</a:t>
             </a:fld>
             <a:endParaRPr lang="en-US" dirty="0"/>
           </a:p>
@@ -3688,7 +3755,7 @@
           <a:p>
             <a:fld id="{48A87A34-81AB-432B-8DAE-1953F412C126}" type="datetimeFigureOut">
               <a:rPr lang="en-US" smtClean="0"/>
-              <a:t>4/22/2022</a:t>
+              <a:t>8/23/2022</a:t>
             </a:fld>
             <a:endParaRPr lang="en-US" dirty="0"/>
           </a:p>
@@ -3814,7 +3881,7 @@
           <a:p>
             <a:fld id="{48A87A34-81AB-432B-8DAE-1953F412C126}" type="datetimeFigureOut">
               <a:rPr lang="en-US" smtClean="0"/>
-              <a:t>4/22/2022</a:t>
+              <a:t>8/23/2022</a:t>
             </a:fld>
             <a:endParaRPr lang="en-US" dirty="0"/>
           </a:p>
@@ -4065,7 +4132,7 @@
           <a:p>
             <a:fld id="{48A87A34-81AB-432B-8DAE-1953F412C126}" type="datetimeFigureOut">
               <a:rPr lang="en-US" smtClean="0"/>
-              <a:t>4/22/2022</a:t>
+              <a:t>8/23/2022</a:t>
             </a:fld>
             <a:endParaRPr lang="en-US" dirty="0"/>
           </a:p>
@@ -4511,7 +4578,7 @@
             <a:fld id="{48A87A34-81AB-432B-8DAE-1953F412C126}" type="datetimeFigureOut">
               <a:rPr lang="en-US" smtClean="0"/>
               <a:pPr/>
-              <a:t>4/22/2022</a:t>
+              <a:t>8/23/2022</a:t>
             </a:fld>
             <a:endParaRPr lang="en-US" dirty="0"/>
           </a:p>
@@ -4839,7 +4906,7 @@
             <a:fld id="{48A87A34-81AB-432B-8DAE-1953F412C126}" type="datetimeFigureOut">
               <a:rPr lang="en-US" smtClean="0"/>
               <a:pPr/>
-              <a:t>4/22/2022</a:t>
+              <a:t>8/23/2022</a:t>
             </a:fld>
             <a:endParaRPr lang="en-US" dirty="0"/>
           </a:p>
@@ -9230,12 +9297,20 @@
           <a:lstStyle/>
           <a:p>
             <a:r>
+              <a:rPr lang="en-US" b="1" dirty="0">
+                <a:solidFill>
+                  <a:srgbClr val="0070C0"/>
+                </a:solidFill>
+              </a:rPr>
+              <a:t>Python – </a:t>
+            </a:r>
+            <a:r>
               <a:rPr lang="en-US" b="1" dirty="0" err="1">
                 <a:solidFill>
                   <a:srgbClr val="0070C0"/>
                 </a:solidFill>
               </a:rPr>
-              <a:t>Leitura</a:t>
+              <a:t>TDados</a:t>
             </a:r>
             <a:r>
               <a:rPr lang="en-US" b="1" dirty="0">
@@ -9251,13 +9326,16 @@
                   <a:srgbClr val="0070C0"/>
                 </a:solidFill>
               </a:rPr>
-              <a:t>Específica</a:t>
-            </a:r>
-            <a:endParaRPr lang="en-US" b="1" dirty="0">
-              <a:solidFill>
-                <a:srgbClr val="0070C0"/>
-              </a:solidFill>
-            </a:endParaRPr>
+              <a:t>Aglomerados</a:t>
+            </a:r>
+            <a:r>
+              <a:rPr lang="en-US" b="1" dirty="0">
+                <a:solidFill>
+                  <a:srgbClr val="0070C0"/>
+                </a:solidFill>
+              </a:rPr>
+              <a:t> SETs</a:t>
+            </a:r>
           </a:p>
         </p:txBody>
       </p:sp>
@@ -9273,8 +9351,8 @@
         </p:nvSpPr>
         <p:spPr>
           <a:xfrm>
-            <a:off x="142865" y="1200151"/>
-            <a:ext cx="8865056" cy="3394472"/>
+            <a:off x="142865" y="1200150"/>
+            <a:ext cx="8865056" cy="3737370"/>
           </a:xfrm>
         </p:spPr>
         <p:txBody>
@@ -9283,10 +9361,66 @@
           </a:bodyPr>
           <a:lstStyle/>
           <a:p>
+            <a:pPr algn="just">
+              <a:buFont typeface="Wingdings" panose="05000000000000000000" pitchFamily="2" charset="2"/>
+              <a:buChar char="§"/>
+            </a:pPr>
+            <a:r>
+              <a:rPr lang="pt-BR" sz="2000" b="1" dirty="0">
+                <a:solidFill>
+                  <a:srgbClr val="FF0000"/>
+                </a:solidFill>
+                <a:latin typeface="Times New Roman" panose="02020603050405020304" pitchFamily="18" charset="0"/>
+                <a:cs typeface="Times New Roman" panose="02020603050405020304" pitchFamily="18" charset="0"/>
+              </a:rPr>
+              <a:t>Conjunto - </a:t>
+            </a:r>
+            <a:r>
+              <a:rPr lang="pt-BR" sz="2000" b="1" dirty="0">
+                <a:latin typeface="Times New Roman" panose="02020603050405020304" pitchFamily="18" charset="0"/>
+                <a:cs typeface="Times New Roman" panose="02020603050405020304" pitchFamily="18" charset="0"/>
+              </a:rPr>
+              <a:t>Sets</a:t>
+            </a:r>
+            <a:r>
+              <a:rPr lang="pt-BR" sz="2000" dirty="0">
+                <a:latin typeface="Times New Roman" panose="02020603050405020304" pitchFamily="18" charset="0"/>
+                <a:cs typeface="Times New Roman" panose="02020603050405020304" pitchFamily="18" charset="0"/>
+              </a:rPr>
+              <a:t> </a:t>
+            </a:r>
+          </a:p>
+          <a:p>
             <a:pPr marL="0" indent="0" algn="just">
               <a:buNone/>
             </a:pPr>
-            <a:endParaRPr lang="pt-BR" dirty="0">
+            <a:r>
+              <a:rPr lang="pt-BR" sz="2000" dirty="0">
+                <a:latin typeface="Times New Roman" panose="02020603050405020304" pitchFamily="18" charset="0"/>
+                <a:cs typeface="Times New Roman" panose="02020603050405020304" pitchFamily="18" charset="0"/>
+              </a:rPr>
+              <a:t>são estruturas disponíveis como </a:t>
+            </a:r>
+            <a:r>
+              <a:rPr lang="pt-BR" sz="2000" i="1" dirty="0" err="1">
+                <a:latin typeface="Times New Roman" panose="02020603050405020304" pitchFamily="18" charset="0"/>
+                <a:cs typeface="Times New Roman" panose="02020603050405020304" pitchFamily="18" charset="0"/>
+              </a:rPr>
+              <a:t>builtins</a:t>
+            </a:r>
+            <a:r>
+              <a:rPr lang="pt-BR" sz="2000" dirty="0">
+                <a:latin typeface="Times New Roman" panose="02020603050405020304" pitchFamily="18" charset="0"/>
+                <a:cs typeface="Times New Roman" panose="02020603050405020304" pitchFamily="18" charset="0"/>
+              </a:rPr>
+              <a:t> do Python, utilizadas para representar coleções desordenadas de elementos únicos.</a:t>
+            </a:r>
+          </a:p>
+          <a:p>
+            <a:pPr marL="0" indent="0" algn="just">
+              <a:buNone/>
+            </a:pPr>
+            <a:endParaRPr lang="pt-BR" sz="2000" dirty="0">
               <a:latin typeface="Times New Roman" panose="02020603050405020304" pitchFamily="18" charset="0"/>
               <a:cs typeface="Times New Roman" panose="02020603050405020304" pitchFamily="18" charset="0"/>
             </a:endParaRPr>
@@ -9296,11 +9430,11 @@
               <a:buNone/>
             </a:pPr>
             <a:r>
-              <a:rPr lang="pt-BR" dirty="0">
-                <a:latin typeface="Times New Roman" panose="02020603050405020304" pitchFamily="18" charset="0"/>
-                <a:cs typeface="Times New Roman" panose="02020603050405020304" pitchFamily="18" charset="0"/>
-              </a:rPr>
-              <a:t>[1] Site:</a:t>
+              <a:rPr lang="pt-BR" sz="2000" dirty="0">
+                <a:latin typeface="Times New Roman" panose="02020603050405020304" pitchFamily="18" charset="0"/>
+                <a:cs typeface="Times New Roman" panose="02020603050405020304" pitchFamily="18" charset="0"/>
+              </a:rPr>
+              <a:t>Os elementos não são armazenados em uma ordem específica e confiável; Conjuntos não contém elementos repetidos.</a:t>
             </a:r>
           </a:p>
           <a:p>
@@ -9308,108 +9442,105 @@
               <a:buNone/>
             </a:pPr>
             <a:r>
-              <a:rPr lang="pt-BR" dirty="0">
-                <a:latin typeface="Times New Roman" panose="02020603050405020304" pitchFamily="18" charset="0"/>
-                <a:cs typeface="Times New Roman" panose="02020603050405020304" pitchFamily="18" charset="0"/>
-              </a:rPr>
-              <a:t> </a:t>
-            </a:r>
-            <a:r>
-              <a:rPr lang="pt-BR" dirty="0">
-                <a:latin typeface="Times New Roman" panose="02020603050405020304" pitchFamily="18" charset="0"/>
-                <a:cs typeface="Times New Roman" panose="02020603050405020304" pitchFamily="18" charset="0"/>
-                <a:hlinkClick r:id="rId3"/>
-              </a:rPr>
-              <a:t>https://www.w3schools.com/python/python_variables.asp</a:t>
-            </a:r>
-            <a:endParaRPr lang="pt-BR" dirty="0">
+              <a:rPr lang="da-DK" sz="2000" dirty="0">
+                <a:latin typeface="Times New Roman" panose="02020603050405020304" pitchFamily="18" charset="0"/>
+                <a:cs typeface="Times New Roman" panose="02020603050405020304" pitchFamily="18" charset="0"/>
+              </a:rPr>
+              <a:t>set([1, 2, 3, 4])</a:t>
+            </a:r>
+            <a:r>
+              <a:rPr lang="pt-BR" sz="2000" dirty="0">
+                <a:latin typeface="Times New Roman" panose="02020603050405020304" pitchFamily="18" charset="0"/>
+                <a:cs typeface="Times New Roman" panose="02020603050405020304" pitchFamily="18" charset="0"/>
+              </a:rPr>
+              <a:t> ou s </a:t>
+            </a:r>
+            <a:r>
+              <a:rPr lang="da-DK" sz="2000" dirty="0">
+                <a:latin typeface="Times New Roman" panose="02020603050405020304" pitchFamily="18" charset="0"/>
+                <a:cs typeface="Times New Roman" panose="02020603050405020304" pitchFamily="18" charset="0"/>
+              </a:rPr>
+              <a:t>= {1, 2, 3, 4}; </a:t>
+            </a:r>
+          </a:p>
+          <a:p>
+            <a:pPr marL="0" indent="0" algn="just">
+              <a:buNone/>
+            </a:pPr>
+            <a:r>
+              <a:rPr lang="da-DK" sz="2000" dirty="0">
+                <a:latin typeface="Times New Roman" panose="02020603050405020304" pitchFamily="18" charset="0"/>
+                <a:cs typeface="Times New Roman" panose="02020603050405020304" pitchFamily="18" charset="0"/>
+              </a:rPr>
+              <a:t>Ex.: </a:t>
+            </a:r>
+            <a:r>
+              <a:rPr lang="pt-BR" sz="2000" dirty="0">
+                <a:latin typeface="Times New Roman" panose="02020603050405020304" pitchFamily="18" charset="0"/>
+                <a:cs typeface="Times New Roman" panose="02020603050405020304" pitchFamily="18" charset="0"/>
+              </a:rPr>
+              <a:t>a </a:t>
+            </a:r>
+            <a:r>
+              <a:rPr lang="da-DK" sz="2000" dirty="0">
+                <a:latin typeface="Times New Roman" panose="02020603050405020304" pitchFamily="18" charset="0"/>
+                <a:cs typeface="Times New Roman" panose="02020603050405020304" pitchFamily="18" charset="0"/>
+              </a:rPr>
+              <a:t>= {1, 2, 3, 4};  e </a:t>
+            </a:r>
+            <a:r>
+              <a:rPr lang="pt-BR" sz="2000" dirty="0">
+                <a:latin typeface="Times New Roman" panose="02020603050405020304" pitchFamily="18" charset="0"/>
+                <a:cs typeface="Times New Roman" panose="02020603050405020304" pitchFamily="18" charset="0"/>
+              </a:rPr>
+              <a:t>b </a:t>
+            </a:r>
+            <a:r>
+              <a:rPr lang="da-DK" sz="2000" dirty="0">
+                <a:latin typeface="Times New Roman" panose="02020603050405020304" pitchFamily="18" charset="0"/>
+                <a:cs typeface="Times New Roman" panose="02020603050405020304" pitchFamily="18" charset="0"/>
+              </a:rPr>
+              <a:t>= {1</a:t>
+            </a:r>
+            <a:r>
+              <a:rPr lang="da-DK" sz="2000">
+                <a:latin typeface="Times New Roman" panose="02020603050405020304" pitchFamily="18" charset="0"/>
+                <a:cs typeface="Times New Roman" panose="02020603050405020304" pitchFamily="18" charset="0"/>
+              </a:rPr>
+              <a:t>, 5, </a:t>
+            </a:r>
+            <a:r>
+              <a:rPr lang="da-DK" sz="2000" dirty="0">
+                <a:latin typeface="Times New Roman" panose="02020603050405020304" pitchFamily="18" charset="0"/>
+                <a:cs typeface="Times New Roman" panose="02020603050405020304" pitchFamily="18" charset="0"/>
+              </a:rPr>
+              <a:t>3</a:t>
+            </a:r>
+            <a:r>
+              <a:rPr lang="da-DK" sz="2000">
+                <a:latin typeface="Times New Roman" panose="02020603050405020304" pitchFamily="18" charset="0"/>
+                <a:cs typeface="Times New Roman" panose="02020603050405020304" pitchFamily="18" charset="0"/>
+              </a:rPr>
+              <a:t>, 7}; </a:t>
+            </a:r>
+            <a:r>
+              <a:rPr lang="da-DK" sz="2000" dirty="0">
+                <a:latin typeface="Times New Roman" panose="02020603050405020304" pitchFamily="18" charset="0"/>
+                <a:cs typeface="Times New Roman" panose="02020603050405020304" pitchFamily="18" charset="0"/>
+              </a:rPr>
+              <a:t>a.union(b); a. intersection(b); a. difference(b)</a:t>
+            </a:r>
+            <a:endParaRPr lang="pt-BR" sz="2000" dirty="0">
               <a:latin typeface="Times New Roman" panose="02020603050405020304" pitchFamily="18" charset="0"/>
               <a:cs typeface="Times New Roman" panose="02020603050405020304" pitchFamily="18" charset="0"/>
             </a:endParaRPr>
           </a:p>
-          <a:p>
-            <a:pPr marL="0" indent="0" algn="just">
-              <a:buNone/>
-            </a:pPr>
-            <a:endParaRPr lang="pt-BR" dirty="0">
-              <a:latin typeface="Times New Roman" panose="02020603050405020304" pitchFamily="18" charset="0"/>
-              <a:cs typeface="Times New Roman" panose="02020603050405020304" pitchFamily="18" charset="0"/>
-            </a:endParaRPr>
-          </a:p>
-          <a:p>
-            <a:pPr marL="0" indent="0" algn="just">
-              <a:buNone/>
-            </a:pPr>
-            <a:r>
-              <a:rPr lang="pt-BR" dirty="0">
-                <a:latin typeface="Times New Roman" panose="02020603050405020304" pitchFamily="18" charset="0"/>
-                <a:cs typeface="Times New Roman" panose="02020603050405020304" pitchFamily="18" charset="0"/>
-              </a:rPr>
-              <a:t>[2] Site: </a:t>
-            </a:r>
-            <a:r>
-              <a:rPr lang="pt-BR" dirty="0">
-                <a:latin typeface="Times New Roman" panose="02020603050405020304" pitchFamily="18" charset="0"/>
-                <a:cs typeface="Times New Roman" panose="02020603050405020304" pitchFamily="18" charset="0"/>
-                <a:hlinkClick r:id="rId4"/>
-              </a:rPr>
-              <a:t>https://docs.python.org/pt-br/3/tutorial/</a:t>
-            </a:r>
-            <a:endParaRPr lang="pt-BR" dirty="0">
-              <a:latin typeface="Times New Roman" panose="02020603050405020304" pitchFamily="18" charset="0"/>
-              <a:cs typeface="Times New Roman" panose="02020603050405020304" pitchFamily="18" charset="0"/>
-            </a:endParaRPr>
-          </a:p>
-          <a:p>
-            <a:pPr marL="0" indent="0" algn="just">
-              <a:buNone/>
-            </a:pPr>
-            <a:endParaRPr lang="pt-BR" dirty="0">
-              <a:latin typeface="Times New Roman" panose="02020603050405020304" pitchFamily="18" charset="0"/>
-              <a:cs typeface="Times New Roman" panose="02020603050405020304" pitchFamily="18" charset="0"/>
-            </a:endParaRPr>
-          </a:p>
-          <a:p>
-            <a:pPr marL="0" indent="0" algn="just">
-              <a:buNone/>
-            </a:pPr>
-            <a:endParaRPr lang="pt-BR" dirty="0">
-              <a:latin typeface="Times New Roman" panose="02020603050405020304" pitchFamily="18" charset="0"/>
-              <a:cs typeface="Times New Roman" panose="02020603050405020304" pitchFamily="18" charset="0"/>
-            </a:endParaRPr>
-          </a:p>
-          <a:p>
-            <a:pPr marL="0" indent="0" algn="just">
-              <a:buNone/>
-            </a:pPr>
-            <a:endParaRPr lang="pt-BR" dirty="0">
-              <a:latin typeface="Times New Roman" panose="02020603050405020304" pitchFamily="18" charset="0"/>
-              <a:cs typeface="Times New Roman" panose="02020603050405020304" pitchFamily="18" charset="0"/>
-            </a:endParaRPr>
-          </a:p>
-          <a:p>
-            <a:pPr marL="0" indent="0" algn="just">
-              <a:buNone/>
-            </a:pPr>
-            <a:endParaRPr lang="pt-BR" dirty="0">
-              <a:latin typeface="Times New Roman" panose="02020603050405020304" pitchFamily="18" charset="0"/>
-              <a:cs typeface="Times New Roman" panose="02020603050405020304" pitchFamily="18" charset="0"/>
-            </a:endParaRPr>
-          </a:p>
-          <a:p>
-            <a:pPr marL="0" indent="0" algn="just">
-              <a:buNone/>
-            </a:pPr>
-            <a:endParaRPr lang="pt-BR" dirty="0">
-              <a:latin typeface="Calibri" panose="020F0502020204030204" pitchFamily="34" charset="0"/>
-            </a:endParaRPr>
-          </a:p>
         </p:txBody>
       </p:sp>
     </p:spTree>
     <p:extLst>
       <p:ext uri="{BB962C8B-B14F-4D97-AF65-F5344CB8AC3E}">
-        <p14:creationId xmlns:p14="http://schemas.microsoft.com/office/powerpoint/2010/main" val="2747596967"/>
+        <p14:creationId xmlns:p14="http://schemas.microsoft.com/office/powerpoint/2010/main" val="1679403773"/>
       </p:ext>
     </p:extLst>
   </p:cSld>
@@ -9583,7 +9714,7 @@
                   <a:schemeClr val="bg1"/>
                 </a:solidFill>
               </a:rPr>
-              <a:t>	Listas, Registros e </a:t>
+              <a:t>	Listas, </a:t>
             </a:r>
             <a:r>
               <a:rPr lang="pt-BR" sz="3200" b="1" dirty="0" err="1">
@@ -9591,7 +9722,23 @@
                   <a:schemeClr val="bg1"/>
                 </a:solidFill>
               </a:rPr>
-              <a:t>Tuplas</a:t>
+              <a:t>Registros,Tuplas</a:t>
+            </a:r>
+            <a:r>
+              <a:rPr lang="pt-BR" sz="3200" b="1" dirty="0">
+                <a:solidFill>
+                  <a:schemeClr val="bg1"/>
+                </a:solidFill>
+              </a:rPr>
+              <a:t> E </a:t>
+            </a:r>
+            <a:r>
+              <a:rPr lang="pt-BR" sz="3200" b="1" dirty="0" err="1">
+                <a:solidFill>
+                  <a:schemeClr val="bg1"/>
+                </a:solidFill>
+              </a:rPr>
+              <a:t>SETs</a:t>
             </a:r>
             <a:endParaRPr lang="pt-BR" sz="3200" b="1" dirty="0">
               <a:solidFill>
@@ -9954,7 +10101,7 @@
                   <a:srgbClr val="0070C0"/>
                 </a:solidFill>
               </a:rPr>
-              <a:t>Aprenda</a:t>
+              <a:t>Leitura</a:t>
             </a:r>
             <a:r>
               <a:rPr lang="en-US" b="1" dirty="0">
@@ -9962,8 +10109,21 @@
                   <a:srgbClr val="0070C0"/>
                 </a:solidFill>
               </a:rPr>
-              <a:t>+</a:t>
-            </a:r>
+              <a:t> </a:t>
+            </a:r>
+            <a:r>
+              <a:rPr lang="en-US" b="1" dirty="0" err="1">
+                <a:solidFill>
+                  <a:srgbClr val="0070C0"/>
+                </a:solidFill>
+              </a:rPr>
+              <a:t>Específica</a:t>
+            </a:r>
+            <a:endParaRPr lang="en-US" b="1" dirty="0">
+              <a:solidFill>
+                <a:srgbClr val="0070C0"/>
+              </a:solidFill>
+            </a:endParaRPr>
           </a:p>
         </p:txBody>
       </p:sp>
@@ -9992,7 +10152,7 @@
             <a:pPr marL="0" indent="0" algn="just">
               <a:buNone/>
             </a:pPr>
-            <a:endParaRPr lang="pt-BR" sz="2000" dirty="0">
+            <a:endParaRPr lang="pt-BR" dirty="0">
               <a:latin typeface="Times New Roman" panose="02020603050405020304" pitchFamily="18" charset="0"/>
               <a:cs typeface="Times New Roman" panose="02020603050405020304" pitchFamily="18" charset="0"/>
             </a:endParaRPr>
@@ -10002,21 +10162,33 @@
               <a:buNone/>
             </a:pPr>
             <a:r>
-              <a:rPr lang="pt-BR" sz="2000" dirty="0">
-                <a:latin typeface="Times New Roman" panose="02020603050405020304" pitchFamily="18" charset="0"/>
-                <a:cs typeface="Times New Roman" panose="02020603050405020304" pitchFamily="18" charset="0"/>
-              </a:rPr>
-              <a:t>[1] </a:t>
-            </a:r>
-            <a:r>
-              <a:rPr lang="pt-BR" sz="2000" dirty="0">
+              <a:rPr lang="pt-BR" dirty="0">
+                <a:latin typeface="Times New Roman" panose="02020603050405020304" pitchFamily="18" charset="0"/>
+                <a:cs typeface="Times New Roman" panose="02020603050405020304" pitchFamily="18" charset="0"/>
+              </a:rPr>
+              <a:t>[1] Site:</a:t>
+            </a:r>
+          </a:p>
+          <a:p>
+            <a:pPr marL="0" indent="0" algn="just">
+              <a:buNone/>
+            </a:pPr>
+            <a:r>
+              <a:rPr lang="pt-BR" dirty="0">
+                <a:latin typeface="Times New Roman" panose="02020603050405020304" pitchFamily="18" charset="0"/>
+                <a:cs typeface="Times New Roman" panose="02020603050405020304" pitchFamily="18" charset="0"/>
+              </a:rPr>
+              <a:t> </a:t>
+            </a:r>
+            <a:r>
+              <a:rPr lang="pt-BR" dirty="0">
                 <a:latin typeface="Times New Roman" panose="02020603050405020304" pitchFamily="18" charset="0"/>
                 <a:cs typeface="Times New Roman" panose="02020603050405020304" pitchFamily="18" charset="0"/>
                 <a:hlinkClick r:id="rId3"/>
               </a:rPr>
-              <a:t>https://www.programiz.com/python-programming/variables-constants-literals</a:t>
-            </a:r>
-            <a:endParaRPr lang="pt-BR" sz="2000" dirty="0">
+              <a:t>https://www.w3schools.com/python/python_variables.asp</a:t>
+            </a:r>
+            <a:endParaRPr lang="pt-BR" dirty="0">
               <a:latin typeface="Times New Roman" panose="02020603050405020304" pitchFamily="18" charset="0"/>
               <a:cs typeface="Times New Roman" panose="02020603050405020304" pitchFamily="18" charset="0"/>
             </a:endParaRPr>
@@ -10025,7 +10197,7 @@
             <a:pPr marL="0" indent="0" algn="just">
               <a:buNone/>
             </a:pPr>
-            <a:endParaRPr lang="pt-BR" sz="2000" dirty="0">
+            <a:endParaRPr lang="pt-BR" dirty="0">
               <a:latin typeface="Times New Roman" panose="02020603050405020304" pitchFamily="18" charset="0"/>
               <a:cs typeface="Times New Roman" panose="02020603050405020304" pitchFamily="18" charset="0"/>
             </a:endParaRPr>
@@ -10035,21 +10207,21 @@
               <a:buNone/>
             </a:pPr>
             <a:r>
-              <a:rPr lang="pt-BR" sz="2000" dirty="0">
-                <a:latin typeface="Times New Roman" panose="02020603050405020304" pitchFamily="18" charset="0"/>
-                <a:cs typeface="Times New Roman" panose="02020603050405020304" pitchFamily="18" charset="0"/>
-              </a:rPr>
-              <a:t>[2] </a:t>
-            </a:r>
-            <a:r>
-              <a:rPr lang="pt-BR" sz="2000" dirty="0">
+              <a:rPr lang="pt-BR" dirty="0">
+                <a:latin typeface="Times New Roman" panose="02020603050405020304" pitchFamily="18" charset="0"/>
+                <a:cs typeface="Times New Roman" panose="02020603050405020304" pitchFamily="18" charset="0"/>
+              </a:rPr>
+              <a:t>[2] Site: </a:t>
+            </a:r>
+            <a:r>
+              <a:rPr lang="pt-BR" dirty="0">
                 <a:latin typeface="Times New Roman" panose="02020603050405020304" pitchFamily="18" charset="0"/>
                 <a:cs typeface="Times New Roman" panose="02020603050405020304" pitchFamily="18" charset="0"/>
                 <a:hlinkClick r:id="rId4"/>
               </a:rPr>
-              <a:t>https://www.programiz.com/python-programming/examples/swap-variables</a:t>
-            </a:r>
-            <a:endParaRPr lang="pt-BR" sz="2000" dirty="0">
+              <a:t>https://docs.python.org/pt-br/3/tutorial/</a:t>
+            </a:r>
+            <a:endParaRPr lang="pt-BR" dirty="0">
               <a:latin typeface="Times New Roman" panose="02020603050405020304" pitchFamily="18" charset="0"/>
               <a:cs typeface="Times New Roman" panose="02020603050405020304" pitchFamily="18" charset="0"/>
             </a:endParaRPr>
@@ -10058,7 +10230,7 @@
             <a:pPr marL="0" indent="0" algn="just">
               <a:buNone/>
             </a:pPr>
-            <a:endParaRPr lang="pt-BR" sz="2000" dirty="0">
+            <a:endParaRPr lang="pt-BR" dirty="0">
               <a:latin typeface="Times New Roman" panose="02020603050405020304" pitchFamily="18" charset="0"/>
               <a:cs typeface="Times New Roman" panose="02020603050405020304" pitchFamily="18" charset="0"/>
             </a:endParaRPr>
@@ -10067,48 +10239,7 @@
             <a:pPr marL="0" indent="0" algn="just">
               <a:buNone/>
             </a:pPr>
-            <a:r>
-              <a:rPr lang="pt-BR" sz="2000" dirty="0">
-                <a:latin typeface="Times New Roman" panose="02020603050405020304" pitchFamily="18" charset="0"/>
-                <a:cs typeface="Times New Roman" panose="02020603050405020304" pitchFamily="18" charset="0"/>
-              </a:rPr>
-              <a:t>- </a:t>
-            </a:r>
-            <a:r>
-              <a:rPr lang="pt-BR" sz="2000" dirty="0" err="1">
-                <a:latin typeface="Times New Roman" panose="02020603050405020304" pitchFamily="18" charset="0"/>
-                <a:cs typeface="Times New Roman" panose="02020603050405020304" pitchFamily="18" charset="0"/>
-              </a:rPr>
-              <a:t>Tuplas</a:t>
-            </a:r>
-            <a:r>
-              <a:rPr lang="pt-BR" sz="2000" dirty="0">
-                <a:latin typeface="Times New Roman" panose="02020603050405020304" pitchFamily="18" charset="0"/>
-                <a:cs typeface="Times New Roman" panose="02020603050405020304" pitchFamily="18" charset="0"/>
-              </a:rPr>
-              <a:t> Nomeadas</a:t>
-            </a:r>
-          </a:p>
-          <a:p>
-            <a:pPr marL="0" indent="0" algn="just">
-              <a:buNone/>
-            </a:pPr>
-            <a:r>
-              <a:rPr lang="pt-BR" sz="2000" dirty="0">
-                <a:latin typeface="Times New Roman" panose="02020603050405020304" pitchFamily="18" charset="0"/>
-                <a:cs typeface="Times New Roman" panose="02020603050405020304" pitchFamily="18" charset="0"/>
-              </a:rPr>
-              <a:t>[3] </a:t>
-            </a:r>
-            <a:r>
-              <a:rPr lang="pt-BR" sz="2000" dirty="0">
-                <a:latin typeface="Times New Roman" panose="02020603050405020304" pitchFamily="18" charset="0"/>
-                <a:cs typeface="Times New Roman" panose="02020603050405020304" pitchFamily="18" charset="0"/>
-                <a:hlinkClick r:id="rId5"/>
-              </a:rPr>
-              <a:t>https://www.youtube.com/watch?v=IkoaXbLsUg8</a:t>
-            </a:r>
-            <a:endParaRPr lang="pt-BR" sz="2000" dirty="0">
+            <a:endParaRPr lang="pt-BR" dirty="0">
               <a:latin typeface="Times New Roman" panose="02020603050405020304" pitchFamily="18" charset="0"/>
               <a:cs typeface="Times New Roman" panose="02020603050405020304" pitchFamily="18" charset="0"/>
             </a:endParaRPr>
@@ -10117,7 +10248,7 @@
             <a:pPr marL="0" indent="0" algn="just">
               <a:buNone/>
             </a:pPr>
-            <a:endParaRPr lang="pt-BR" sz="2000" dirty="0">
+            <a:endParaRPr lang="pt-BR" dirty="0">
               <a:latin typeface="Times New Roman" panose="02020603050405020304" pitchFamily="18" charset="0"/>
               <a:cs typeface="Times New Roman" panose="02020603050405020304" pitchFamily="18" charset="0"/>
             </a:endParaRPr>
@@ -10126,7 +10257,7 @@
             <a:pPr marL="0" indent="0" algn="just">
               <a:buNone/>
             </a:pPr>
-            <a:endParaRPr lang="pt-BR" sz="2000" dirty="0">
+            <a:endParaRPr lang="pt-BR" dirty="0">
               <a:latin typeface="Times New Roman" panose="02020603050405020304" pitchFamily="18" charset="0"/>
               <a:cs typeface="Times New Roman" panose="02020603050405020304" pitchFamily="18" charset="0"/>
             </a:endParaRPr>
@@ -10135,7 +10266,7 @@
             <a:pPr marL="0" indent="0" algn="just">
               <a:buNone/>
             </a:pPr>
-            <a:endParaRPr lang="pt-BR" sz="2000" dirty="0">
+            <a:endParaRPr lang="pt-BR" dirty="0">
               <a:latin typeface="Calibri" panose="020F0502020204030204" pitchFamily="34" charset="0"/>
             </a:endParaRPr>
           </a:p>
@@ -10144,7 +10275,7 @@
     </p:spTree>
     <p:extLst>
       <p:ext uri="{BB962C8B-B14F-4D97-AF65-F5344CB8AC3E}">
-        <p14:creationId xmlns:p14="http://schemas.microsoft.com/office/powerpoint/2010/main" val="3680270425"/>
+        <p14:creationId xmlns:p14="http://schemas.microsoft.com/office/powerpoint/2010/main" val="2747596967"/>
       </p:ext>
     </p:extLst>
   </p:cSld>
@@ -10195,7 +10326,7 @@
                   <a:srgbClr val="0070C0"/>
                 </a:solidFill>
               </a:rPr>
-              <a:t>Dinâmica</a:t>
+              <a:t>Aprenda</a:t>
             </a:r>
             <a:r>
               <a:rPr lang="en-US" b="1" dirty="0">
@@ -10203,21 +10334,8 @@
                   <a:srgbClr val="0070C0"/>
                 </a:solidFill>
               </a:rPr>
-              <a:t>/</a:t>
-            </a:r>
-            <a:r>
-              <a:rPr lang="en-US" b="1" dirty="0" err="1">
-                <a:solidFill>
-                  <a:srgbClr val="0070C0"/>
-                </a:solidFill>
-              </a:rPr>
-              <a:t>Atividades</a:t>
-            </a:r>
-            <a:endParaRPr lang="en-US" b="1" dirty="0">
-              <a:solidFill>
-                <a:srgbClr val="0070C0"/>
-              </a:solidFill>
-            </a:endParaRPr>
+              <a:t>+</a:t>
+            </a:r>
           </a:p>
         </p:txBody>
       </p:sp>
@@ -10233,8 +10351,8 @@
         </p:nvSpPr>
         <p:spPr>
           <a:xfrm>
-            <a:off x="139472" y="1063230"/>
-            <a:ext cx="8865056" cy="3606305"/>
+            <a:off x="142865" y="1200151"/>
+            <a:ext cx="8865056" cy="3394472"/>
           </a:xfrm>
         </p:spPr>
         <p:txBody>
@@ -10243,36 +10361,162 @@
           </a:bodyPr>
           <a:lstStyle/>
           <a:p>
-            <a:pPr algn="just">
-              <a:buFontTx/>
-              <a:buChar char="-"/>
+            <a:pPr marL="0" indent="0" algn="just">
+              <a:buNone/>
             </a:pPr>
-            <a:r>
-              <a:rPr lang="pt-BR" dirty="0">
-                <a:latin typeface="Times New Roman" panose="02020603050405020304" pitchFamily="18" charset="0"/>
-                <a:cs typeface="Times New Roman" panose="02020603050405020304" pitchFamily="18" charset="0"/>
-              </a:rPr>
-              <a:t>Exercícios de Fixação</a:t>
-            </a:r>
+            <a:endParaRPr lang="pt-BR" sz="2000" dirty="0">
+              <a:latin typeface="Times New Roman" panose="02020603050405020304" pitchFamily="18" charset="0"/>
+              <a:cs typeface="Times New Roman" panose="02020603050405020304" pitchFamily="18" charset="0"/>
+            </a:endParaRPr>
           </a:p>
           <a:p>
             <a:pPr marL="0" indent="0" algn="just">
               <a:buNone/>
             </a:pPr>
             <a:r>
-              <a:rPr lang="pt-BR" dirty="0">
-                <a:latin typeface="Times New Roman" panose="02020603050405020304" pitchFamily="18" charset="0"/>
-                <a:cs typeface="Times New Roman" panose="02020603050405020304" pitchFamily="18" charset="0"/>
-              </a:rPr>
-              <a:t>	Desafios em Sala de Aula.</a:t>
-            </a:r>
+              <a:rPr lang="pt-BR" sz="2000" dirty="0">
+                <a:latin typeface="Times New Roman" panose="02020603050405020304" pitchFamily="18" charset="0"/>
+                <a:cs typeface="Times New Roman" panose="02020603050405020304" pitchFamily="18" charset="0"/>
+              </a:rPr>
+              <a:t>[1] </a:t>
+            </a:r>
+            <a:r>
+              <a:rPr lang="pt-BR" sz="2000" dirty="0">
+                <a:latin typeface="Times New Roman" panose="02020603050405020304" pitchFamily="18" charset="0"/>
+                <a:cs typeface="Times New Roman" panose="02020603050405020304" pitchFamily="18" charset="0"/>
+                <a:hlinkClick r:id="rId3"/>
+              </a:rPr>
+              <a:t>https://www.programiz.com/python-programming/variables-constants-literals</a:t>
+            </a:r>
+            <a:endParaRPr lang="pt-BR" sz="2000" dirty="0">
+              <a:latin typeface="Times New Roman" panose="02020603050405020304" pitchFamily="18" charset="0"/>
+              <a:cs typeface="Times New Roman" panose="02020603050405020304" pitchFamily="18" charset="0"/>
+            </a:endParaRPr>
+          </a:p>
+          <a:p>
+            <a:pPr marL="0" indent="0" algn="just">
+              <a:buNone/>
+            </a:pPr>
+            <a:endParaRPr lang="pt-BR" sz="2000" dirty="0">
+              <a:latin typeface="Times New Roman" panose="02020603050405020304" pitchFamily="18" charset="0"/>
+              <a:cs typeface="Times New Roman" panose="02020603050405020304" pitchFamily="18" charset="0"/>
+            </a:endParaRPr>
+          </a:p>
+          <a:p>
+            <a:pPr marL="0" indent="0" algn="just">
+              <a:buNone/>
+            </a:pPr>
+            <a:r>
+              <a:rPr lang="pt-BR" sz="2000" dirty="0">
+                <a:latin typeface="Times New Roman" panose="02020603050405020304" pitchFamily="18" charset="0"/>
+                <a:cs typeface="Times New Roman" panose="02020603050405020304" pitchFamily="18" charset="0"/>
+              </a:rPr>
+              <a:t>[2] </a:t>
+            </a:r>
+            <a:r>
+              <a:rPr lang="pt-BR" sz="2000" dirty="0">
+                <a:latin typeface="Times New Roman" panose="02020603050405020304" pitchFamily="18" charset="0"/>
+                <a:cs typeface="Times New Roman" panose="02020603050405020304" pitchFamily="18" charset="0"/>
+                <a:hlinkClick r:id="rId4"/>
+              </a:rPr>
+              <a:t>https://www.programiz.com/python-programming/examples/swap-variables</a:t>
+            </a:r>
+            <a:endParaRPr lang="pt-BR" sz="2000" dirty="0">
+              <a:latin typeface="Times New Roman" panose="02020603050405020304" pitchFamily="18" charset="0"/>
+              <a:cs typeface="Times New Roman" panose="02020603050405020304" pitchFamily="18" charset="0"/>
+            </a:endParaRPr>
+          </a:p>
+          <a:p>
+            <a:pPr marL="0" indent="0" algn="just">
+              <a:buNone/>
+            </a:pPr>
+            <a:endParaRPr lang="pt-BR" sz="2000" dirty="0">
+              <a:latin typeface="Times New Roman" panose="02020603050405020304" pitchFamily="18" charset="0"/>
+              <a:cs typeface="Times New Roman" panose="02020603050405020304" pitchFamily="18" charset="0"/>
+            </a:endParaRPr>
+          </a:p>
+          <a:p>
+            <a:pPr marL="0" indent="0" algn="just">
+              <a:buNone/>
+            </a:pPr>
+            <a:r>
+              <a:rPr lang="pt-BR" sz="2000" dirty="0">
+                <a:latin typeface="Times New Roman" panose="02020603050405020304" pitchFamily="18" charset="0"/>
+                <a:cs typeface="Times New Roman" panose="02020603050405020304" pitchFamily="18" charset="0"/>
+              </a:rPr>
+              <a:t>- </a:t>
+            </a:r>
+            <a:r>
+              <a:rPr lang="pt-BR" sz="2000" dirty="0" err="1">
+                <a:latin typeface="Times New Roman" panose="02020603050405020304" pitchFamily="18" charset="0"/>
+                <a:cs typeface="Times New Roman" panose="02020603050405020304" pitchFamily="18" charset="0"/>
+              </a:rPr>
+              <a:t>Tuplas</a:t>
+            </a:r>
+            <a:r>
+              <a:rPr lang="pt-BR" sz="2000" dirty="0">
+                <a:latin typeface="Times New Roman" panose="02020603050405020304" pitchFamily="18" charset="0"/>
+                <a:cs typeface="Times New Roman" panose="02020603050405020304" pitchFamily="18" charset="0"/>
+              </a:rPr>
+              <a:t> Nomeadas</a:t>
+            </a:r>
+          </a:p>
+          <a:p>
+            <a:pPr marL="0" indent="0" algn="just">
+              <a:buNone/>
+            </a:pPr>
+            <a:r>
+              <a:rPr lang="pt-BR" sz="2000" dirty="0">
+                <a:latin typeface="Times New Roman" panose="02020603050405020304" pitchFamily="18" charset="0"/>
+                <a:cs typeface="Times New Roman" panose="02020603050405020304" pitchFamily="18" charset="0"/>
+              </a:rPr>
+              <a:t>[3] </a:t>
+            </a:r>
+            <a:r>
+              <a:rPr lang="pt-BR" sz="2000" dirty="0">
+                <a:latin typeface="Times New Roman" panose="02020603050405020304" pitchFamily="18" charset="0"/>
+                <a:cs typeface="Times New Roman" panose="02020603050405020304" pitchFamily="18" charset="0"/>
+                <a:hlinkClick r:id="rId5"/>
+              </a:rPr>
+              <a:t>https://www.youtube.com/watch?v=IkoaXbLsUg8</a:t>
+            </a:r>
+            <a:endParaRPr lang="pt-BR" sz="2000" dirty="0">
+              <a:latin typeface="Times New Roman" panose="02020603050405020304" pitchFamily="18" charset="0"/>
+              <a:cs typeface="Times New Roman" panose="02020603050405020304" pitchFamily="18" charset="0"/>
+            </a:endParaRPr>
+          </a:p>
+          <a:p>
+            <a:pPr marL="0" indent="0" algn="just">
+              <a:buNone/>
+            </a:pPr>
+            <a:endParaRPr lang="pt-BR" sz="2000" dirty="0">
+              <a:latin typeface="Times New Roman" panose="02020603050405020304" pitchFamily="18" charset="0"/>
+              <a:cs typeface="Times New Roman" panose="02020603050405020304" pitchFamily="18" charset="0"/>
+            </a:endParaRPr>
+          </a:p>
+          <a:p>
+            <a:pPr marL="0" indent="0" algn="just">
+              <a:buNone/>
+            </a:pPr>
+            <a:endParaRPr lang="pt-BR" sz="2000" dirty="0">
+              <a:latin typeface="Times New Roman" panose="02020603050405020304" pitchFamily="18" charset="0"/>
+              <a:cs typeface="Times New Roman" panose="02020603050405020304" pitchFamily="18" charset="0"/>
+            </a:endParaRPr>
+          </a:p>
+          <a:p>
+            <a:pPr marL="0" indent="0" algn="just">
+              <a:buNone/>
+            </a:pPr>
+            <a:endParaRPr lang="pt-BR" sz="2000" dirty="0">
+              <a:latin typeface="Calibri" panose="020F0502020204030204" pitchFamily="34" charset="0"/>
+            </a:endParaRPr>
           </a:p>
         </p:txBody>
       </p:sp>
     </p:spTree>
     <p:extLst>
       <p:ext uri="{BB962C8B-B14F-4D97-AF65-F5344CB8AC3E}">
-        <p14:creationId xmlns:p14="http://schemas.microsoft.com/office/powerpoint/2010/main" val="2470652989"/>
+        <p14:creationId xmlns:p14="http://schemas.microsoft.com/office/powerpoint/2010/main" val="3680270425"/>
       </p:ext>
     </p:extLst>
   </p:cSld>
@@ -10323,6 +10567,134 @@
                   <a:srgbClr val="0070C0"/>
                 </a:solidFill>
               </a:rPr>
+              <a:t>Dinâmica</a:t>
+            </a:r>
+            <a:r>
+              <a:rPr lang="en-US" b="1" dirty="0">
+                <a:solidFill>
+                  <a:srgbClr val="0070C0"/>
+                </a:solidFill>
+              </a:rPr>
+              <a:t>/</a:t>
+            </a:r>
+            <a:r>
+              <a:rPr lang="en-US" b="1" dirty="0" err="1">
+                <a:solidFill>
+                  <a:srgbClr val="0070C0"/>
+                </a:solidFill>
+              </a:rPr>
+              <a:t>Atividades</a:t>
+            </a:r>
+            <a:endParaRPr lang="en-US" b="1" dirty="0">
+              <a:solidFill>
+                <a:srgbClr val="0070C0"/>
+              </a:solidFill>
+            </a:endParaRPr>
+          </a:p>
+        </p:txBody>
+      </p:sp>
+      <p:sp>
+        <p:nvSpPr>
+          <p:cNvPr id="8" name="Text Placeholder 2"/>
+          <p:cNvSpPr>
+            <a:spLocks noGrp="1"/>
+          </p:cNvSpPr>
+          <p:nvPr>
+            <p:ph type="body" sz="half" idx="1"/>
+          </p:nvPr>
+        </p:nvSpPr>
+        <p:spPr>
+          <a:xfrm>
+            <a:off x="139472" y="1063230"/>
+            <a:ext cx="8865056" cy="3606305"/>
+          </a:xfrm>
+        </p:spPr>
+        <p:txBody>
+          <a:bodyPr>
+            <a:noAutofit/>
+          </a:bodyPr>
+          <a:lstStyle/>
+          <a:p>
+            <a:pPr algn="just">
+              <a:buFontTx/>
+              <a:buChar char="-"/>
+            </a:pPr>
+            <a:r>
+              <a:rPr lang="pt-BR" dirty="0">
+                <a:latin typeface="Times New Roman" panose="02020603050405020304" pitchFamily="18" charset="0"/>
+                <a:cs typeface="Times New Roman" panose="02020603050405020304" pitchFamily="18" charset="0"/>
+              </a:rPr>
+              <a:t>Exercícios de Fixação</a:t>
+            </a:r>
+          </a:p>
+          <a:p>
+            <a:pPr marL="0" indent="0" algn="just">
+              <a:buNone/>
+            </a:pPr>
+            <a:r>
+              <a:rPr lang="pt-BR" dirty="0">
+                <a:latin typeface="Times New Roman" panose="02020603050405020304" pitchFamily="18" charset="0"/>
+                <a:cs typeface="Times New Roman" panose="02020603050405020304" pitchFamily="18" charset="0"/>
+              </a:rPr>
+              <a:t>	Desafios em Sala de Aula.</a:t>
+            </a:r>
+          </a:p>
+        </p:txBody>
+      </p:sp>
+    </p:spTree>
+    <p:extLst>
+      <p:ext uri="{BB962C8B-B14F-4D97-AF65-F5344CB8AC3E}">
+        <p14:creationId xmlns:p14="http://schemas.microsoft.com/office/powerpoint/2010/main" val="2470652989"/>
+      </p:ext>
+    </p:extLst>
+  </p:cSld>
+  <p:clrMapOvr>
+    <a:masterClrMapping/>
+  </p:clrMapOvr>
+  <p:transition spd="med"/>
+</p:sld>
+</file>
+
+<file path=ppt/slides/slide23.xml><?xml version="1.0" encoding="utf-8"?>
+<p:sld xmlns:a="http://schemas.openxmlformats.org/drawingml/2006/main" xmlns:r="http://schemas.openxmlformats.org/officeDocument/2006/relationships" xmlns:p="http://schemas.openxmlformats.org/presentationml/2006/main">
+  <p:cSld>
+    <p:spTree>
+      <p:nvGrpSpPr>
+        <p:cNvPr id="1" name=""/>
+        <p:cNvGrpSpPr/>
+        <p:nvPr/>
+      </p:nvGrpSpPr>
+      <p:grpSpPr>
+        <a:xfrm>
+          <a:off x="0" y="0"/>
+          <a:ext cx="0" cy="0"/>
+          <a:chOff x="0" y="0"/>
+          <a:chExt cx="0" cy="0"/>
+        </a:xfrm>
+      </p:grpSpPr>
+      <p:sp>
+        <p:nvSpPr>
+          <p:cNvPr id="6" name="Title 1"/>
+          <p:cNvSpPr>
+            <a:spLocks noGrp="1"/>
+          </p:cNvSpPr>
+          <p:nvPr>
+            <p:ph type="title"/>
+          </p:nvPr>
+        </p:nvSpPr>
+        <p:spPr/>
+        <p:txBody>
+          <a:bodyPr>
+            <a:normAutofit/>
+          </a:bodyPr>
+          <a:lstStyle/>
+          <a:p>
+            <a:r>
+              <a:rPr lang="en-US" b="1" dirty="0" err="1">
+                <a:solidFill>
+                  <a:srgbClr val="0070C0"/>
+                </a:solidFill>
+              </a:rPr>
               <a:t>Referências</a:t>
             </a:r>
             <a:r>
@@ -10484,7 +10856,7 @@
 </p:sld>
 </file>
 
-<file path=ppt/slides/slide23.xml><?xml version="1.0" encoding="utf-8"?>
+<file path=ppt/slides/slide24.xml><?xml version="1.0" encoding="utf-8"?>
 <p:sld xmlns:a="http://schemas.openxmlformats.org/drawingml/2006/main" xmlns:r="http://schemas.openxmlformats.org/officeDocument/2006/relationships" xmlns:p="http://schemas.openxmlformats.org/presentationml/2006/main">
   <p:cSld>
     <p:spTree>
@@ -13067,6 +13439,16 @@
               <a:t>umaLista</a:t>
             </a:r>
             <a:r>
+              <a:rPr lang="pt-BR">
+                <a:solidFill>
+                  <a:schemeClr val="tx1"/>
+                </a:solidFill>
+                <a:latin typeface="Times New Roman" panose="02020603050405020304" pitchFamily="18" charset="0"/>
+                <a:cs typeface="Times New Roman" panose="02020603050405020304" pitchFamily="18" charset="0"/>
+              </a:rPr>
+              <a:t>[1:3</a:t>
+            </a:r>
+            <a:r>
               <a:rPr lang="pt-BR" dirty="0">
                 <a:solidFill>
                   <a:schemeClr val="tx1"/>
@@ -13074,7 +13456,7 @@
                 <a:latin typeface="Times New Roman" panose="02020603050405020304" pitchFamily="18" charset="0"/>
                 <a:cs typeface="Times New Roman" panose="02020603050405020304" pitchFamily="18" charset="0"/>
               </a:rPr>
-              <a:t>[1..3]; print(</a:t>
+              <a:t>]; print(</a:t>
             </a:r>
             <a:r>
               <a:rPr lang="pt-BR" dirty="0" err="1">

</xml_diff>

<commit_message>
Aula 07 Python 22092022
</commit_message>
<xml_diff>
--- a/01 Classes/Aula 07 Programação Python - Tipos de Dados Aglomerados.pptx
+++ b/01 Classes/Aula 07 Programação Python - Tipos de Dados Aglomerados.pptx
@@ -2050,7 +2050,7 @@
           <a:p>
             <a:fld id="{48A87A34-81AB-432B-8DAE-1953F412C126}" type="datetimeFigureOut">
               <a:rPr lang="en-US" smtClean="0"/>
-              <a:t>9/20/2022</a:t>
+              <a:t>9/22/2022</a:t>
             </a:fld>
             <a:endParaRPr lang="en-US" dirty="0"/>
           </a:p>
@@ -2261,7 +2261,7 @@
           <a:p>
             <a:fld id="{48A87A34-81AB-432B-8DAE-1953F412C126}" type="datetimeFigureOut">
               <a:rPr lang="en-US" smtClean="0"/>
-              <a:t>9/20/2022</a:t>
+              <a:t>9/22/2022</a:t>
             </a:fld>
             <a:endParaRPr lang="en-US" dirty="0"/>
           </a:p>
@@ -2476,7 +2476,7 @@
           <a:p>
             <a:fld id="{48A87A34-81AB-432B-8DAE-1953F412C126}" type="datetimeFigureOut">
               <a:rPr lang="en-US" smtClean="0"/>
-              <a:t>9/20/2022</a:t>
+              <a:t>9/22/2022</a:t>
             </a:fld>
             <a:endParaRPr lang="en-US" dirty="0"/>
           </a:p>
@@ -2844,7 +2844,7 @@
           <a:p>
             <a:fld id="{48A87A34-81AB-432B-8DAE-1953F412C126}" type="datetimeFigureOut">
               <a:rPr lang="en-US" smtClean="0"/>
-              <a:t>9/20/2022</a:t>
+              <a:t>9/22/2022</a:t>
             </a:fld>
             <a:endParaRPr lang="en-US" dirty="0"/>
           </a:p>
@@ -3123,7 +3123,7 @@
           <a:p>
             <a:fld id="{48A87A34-81AB-432B-8DAE-1953F412C126}" type="datetimeFigureOut">
               <a:rPr lang="en-US" smtClean="0"/>
-              <a:t>9/20/2022</a:t>
+              <a:t>9/22/2022</a:t>
             </a:fld>
             <a:endParaRPr lang="en-US" dirty="0"/>
           </a:p>
@@ -3391,7 +3391,7 @@
           <a:p>
             <a:fld id="{48A87A34-81AB-432B-8DAE-1953F412C126}" type="datetimeFigureOut">
               <a:rPr lang="en-US" smtClean="0"/>
-              <a:t>9/20/2022</a:t>
+              <a:t>9/22/2022</a:t>
             </a:fld>
             <a:endParaRPr lang="en-US" dirty="0"/>
           </a:p>
@@ -3807,7 +3807,7 @@
           <a:p>
             <a:fld id="{48A87A34-81AB-432B-8DAE-1953F412C126}" type="datetimeFigureOut">
               <a:rPr lang="en-US" smtClean="0"/>
-              <a:t>9/20/2022</a:t>
+              <a:t>9/22/2022</a:t>
             </a:fld>
             <a:endParaRPr lang="en-US" dirty="0"/>
           </a:p>
@@ -3956,7 +3956,7 @@
           <a:p>
             <a:fld id="{48A87A34-81AB-432B-8DAE-1953F412C126}" type="datetimeFigureOut">
               <a:rPr lang="en-US" smtClean="0"/>
-              <a:t>9/20/2022</a:t>
+              <a:t>9/22/2022</a:t>
             </a:fld>
             <a:endParaRPr lang="en-US" dirty="0"/>
           </a:p>
@@ -4082,7 +4082,7 @@
           <a:p>
             <a:fld id="{48A87A34-81AB-432B-8DAE-1953F412C126}" type="datetimeFigureOut">
               <a:rPr lang="en-US" smtClean="0"/>
-              <a:t>9/20/2022</a:t>
+              <a:t>9/22/2022</a:t>
             </a:fld>
             <a:endParaRPr lang="en-US" dirty="0"/>
           </a:p>
@@ -4333,7 +4333,7 @@
           <a:p>
             <a:fld id="{48A87A34-81AB-432B-8DAE-1953F412C126}" type="datetimeFigureOut">
               <a:rPr lang="en-US" smtClean="0"/>
-              <a:t>9/20/2022</a:t>
+              <a:t>9/22/2022</a:t>
             </a:fld>
             <a:endParaRPr lang="en-US" dirty="0"/>
           </a:p>
@@ -4779,7 +4779,7 @@
             <a:fld id="{48A87A34-81AB-432B-8DAE-1953F412C126}" type="datetimeFigureOut">
               <a:rPr lang="en-US" smtClean="0"/>
               <a:pPr/>
-              <a:t>9/20/2022</a:t>
+              <a:t>9/22/2022</a:t>
             </a:fld>
             <a:endParaRPr lang="en-US" dirty="0"/>
           </a:p>
@@ -5107,7 +5107,7 @@
             <a:fld id="{48A87A34-81AB-432B-8DAE-1953F412C126}" type="datetimeFigureOut">
               <a:rPr lang="en-US" smtClean="0"/>
               <a:pPr/>
-              <a:t>9/20/2022</a:t>
+              <a:t>9/22/2022</a:t>
             </a:fld>
             <a:endParaRPr lang="en-US" dirty="0"/>
           </a:p>
@@ -6989,7 +6989,7 @@
               <a:buNone/>
             </a:pPr>
             <a:r>
-              <a:rPr lang="pt-BR" b="1" dirty="0">
+              <a:rPr lang="pt-BR" sz="2400" b="1" dirty="0">
                 <a:solidFill>
                   <a:srgbClr val="FF0000"/>
                 </a:solidFill>
@@ -6999,7 +6999,7 @@
               <a:t>Exemplo Lista: </a:t>
             </a:r>
             <a:r>
-              <a:rPr lang="pt-BR" dirty="0" err="1">
+              <a:rPr lang="pt-BR" sz="2400" dirty="0" err="1">
                 <a:solidFill>
                   <a:schemeClr val="tx1"/>
                 </a:solidFill>
@@ -7009,7 +7009,7 @@
               <a:t>umaLista</a:t>
             </a:r>
             <a:r>
-              <a:rPr lang="pt-BR" dirty="0">
+              <a:rPr lang="pt-BR" sz="2400" dirty="0">
                 <a:solidFill>
                   <a:schemeClr val="tx1"/>
                 </a:solidFill>
@@ -7025,7 +7025,7 @@
               <a:buChar char="-"/>
             </a:pPr>
             <a:r>
-              <a:rPr lang="pt-BR" dirty="0">
+              <a:rPr lang="pt-BR" sz="2400" dirty="0">
                 <a:solidFill>
                   <a:schemeClr val="tx1"/>
                 </a:solidFill>
@@ -7035,7 +7035,7 @@
               <a:t>Apagar, uma faixa da lista com </a:t>
             </a:r>
             <a:r>
-              <a:rPr lang="pt-BR" dirty="0" err="1">
+              <a:rPr lang="pt-BR" sz="2400" b="1" dirty="0" err="1">
                 <a:solidFill>
                   <a:schemeClr val="tx1"/>
                 </a:solidFill>
@@ -7044,7 +7044,27 @@
               </a:rPr>
               <a:t>del</a:t>
             </a:r>
-            <a:endParaRPr lang="pt-BR" b="1" dirty="0">
+            <a:r>
+              <a:rPr lang="pt-BR" sz="2400" dirty="0">
+                <a:solidFill>
+                  <a:schemeClr val="tx1"/>
+                </a:solidFill>
+                <a:latin typeface="Times New Roman" panose="02020603050405020304" pitchFamily="18" charset="0"/>
+                <a:cs typeface="Times New Roman" panose="02020603050405020304" pitchFamily="18" charset="0"/>
+              </a:rPr>
+              <a:t> ou </a:t>
+            </a:r>
+            <a:r>
+              <a:rPr lang="pt-BR" sz="2400" b="1" dirty="0" err="1">
+                <a:solidFill>
+                  <a:srgbClr val="FF0000"/>
+                </a:solidFill>
+                <a:latin typeface="Times New Roman" panose="02020603050405020304" pitchFamily="18" charset="0"/>
+                <a:cs typeface="Times New Roman" panose="02020603050405020304" pitchFamily="18" charset="0"/>
+              </a:rPr>
+              <a:t>clear</a:t>
+            </a:r>
+            <a:endParaRPr lang="pt-BR" sz="2400" b="1" dirty="0">
               <a:solidFill>
                 <a:srgbClr val="FF0000"/>
               </a:solidFill>
@@ -7057,7 +7077,7 @@
               <a:buNone/>
             </a:pPr>
             <a:r>
-              <a:rPr lang="pt-BR" dirty="0">
+              <a:rPr lang="pt-BR" sz="2400" dirty="0">
                 <a:solidFill>
                   <a:schemeClr val="tx1"/>
                 </a:solidFill>
@@ -7067,7 +7087,7 @@
               <a:t>   Ex.: </a:t>
             </a:r>
             <a:r>
-              <a:rPr lang="pt-BR" b="1" dirty="0" err="1">
+              <a:rPr lang="pt-BR" sz="2400" b="1" dirty="0" err="1">
                 <a:solidFill>
                   <a:schemeClr val="tx1"/>
                 </a:solidFill>
@@ -7077,7 +7097,7 @@
               <a:t>del</a:t>
             </a:r>
             <a:r>
-              <a:rPr lang="pt-BR" dirty="0">
+              <a:rPr lang="pt-BR" sz="2400" dirty="0">
                 <a:solidFill>
                   <a:schemeClr val="tx1"/>
                 </a:solidFill>
@@ -7087,7 +7107,7 @@
               <a:t> </a:t>
             </a:r>
             <a:r>
-              <a:rPr lang="pt-BR" dirty="0" err="1">
+              <a:rPr lang="pt-BR" sz="2400" dirty="0" err="1">
                 <a:solidFill>
                   <a:schemeClr val="tx1"/>
                 </a:solidFill>
@@ -7097,66 +7117,14 @@
               <a:t>umaLista</a:t>
             </a:r>
             <a:r>
-              <a:rPr lang="pt-BR" dirty="0">
-                <a:solidFill>
-                  <a:schemeClr val="tx1"/>
-                </a:solidFill>
-                <a:latin typeface="Times New Roman" panose="02020603050405020304" pitchFamily="18" charset="0"/>
-                <a:cs typeface="Times New Roman" panose="02020603050405020304" pitchFamily="18" charset="0"/>
-              </a:rPr>
-              <a:t>[1:3]; </a:t>
-            </a:r>
-          </a:p>
-          <a:p>
-            <a:pPr marL="0" indent="0" algn="just">
-              <a:buNone/>
-            </a:pPr>
-            <a:r>
-              <a:rPr lang="pt-BR" dirty="0">
-                <a:latin typeface="Times New Roman" panose="02020603050405020304" pitchFamily="18" charset="0"/>
-                <a:cs typeface="Times New Roman" panose="02020603050405020304" pitchFamily="18" charset="0"/>
-              </a:rPr>
-              <a:t>          </a:t>
-            </a:r>
-            <a:r>
-              <a:rPr lang="pt-BR" b="1" dirty="0">
-                <a:solidFill>
-                  <a:schemeClr val="tx1"/>
-                </a:solidFill>
-                <a:latin typeface="Times New Roman" panose="02020603050405020304" pitchFamily="18" charset="0"/>
-                <a:cs typeface="Times New Roman" panose="02020603050405020304" pitchFamily="18" charset="0"/>
-              </a:rPr>
-              <a:t>print</a:t>
-            </a:r>
-            <a:r>
-              <a:rPr lang="pt-BR" dirty="0">
-                <a:solidFill>
-                  <a:schemeClr val="tx1"/>
-                </a:solidFill>
-                <a:latin typeface="Times New Roman" panose="02020603050405020304" pitchFamily="18" charset="0"/>
-                <a:cs typeface="Times New Roman" panose="02020603050405020304" pitchFamily="18" charset="0"/>
-              </a:rPr>
-              <a:t>(</a:t>
-            </a:r>
-            <a:r>
-              <a:rPr lang="pt-BR" dirty="0" err="1">
-                <a:solidFill>
-                  <a:schemeClr val="tx1"/>
-                </a:solidFill>
-                <a:latin typeface="Times New Roman" panose="02020603050405020304" pitchFamily="18" charset="0"/>
-                <a:cs typeface="Times New Roman" panose="02020603050405020304" pitchFamily="18" charset="0"/>
-              </a:rPr>
-              <a:t>umaLista</a:t>
-            </a:r>
-            <a:r>
-              <a:rPr lang="pt-BR" dirty="0">
-                <a:solidFill>
-                  <a:schemeClr val="tx1"/>
-                </a:solidFill>
-                <a:latin typeface="Times New Roman" panose="02020603050405020304" pitchFamily="18" charset="0"/>
-                <a:cs typeface="Times New Roman" panose="02020603050405020304" pitchFamily="18" charset="0"/>
-              </a:rPr>
-              <a:t>) # 1, 5, 7, 9</a:t>
+              <a:rPr lang="pt-BR" sz="2400" dirty="0">
+                <a:solidFill>
+                  <a:schemeClr val="tx1"/>
+                </a:solidFill>
+                <a:latin typeface="Times New Roman" panose="02020603050405020304" pitchFamily="18" charset="0"/>
+                <a:cs typeface="Times New Roman" panose="02020603050405020304" pitchFamily="18" charset="0"/>
+              </a:rPr>
+              <a:t>[1:3]; # 1, 5, 7, 9</a:t>
             </a:r>
           </a:p>
           <a:p>
@@ -7165,16 +7133,36 @@
               <a:buChar char="-"/>
             </a:pPr>
             <a:r>
-              <a:rPr lang="pt-BR" dirty="0">
-                <a:solidFill>
-                  <a:schemeClr val="tx1"/>
-                </a:solidFill>
-                <a:latin typeface="Times New Roman" panose="02020603050405020304" pitchFamily="18" charset="0"/>
-                <a:cs typeface="Times New Roman" panose="02020603050405020304" pitchFamily="18" charset="0"/>
-              </a:rPr>
-              <a:t>Apagar lista totalmente</a:t>
-            </a:r>
-            <a:endParaRPr lang="pt-BR" b="1" dirty="0">
+              <a:rPr lang="pt-BR" sz="2400" dirty="0">
+                <a:solidFill>
+                  <a:schemeClr val="tx1"/>
+                </a:solidFill>
+                <a:latin typeface="Times New Roman" panose="02020603050405020304" pitchFamily="18" charset="0"/>
+                <a:cs typeface="Times New Roman" panose="02020603050405020304" pitchFamily="18" charset="0"/>
+              </a:rPr>
+              <a:t>Apagar lista totalmente e </a:t>
+            </a:r>
+            <a:r>
+              <a:rPr lang="pt-BR" sz="2400" b="1" dirty="0">
+                <a:solidFill>
+                  <a:schemeClr val="tx1"/>
+                </a:solidFill>
+                <a:latin typeface="Times New Roman" panose="02020603050405020304" pitchFamily="18" charset="0"/>
+                <a:cs typeface="Times New Roman" panose="02020603050405020304" pitchFamily="18" charset="0"/>
+              </a:rPr>
+              <a:t>destrói</a:t>
+            </a:r>
+            <a:r>
+              <a:rPr lang="pt-BR" sz="2400" dirty="0">
+                <a:solidFill>
+                  <a:schemeClr val="tx1"/>
+                </a:solidFill>
+                <a:latin typeface="Times New Roman" panose="02020603050405020304" pitchFamily="18" charset="0"/>
+                <a:cs typeface="Times New Roman" panose="02020603050405020304" pitchFamily="18" charset="0"/>
+              </a:rPr>
+              <a:t> a lista na memória</a:t>
+            </a:r>
+            <a:endParaRPr lang="pt-BR" sz="2400" b="1" dirty="0">
               <a:solidFill>
                 <a:srgbClr val="FF0000"/>
               </a:solidFill>
@@ -7187,7 +7175,7 @@
               <a:buNone/>
             </a:pPr>
             <a:r>
-              <a:rPr lang="pt-BR" dirty="0">
+              <a:rPr lang="pt-BR" sz="2400" dirty="0">
                 <a:solidFill>
                   <a:schemeClr val="tx1"/>
                 </a:solidFill>
@@ -7197,7 +7185,7 @@
               <a:t>   Ex.: </a:t>
             </a:r>
             <a:r>
-              <a:rPr lang="pt-BR" b="1" dirty="0" err="1">
+              <a:rPr lang="pt-BR" sz="2400" b="1" dirty="0" err="1">
                 <a:solidFill>
                   <a:schemeClr val="tx1"/>
                 </a:solidFill>
@@ -7207,7 +7195,7 @@
               <a:t>del</a:t>
             </a:r>
             <a:r>
-              <a:rPr lang="pt-BR" dirty="0">
+              <a:rPr lang="pt-BR" sz="2400" dirty="0">
                 <a:solidFill>
                   <a:schemeClr val="tx1"/>
                 </a:solidFill>
@@ -7217,7 +7205,7 @@
               <a:t> </a:t>
             </a:r>
             <a:r>
-              <a:rPr lang="pt-BR" dirty="0" err="1">
+              <a:rPr lang="pt-BR" sz="2400" dirty="0" err="1">
                 <a:solidFill>
                   <a:schemeClr val="tx1"/>
                 </a:solidFill>
@@ -7226,7 +7214,7 @@
               </a:rPr>
               <a:t>umaLista</a:t>
             </a:r>
-            <a:endParaRPr lang="pt-BR" dirty="0">
+            <a:endParaRPr lang="pt-BR" sz="2400" dirty="0">
               <a:solidFill>
                 <a:schemeClr val="tx1"/>
               </a:solidFill>
@@ -7235,10 +7223,118 @@
             </a:endParaRPr>
           </a:p>
           <a:p>
+            <a:pPr algn="just">
+              <a:buFontTx/>
+              <a:buChar char="-"/>
+            </a:pPr>
+            <a:r>
+              <a:rPr lang="pt-BR" sz="2400" dirty="0">
+                <a:solidFill>
+                  <a:schemeClr val="tx1"/>
+                </a:solidFill>
+                <a:latin typeface="Times New Roman" panose="02020603050405020304" pitchFamily="18" charset="0"/>
+                <a:cs typeface="Times New Roman" panose="02020603050405020304" pitchFamily="18" charset="0"/>
+              </a:rPr>
+              <a:t>Limpa a lista totalmente e </a:t>
+            </a:r>
+            <a:r>
+              <a:rPr lang="pt-BR" sz="2400" b="1" dirty="0">
+                <a:solidFill>
+                  <a:schemeClr val="tx1"/>
+                </a:solidFill>
+                <a:latin typeface="Times New Roman" panose="02020603050405020304" pitchFamily="18" charset="0"/>
+                <a:cs typeface="Times New Roman" panose="02020603050405020304" pitchFamily="18" charset="0"/>
+              </a:rPr>
+              <a:t>NÃO</a:t>
+            </a:r>
+            <a:r>
+              <a:rPr lang="pt-BR" sz="2400" dirty="0">
+                <a:solidFill>
+                  <a:schemeClr val="tx1"/>
+                </a:solidFill>
+                <a:latin typeface="Times New Roman" panose="02020603050405020304" pitchFamily="18" charset="0"/>
+                <a:cs typeface="Times New Roman" panose="02020603050405020304" pitchFamily="18" charset="0"/>
+              </a:rPr>
+              <a:t> </a:t>
+            </a:r>
+            <a:r>
+              <a:rPr lang="pt-BR" sz="2400" b="1" dirty="0">
+                <a:solidFill>
+                  <a:schemeClr val="tx1"/>
+                </a:solidFill>
+                <a:latin typeface="Times New Roman" panose="02020603050405020304" pitchFamily="18" charset="0"/>
+                <a:cs typeface="Times New Roman" panose="02020603050405020304" pitchFamily="18" charset="0"/>
+              </a:rPr>
+              <a:t>destrói</a:t>
+            </a:r>
+            <a:r>
+              <a:rPr lang="pt-BR" sz="2400" dirty="0">
+                <a:solidFill>
+                  <a:schemeClr val="tx1"/>
+                </a:solidFill>
+                <a:latin typeface="Times New Roman" panose="02020603050405020304" pitchFamily="18" charset="0"/>
+                <a:cs typeface="Times New Roman" panose="02020603050405020304" pitchFamily="18" charset="0"/>
+              </a:rPr>
+              <a:t> a lista na memória</a:t>
+            </a:r>
+            <a:endParaRPr lang="pt-BR" sz="2400" b="1" dirty="0">
+              <a:solidFill>
+                <a:srgbClr val="FF0000"/>
+              </a:solidFill>
+              <a:latin typeface="Times New Roman" panose="02020603050405020304" pitchFamily="18" charset="0"/>
+              <a:cs typeface="Times New Roman" panose="02020603050405020304" pitchFamily="18" charset="0"/>
+            </a:endParaRPr>
+          </a:p>
+          <a:p>
             <a:pPr marL="0" indent="0" algn="just">
               <a:buNone/>
             </a:pPr>
-            <a:endParaRPr lang="pt-BR" dirty="0">
+            <a:r>
+              <a:rPr lang="pt-BR" sz="2400" dirty="0">
+                <a:solidFill>
+                  <a:schemeClr val="tx1"/>
+                </a:solidFill>
+                <a:latin typeface="Times New Roman" panose="02020603050405020304" pitchFamily="18" charset="0"/>
+                <a:cs typeface="Times New Roman" panose="02020603050405020304" pitchFamily="18" charset="0"/>
+              </a:rPr>
+              <a:t>   Ex.: </a:t>
+            </a:r>
+            <a:r>
+              <a:rPr lang="pt-BR" sz="2400" dirty="0" err="1">
+                <a:solidFill>
+                  <a:schemeClr val="tx1"/>
+                </a:solidFill>
+                <a:latin typeface="Times New Roman" panose="02020603050405020304" pitchFamily="18" charset="0"/>
+                <a:cs typeface="Times New Roman" panose="02020603050405020304" pitchFamily="18" charset="0"/>
+              </a:rPr>
+              <a:t>umaLista.</a:t>
+            </a:r>
+            <a:r>
+              <a:rPr lang="pt-BR" sz="2400" b="1" dirty="0" err="1">
+                <a:solidFill>
+                  <a:schemeClr val="tx1"/>
+                </a:solidFill>
+                <a:latin typeface="Times New Roman" panose="02020603050405020304" pitchFamily="18" charset="0"/>
+                <a:cs typeface="Times New Roman" panose="02020603050405020304" pitchFamily="18" charset="0"/>
+              </a:rPr>
+              <a:t>clear</a:t>
+            </a:r>
+            <a:r>
+              <a:rPr lang="pt-BR" sz="2400" dirty="0">
+                <a:solidFill>
+                  <a:schemeClr val="tx1"/>
+                </a:solidFill>
+                <a:latin typeface="Times New Roman" panose="02020603050405020304" pitchFamily="18" charset="0"/>
+                <a:cs typeface="Times New Roman" panose="02020603050405020304" pitchFamily="18" charset="0"/>
+              </a:rPr>
+              <a:t>()</a:t>
+            </a:r>
+          </a:p>
+          <a:p>
+            <a:pPr marL="0" indent="0" algn="just">
+              <a:buNone/>
+            </a:pPr>
+            <a:endParaRPr lang="pt-BR" sz="2400" dirty="0">
               <a:solidFill>
                 <a:schemeClr val="tx1"/>
               </a:solidFill>
@@ -14258,7 +14354,7 @@
                 <a:latin typeface="Times New Roman" panose="02020603050405020304" pitchFamily="18" charset="0"/>
                 <a:cs typeface="Times New Roman" panose="02020603050405020304" pitchFamily="18" charset="0"/>
               </a:rPr>
-              <a:t>– Podemos adicionar elemento com </a:t>
+              <a:t>– adicionar elemento com </a:t>
             </a:r>
             <a:r>
               <a:rPr lang="pt-BR" sz="2400" b="1" dirty="0" err="1">
@@ -14334,7 +14430,7 @@
                 <a:latin typeface="Times New Roman" panose="02020603050405020304" pitchFamily="18" charset="0"/>
                 <a:cs typeface="Times New Roman" panose="02020603050405020304" pitchFamily="18" charset="0"/>
               </a:rPr>
-              <a:t>– Podemos adicionar elemento com </a:t>
+              <a:t>– adicionar elemento com </a:t>
             </a:r>
             <a:r>
               <a:rPr lang="pt-BR" sz="2400" b="1" dirty="0" err="1">
@@ -14427,7 +14523,7 @@
                 <a:latin typeface="Times New Roman" panose="02020603050405020304" pitchFamily="18" charset="0"/>
                 <a:cs typeface="Times New Roman" panose="02020603050405020304" pitchFamily="18" charset="0"/>
               </a:rPr>
-              <a:t>– Podemos excluir elemento com </a:t>
+              <a:t>– excluir elemento com </a:t>
             </a:r>
             <a:r>
               <a:rPr lang="pt-BR" sz="2400" b="1" dirty="0">
@@ -14527,7 +14623,7 @@
                 <a:latin typeface="Times New Roman" panose="02020603050405020304" pitchFamily="18" charset="0"/>
                 <a:cs typeface="Times New Roman" panose="02020603050405020304" pitchFamily="18" charset="0"/>
               </a:rPr>
-              <a:t>– Podemos excluir elemento com </a:t>
+              <a:t>– excluir elemento com </a:t>
             </a:r>
             <a:r>
               <a:rPr lang="pt-BR" sz="2400" b="1" dirty="0">
@@ -14606,6 +14702,60 @@
                 <a:cs typeface="Times New Roman" panose="02020603050405020304" pitchFamily="18" charset="0"/>
               </a:rPr>
               <a:t>senão existir erro</a:t>
+            </a:r>
+            <a:r>
+              <a:rPr lang="pt-BR" sz="2400" b="1" dirty="0">
+                <a:latin typeface="Times New Roman" panose="02020603050405020304" pitchFamily="18" charset="0"/>
+                <a:cs typeface="Times New Roman" panose="02020603050405020304" pitchFamily="18" charset="0"/>
+              </a:rPr>
+              <a:t>.</a:t>
+            </a:r>
+          </a:p>
+          <a:p>
+            <a:pPr marL="0" indent="0" algn="just">
+              <a:buNone/>
+            </a:pPr>
+            <a:r>
+              <a:rPr lang="pt-BR" sz="2400" b="1" dirty="0">
+                <a:latin typeface="Times New Roman" panose="02020603050405020304" pitchFamily="18" charset="0"/>
+                <a:cs typeface="Times New Roman" panose="02020603050405020304" pitchFamily="18" charset="0"/>
+              </a:rPr>
+              <a:t>Nota: </a:t>
+            </a:r>
+            <a:r>
+              <a:rPr lang="pt-BR" sz="2400" dirty="0">
+                <a:latin typeface="Times New Roman" panose="02020603050405020304" pitchFamily="18" charset="0"/>
+                <a:cs typeface="Times New Roman" panose="02020603050405020304" pitchFamily="18" charset="0"/>
+              </a:rPr>
+              <a:t>Ainda existem os métodos</a:t>
+            </a:r>
+            <a:r>
+              <a:rPr lang="pt-BR" sz="2400" b="1" dirty="0">
+                <a:latin typeface="Times New Roman" panose="02020603050405020304" pitchFamily="18" charset="0"/>
+                <a:cs typeface="Times New Roman" panose="02020603050405020304" pitchFamily="18" charset="0"/>
+              </a:rPr>
+              <a:t>: </a:t>
+            </a:r>
+            <a:r>
+              <a:rPr lang="pt-BR" sz="2400" b="1" dirty="0" err="1">
+                <a:latin typeface="Times New Roman" panose="02020603050405020304" pitchFamily="18" charset="0"/>
+                <a:cs typeface="Times New Roman" panose="02020603050405020304" pitchFamily="18" charset="0"/>
+              </a:rPr>
+              <a:t>del</a:t>
+            </a:r>
+            <a:r>
+              <a:rPr lang="pt-BR" sz="2400" b="1" dirty="0">
+                <a:latin typeface="Times New Roman" panose="02020603050405020304" pitchFamily="18" charset="0"/>
+                <a:cs typeface="Times New Roman" panose="02020603050405020304" pitchFamily="18" charset="0"/>
+              </a:rPr>
+              <a:t> e </a:t>
+            </a:r>
+            <a:r>
+              <a:rPr lang="pt-BR" sz="2400" b="1" dirty="0" err="1">
+                <a:latin typeface="Times New Roman" panose="02020603050405020304" pitchFamily="18" charset="0"/>
+                <a:cs typeface="Times New Roman" panose="02020603050405020304" pitchFamily="18" charset="0"/>
+              </a:rPr>
+              <a:t>clear</a:t>
             </a:r>
             <a:r>
               <a:rPr lang="pt-BR" sz="2400" b="1" dirty="0">

</xml_diff>

<commit_message>
Aula 7 ppt, cod vetor - 26092022
</commit_message>
<xml_diff>
--- a/01 Classes/Aula 07 Programação Python - Tipos de Dados Aglomerados.pptx
+++ b/01 Classes/Aula 07 Programação Python - Tipos de Dados Aglomerados.pptx
@@ -5,7 +5,7 @@
     <p:sldMasterId id="2147483671" r:id="rId1"/>
   </p:sldMasterIdLst>
   <p:notesMasterIdLst>
-    <p:notesMasterId r:id="rId29"/>
+    <p:notesMasterId r:id="rId30"/>
   </p:notesMasterIdLst>
   <p:sldIdLst>
     <p:sldId id="256" r:id="rId2"/>
@@ -30,11 +30,12 @@
     <p:sldId id="346" r:id="rId21"/>
     <p:sldId id="347" r:id="rId22"/>
     <p:sldId id="353" r:id="rId23"/>
-    <p:sldId id="323" r:id="rId24"/>
-    <p:sldId id="333" r:id="rId25"/>
-    <p:sldId id="334" r:id="rId26"/>
-    <p:sldId id="337" r:id="rId27"/>
-    <p:sldId id="309" r:id="rId28"/>
+    <p:sldId id="357" r:id="rId24"/>
+    <p:sldId id="323" r:id="rId25"/>
+    <p:sldId id="333" r:id="rId26"/>
+    <p:sldId id="334" r:id="rId27"/>
+    <p:sldId id="337" r:id="rId28"/>
+    <p:sldId id="309" r:id="rId29"/>
   </p:sldIdLst>
   <p:sldSz cx="9144000" cy="5143500" type="screen16x9"/>
   <p:notesSz cx="6858000" cy="9144000"/>
@@ -1241,7 +1242,7 @@
     </p:spTree>
     <p:extLst>
       <p:ext uri="{BB962C8B-B14F-4D97-AF65-F5344CB8AC3E}">
-        <p14:creationId xmlns:p14="http://schemas.microsoft.com/office/powerpoint/2010/main" val="2709569597"/>
+        <p14:creationId xmlns:p14="http://schemas.microsoft.com/office/powerpoint/2010/main" val="2598361263"/>
       </p:ext>
     </p:extLst>
   </p:cSld>
@@ -1307,7 +1308,7 @@
     </p:spTree>
     <p:extLst>
       <p:ext uri="{BB962C8B-B14F-4D97-AF65-F5344CB8AC3E}">
-        <p14:creationId xmlns:p14="http://schemas.microsoft.com/office/powerpoint/2010/main" val="585304384"/>
+        <p14:creationId xmlns:p14="http://schemas.microsoft.com/office/powerpoint/2010/main" val="2709569597"/>
       </p:ext>
     </p:extLst>
   </p:cSld>
@@ -1373,6 +1374,72 @@
     </p:spTree>
     <p:extLst>
       <p:ext uri="{BB962C8B-B14F-4D97-AF65-F5344CB8AC3E}">
+        <p14:creationId xmlns:p14="http://schemas.microsoft.com/office/powerpoint/2010/main" val="585304384"/>
+      </p:ext>
+    </p:extLst>
+  </p:cSld>
+  <p:clrMapOvr>
+    <a:masterClrMapping/>
+  </p:clrMapOvr>
+</p:notes>
+</file>
+
+<file path=ppt/notesSlides/notesSlide24.xml><?xml version="1.0" encoding="utf-8"?>
+<p:notes xmlns:a="http://schemas.openxmlformats.org/drawingml/2006/main" xmlns:r="http://schemas.openxmlformats.org/officeDocument/2006/relationships" xmlns:p="http://schemas.openxmlformats.org/presentationml/2006/main">
+  <p:cSld>
+    <p:spTree>
+      <p:nvGrpSpPr>
+        <p:cNvPr id="1" name=""/>
+        <p:cNvGrpSpPr/>
+        <p:nvPr/>
+      </p:nvGrpSpPr>
+      <p:grpSpPr>
+        <a:xfrm>
+          <a:off x="0" y="0"/>
+          <a:ext cx="0" cy="0"/>
+          <a:chOff x="0" y="0"/>
+          <a:chExt cx="0" cy="0"/>
+        </a:xfrm>
+      </p:grpSpPr>
+      <p:sp>
+        <p:nvSpPr>
+          <p:cNvPr id="2" name="Espaço Reservado para Imagem de Slide 1"/>
+          <p:cNvSpPr>
+            <a:spLocks noGrp="1" noRot="1" noChangeAspect="1"/>
+          </p:cNvSpPr>
+          <p:nvPr>
+            <p:ph type="sldImg"/>
+          </p:nvPr>
+        </p:nvSpPr>
+        <p:spPr>
+          <a:xfrm>
+            <a:off x="381000" y="685800"/>
+            <a:ext cx="6096000" cy="3429000"/>
+          </a:xfrm>
+        </p:spPr>
+      </p:sp>
+      <p:sp>
+        <p:nvSpPr>
+          <p:cNvPr id="3" name="Espaço Reservado para Anotações 2"/>
+          <p:cNvSpPr>
+            <a:spLocks noGrp="1"/>
+          </p:cNvSpPr>
+          <p:nvPr>
+            <p:ph type="body" idx="1"/>
+          </p:nvPr>
+        </p:nvSpPr>
+        <p:spPr/>
+        <p:txBody>
+          <a:bodyPr/>
+          <a:lstStyle/>
+          <a:p>
+            <a:endParaRPr lang="pt-BR" dirty="0"/>
+          </a:p>
+        </p:txBody>
+      </p:sp>
+    </p:spTree>
+    <p:extLst>
+      <p:ext uri="{BB962C8B-B14F-4D97-AF65-F5344CB8AC3E}">
         <p14:creationId xmlns:p14="http://schemas.microsoft.com/office/powerpoint/2010/main" val="2296249050"/>
       </p:ext>
     </p:extLst>
@@ -1383,7 +1450,7 @@
 </p:notes>
 </file>
 
-<file path=ppt/notesSlides/notesSlide24.xml><?xml version="1.0" encoding="utf-8"?>
+<file path=ppt/notesSlides/notesSlide25.xml><?xml version="1.0" encoding="utf-8"?>
 <p:notes xmlns:a="http://schemas.openxmlformats.org/drawingml/2006/main" xmlns:r="http://schemas.openxmlformats.org/officeDocument/2006/relationships" xmlns:p="http://schemas.openxmlformats.org/presentationml/2006/main">
   <p:cSld>
     <p:spTree>
@@ -2050,7 +2117,7 @@
           <a:p>
             <a:fld id="{48A87A34-81AB-432B-8DAE-1953F412C126}" type="datetimeFigureOut">
               <a:rPr lang="en-US" smtClean="0"/>
-              <a:t>9/22/2022</a:t>
+              <a:t>9/25/2022</a:t>
             </a:fld>
             <a:endParaRPr lang="en-US" dirty="0"/>
           </a:p>
@@ -2261,7 +2328,7 @@
           <a:p>
             <a:fld id="{48A87A34-81AB-432B-8DAE-1953F412C126}" type="datetimeFigureOut">
               <a:rPr lang="en-US" smtClean="0"/>
-              <a:t>9/22/2022</a:t>
+              <a:t>9/25/2022</a:t>
             </a:fld>
             <a:endParaRPr lang="en-US" dirty="0"/>
           </a:p>
@@ -2476,7 +2543,7 @@
           <a:p>
             <a:fld id="{48A87A34-81AB-432B-8DAE-1953F412C126}" type="datetimeFigureOut">
               <a:rPr lang="en-US" smtClean="0"/>
-              <a:t>9/22/2022</a:t>
+              <a:t>9/25/2022</a:t>
             </a:fld>
             <a:endParaRPr lang="en-US" dirty="0"/>
           </a:p>
@@ -2844,7 +2911,7 @@
           <a:p>
             <a:fld id="{48A87A34-81AB-432B-8DAE-1953F412C126}" type="datetimeFigureOut">
               <a:rPr lang="en-US" smtClean="0"/>
-              <a:t>9/22/2022</a:t>
+              <a:t>9/25/2022</a:t>
             </a:fld>
             <a:endParaRPr lang="en-US" dirty="0"/>
           </a:p>
@@ -3123,7 +3190,7 @@
           <a:p>
             <a:fld id="{48A87A34-81AB-432B-8DAE-1953F412C126}" type="datetimeFigureOut">
               <a:rPr lang="en-US" smtClean="0"/>
-              <a:t>9/22/2022</a:t>
+              <a:t>9/25/2022</a:t>
             </a:fld>
             <a:endParaRPr lang="en-US" dirty="0"/>
           </a:p>
@@ -3391,7 +3458,7 @@
           <a:p>
             <a:fld id="{48A87A34-81AB-432B-8DAE-1953F412C126}" type="datetimeFigureOut">
               <a:rPr lang="en-US" smtClean="0"/>
-              <a:t>9/22/2022</a:t>
+              <a:t>9/25/2022</a:t>
             </a:fld>
             <a:endParaRPr lang="en-US" dirty="0"/>
           </a:p>
@@ -3807,7 +3874,7 @@
           <a:p>
             <a:fld id="{48A87A34-81AB-432B-8DAE-1953F412C126}" type="datetimeFigureOut">
               <a:rPr lang="en-US" smtClean="0"/>
-              <a:t>9/22/2022</a:t>
+              <a:t>9/25/2022</a:t>
             </a:fld>
             <a:endParaRPr lang="en-US" dirty="0"/>
           </a:p>
@@ -3956,7 +4023,7 @@
           <a:p>
             <a:fld id="{48A87A34-81AB-432B-8DAE-1953F412C126}" type="datetimeFigureOut">
               <a:rPr lang="en-US" smtClean="0"/>
-              <a:t>9/22/2022</a:t>
+              <a:t>9/25/2022</a:t>
             </a:fld>
             <a:endParaRPr lang="en-US" dirty="0"/>
           </a:p>
@@ -4082,7 +4149,7 @@
           <a:p>
             <a:fld id="{48A87A34-81AB-432B-8DAE-1953F412C126}" type="datetimeFigureOut">
               <a:rPr lang="en-US" smtClean="0"/>
-              <a:t>9/22/2022</a:t>
+              <a:t>9/25/2022</a:t>
             </a:fld>
             <a:endParaRPr lang="en-US" dirty="0"/>
           </a:p>
@@ -4333,7 +4400,7 @@
           <a:p>
             <a:fld id="{48A87A34-81AB-432B-8DAE-1953F412C126}" type="datetimeFigureOut">
               <a:rPr lang="en-US" smtClean="0"/>
-              <a:t>9/22/2022</a:t>
+              <a:t>9/25/2022</a:t>
             </a:fld>
             <a:endParaRPr lang="en-US" dirty="0"/>
           </a:p>
@@ -4779,7 +4846,7 @@
             <a:fld id="{48A87A34-81AB-432B-8DAE-1953F412C126}" type="datetimeFigureOut">
               <a:rPr lang="en-US" smtClean="0"/>
               <a:pPr/>
-              <a:t>9/22/2022</a:t>
+              <a:t>9/25/2022</a:t>
             </a:fld>
             <a:endParaRPr lang="en-US" dirty="0"/>
           </a:p>
@@ -5107,7 +5174,7 @@
             <a:fld id="{48A87A34-81AB-432B-8DAE-1953F412C126}" type="datetimeFigureOut">
               <a:rPr lang="en-US" smtClean="0"/>
               <a:pPr/>
-              <a:t>9/22/2022</a:t>
+              <a:t>9/25/2022</a:t>
             </a:fld>
             <a:endParaRPr lang="en-US" dirty="0"/>
           </a:p>
@@ -9617,15 +9684,45 @@
             <a:pPr marL="0" indent="0" algn="just">
               <a:buNone/>
             </a:pPr>
+            <a:endParaRPr lang="pt-BR" dirty="0">
+              <a:solidFill>
+                <a:schemeClr val="tx1"/>
+              </a:solidFill>
+              <a:latin typeface="Times New Roman" panose="02020603050405020304" pitchFamily="18" charset="0"/>
+              <a:cs typeface="Times New Roman" panose="02020603050405020304" pitchFamily="18" charset="0"/>
+            </a:endParaRPr>
+          </a:p>
+          <a:p>
+            <a:pPr algn="just">
+              <a:buFont typeface="Wingdings" panose="05000000000000000000" pitchFamily="2" charset="2"/>
+              <a:buChar char="§"/>
+            </a:pPr>
             <a:r>
               <a:rPr lang="pt-BR" dirty="0">
-                <a:solidFill>
-                  <a:schemeClr val="tx1"/>
-                </a:solidFill>
-                <a:latin typeface="Times New Roman" panose="02020603050405020304" pitchFamily="18" charset="0"/>
-                <a:cs typeface="Times New Roman" panose="02020603050405020304" pitchFamily="18" charset="0"/>
-              </a:rPr>
-              <a:t>• Como guardar dados organizados em Python?</a:t>
+                <a:latin typeface="Times New Roman" panose="02020603050405020304" pitchFamily="18" charset="0"/>
+                <a:cs typeface="Times New Roman" panose="02020603050405020304" pitchFamily="18" charset="0"/>
+              </a:rPr>
+              <a:t> </a:t>
+            </a:r>
+            <a:r>
+              <a:rPr lang="pt-BR" b="1" dirty="0">
+                <a:solidFill>
+                  <a:srgbClr val="FF0000"/>
+                </a:solidFill>
+                <a:latin typeface="Times New Roman" panose="02020603050405020304" pitchFamily="18" charset="0"/>
+                <a:cs typeface="Times New Roman" panose="02020603050405020304" pitchFamily="18" charset="0"/>
+              </a:rPr>
+              <a:t>Como guardar dados organizados em Python</a:t>
+            </a:r>
+            <a:r>
+              <a:rPr lang="pt-BR" dirty="0">
+                <a:solidFill>
+                  <a:schemeClr val="tx1"/>
+                </a:solidFill>
+                <a:latin typeface="Times New Roman" panose="02020603050405020304" pitchFamily="18" charset="0"/>
+                <a:cs typeface="Times New Roman" panose="02020603050405020304" pitchFamily="18" charset="0"/>
+              </a:rPr>
+              <a:t>?</a:t>
             </a:r>
           </a:p>
           <a:p>
@@ -10166,7 +10263,21 @@
                 <a:latin typeface="Times New Roman" panose="02020603050405020304" pitchFamily="18" charset="0"/>
                 <a:cs typeface="Times New Roman" panose="02020603050405020304" pitchFamily="18" charset="0"/>
               </a:rPr>
-              <a:t>:</a:t>
+              <a:t>: </a:t>
+            </a:r>
+            <a:r>
+              <a:rPr lang="pt-BR" sz="3200" b="1" dirty="0" err="1">
+                <a:latin typeface="Times New Roman" panose="02020603050405020304" pitchFamily="18" charset="0"/>
+                <a:cs typeface="Times New Roman" panose="02020603050405020304" pitchFamily="18" charset="0"/>
+              </a:rPr>
+              <a:t>Tupla</a:t>
+            </a:r>
+            <a:r>
+              <a:rPr lang="pt-BR" sz="3200" b="1" dirty="0">
+                <a:latin typeface="Times New Roman" panose="02020603050405020304" pitchFamily="18" charset="0"/>
+                <a:cs typeface="Times New Roman" panose="02020603050405020304" pitchFamily="18" charset="0"/>
+              </a:rPr>
+              <a:t> não nomeada</a:t>
             </a:r>
           </a:p>
           <a:p>
@@ -10645,12 +10756,20 @@
               </a:rPr>
             </a:br>
             <a:r>
+              <a:rPr lang="pt-BR" sz="3200" b="1">
+                <a:solidFill>
+                  <a:schemeClr val="bg1"/>
+                </a:solidFill>
+              </a:rPr>
+              <a:t>  Tipos </a:t>
+            </a:r>
+            <a:r>
               <a:rPr lang="pt-BR" sz="3200" b="1" dirty="0">
                 <a:solidFill>
                   <a:schemeClr val="bg1"/>
                 </a:solidFill>
               </a:rPr>
-              <a:t>	Tipos de dados aglomerados:	</a:t>
+              <a:t>de dados aglomerados:	</a:t>
             </a:r>
             <a:br>
               <a:rPr lang="pt-BR" sz="3200" b="1" dirty="0">
@@ -10660,12 +10779,20 @@
               </a:rPr>
             </a:br>
             <a:r>
+              <a:rPr lang="pt-BR" sz="3200" b="1">
+                <a:solidFill>
+                  <a:schemeClr val="bg1"/>
+                </a:solidFill>
+              </a:rPr>
+              <a:t>  Listas</a:t>
+            </a:r>
+            <a:r>
               <a:rPr lang="pt-BR" sz="3200" b="1" dirty="0">
                 <a:solidFill>
                   <a:schemeClr val="bg1"/>
                 </a:solidFill>
               </a:rPr>
-              <a:t>	Listas, </a:t>
+              <a:t>, </a:t>
             </a:r>
             <a:r>
               <a:rPr lang="pt-BR" sz="3200" b="1" dirty="0" err="1">
@@ -10681,7 +10808,7 @@
                   <a:schemeClr val="bg1"/>
                 </a:solidFill>
               </a:rPr>
-              <a:t> E </a:t>
+              <a:t>, </a:t>
             </a:r>
             <a:r>
               <a:rPr lang="pt-BR" sz="3200" b="1" dirty="0" err="1">
@@ -10691,11 +10818,14 @@
               </a:rPr>
               <a:t>SETs</a:t>
             </a:r>
-            <a:endParaRPr lang="pt-BR" sz="3200" b="1" dirty="0">
-              <a:solidFill>
-                <a:schemeClr val="bg1"/>
-              </a:solidFill>
-            </a:endParaRPr>
+            <a:r>
+              <a:rPr lang="pt-BR" sz="3200" b="1" dirty="0">
+                <a:solidFill>
+                  <a:schemeClr val="bg1"/>
+                </a:solidFill>
+              </a:rPr>
+              <a:t>, DICS</a:t>
+            </a:r>
           </a:p>
         </p:txBody>
       </p:sp>
@@ -11132,27 +11262,17 @@
                 <a:latin typeface="Times New Roman" panose="02020603050405020304" pitchFamily="18" charset="0"/>
                 <a:cs typeface="Times New Roman" panose="02020603050405020304" pitchFamily="18" charset="0"/>
               </a:rPr>
-              <a:t>cliente[1] = "1234“ # </a:t>
-            </a:r>
-            <a:r>
-              <a:rPr lang="pt-BR" b="1" dirty="0" err="1">
+              <a:t>cliente[1] = "12345678900" #</a:t>
+            </a:r>
+            <a:r>
+              <a:rPr lang="pt-BR" b="1" dirty="0">
                 <a:solidFill>
                   <a:srgbClr val="FF0000"/>
                 </a:solidFill>
                 <a:latin typeface="Times New Roman" panose="02020603050405020304" pitchFamily="18" charset="0"/>
                 <a:cs typeface="Times New Roman" panose="02020603050405020304" pitchFamily="18" charset="0"/>
               </a:rPr>
-              <a:t>Tupla</a:t>
-            </a:r>
-            <a:r>
-              <a:rPr lang="pt-BR" b="1" dirty="0">
-                <a:solidFill>
-                  <a:srgbClr val="FF0000"/>
-                </a:solidFill>
-                <a:latin typeface="Times New Roman" panose="02020603050405020304" pitchFamily="18" charset="0"/>
-                <a:cs typeface="Times New Roman" panose="02020603050405020304" pitchFamily="18" charset="0"/>
-              </a:rPr>
-              <a:t>, </a:t>
+              <a:t>Tupla, </a:t>
             </a:r>
             <a:r>
               <a:rPr lang="pt-BR" b="1" dirty="0" err="1">
@@ -11469,11 +11589,25 @@
               <a:buNone/>
             </a:pPr>
             <a:r>
+              <a:rPr lang="pt-BR" sz="2400" b="1" dirty="0" err="1">
+                <a:latin typeface="Times New Roman" panose="02020603050405020304" pitchFamily="18" charset="0"/>
+                <a:cs typeface="Times New Roman" panose="02020603050405020304" pitchFamily="18" charset="0"/>
+              </a:rPr>
+              <a:t>from</a:t>
+            </a:r>
+            <a:r>
+              <a:rPr lang="pt-BR" sz="2400" dirty="0">
+                <a:latin typeface="Times New Roman" panose="02020603050405020304" pitchFamily="18" charset="0"/>
+                <a:cs typeface="Times New Roman" panose="02020603050405020304" pitchFamily="18" charset="0"/>
+              </a:rPr>
+              <a:t> </a:t>
+            </a:r>
+            <a:r>
               <a:rPr lang="pt-BR" sz="2400" dirty="0" err="1">
                 <a:latin typeface="Times New Roman" panose="02020603050405020304" pitchFamily="18" charset="0"/>
                 <a:cs typeface="Times New Roman" panose="02020603050405020304" pitchFamily="18" charset="0"/>
               </a:rPr>
-              <a:t>from</a:t>
+              <a:t>collections</a:t>
             </a:r>
             <a:r>
               <a:rPr lang="pt-BR" sz="2400" dirty="0">
@@ -11483,21 +11617,7 @@
               <a:t> </a:t>
             </a:r>
             <a:r>
-              <a:rPr lang="pt-BR" sz="2400" dirty="0" err="1">
-                <a:latin typeface="Times New Roman" panose="02020603050405020304" pitchFamily="18" charset="0"/>
-                <a:cs typeface="Times New Roman" panose="02020603050405020304" pitchFamily="18" charset="0"/>
-              </a:rPr>
-              <a:t>collections</a:t>
-            </a:r>
-            <a:r>
-              <a:rPr lang="pt-BR" sz="2400" dirty="0">
-                <a:latin typeface="Times New Roman" panose="02020603050405020304" pitchFamily="18" charset="0"/>
-                <a:cs typeface="Times New Roman" panose="02020603050405020304" pitchFamily="18" charset="0"/>
-              </a:rPr>
-              <a:t> </a:t>
-            </a:r>
-            <a:r>
-              <a:rPr lang="pt-BR" sz="2400" dirty="0" err="1">
+              <a:rPr lang="pt-BR" sz="2400" b="1" dirty="0" err="1">
                 <a:latin typeface="Times New Roman" panose="02020603050405020304" pitchFamily="18" charset="0"/>
                 <a:cs typeface="Times New Roman" panose="02020603050405020304" pitchFamily="18" charset="0"/>
               </a:rPr>
@@ -11534,32 +11654,51 @@
               <a:t>Cliente = </a:t>
             </a:r>
             <a:r>
+              <a:rPr lang="pt-BR" sz="2400" b="1" dirty="0" err="1">
+                <a:latin typeface="Times New Roman" panose="02020603050405020304" pitchFamily="18" charset="0"/>
+                <a:cs typeface="Times New Roman" panose="02020603050405020304" pitchFamily="18" charset="0"/>
+              </a:rPr>
+              <a:t>namedtuple</a:t>
+            </a:r>
+            <a:r>
+              <a:rPr lang="pt-BR" sz="2400" dirty="0">
+                <a:latin typeface="Times New Roman" panose="02020603050405020304" pitchFamily="18" charset="0"/>
+                <a:cs typeface="Times New Roman" panose="02020603050405020304" pitchFamily="18" charset="0"/>
+              </a:rPr>
+              <a:t>(‘Cliente’, ‘nome </a:t>
+            </a:r>
+            <a:r>
               <a:rPr lang="pt-BR" sz="2400" dirty="0" err="1">
                 <a:latin typeface="Times New Roman" panose="02020603050405020304" pitchFamily="18" charset="0"/>
                 <a:cs typeface="Times New Roman" panose="02020603050405020304" pitchFamily="18" charset="0"/>
               </a:rPr>
-              <a:t>namedtuple</a:t>
+              <a:t>cpf</a:t>
             </a:r>
             <a:r>
               <a:rPr lang="pt-BR" sz="2400" dirty="0">
                 <a:latin typeface="Times New Roman" panose="02020603050405020304" pitchFamily="18" charset="0"/>
                 <a:cs typeface="Times New Roman" panose="02020603050405020304" pitchFamily="18" charset="0"/>
               </a:rPr>
-              <a:t>(‘Cliente’, ‘nome </a:t>
-            </a:r>
+              <a:t> limite compras’)</a:t>
+            </a:r>
+          </a:p>
+          <a:p>
+            <a:pPr marL="619125" lvl="1" indent="0" algn="just">
+              <a:buNone/>
+            </a:pPr>
             <a:r>
               <a:rPr lang="pt-BR" sz="2400" dirty="0" err="1">
                 <a:latin typeface="Times New Roman" panose="02020603050405020304" pitchFamily="18" charset="0"/>
                 <a:cs typeface="Times New Roman" panose="02020603050405020304" pitchFamily="18" charset="0"/>
               </a:rPr>
-              <a:t>cpf</a:t>
+              <a:t>umCliente</a:t>
             </a:r>
             <a:r>
               <a:rPr lang="pt-BR" sz="2400" dirty="0">
                 <a:latin typeface="Times New Roman" panose="02020603050405020304" pitchFamily="18" charset="0"/>
                 <a:cs typeface="Times New Roman" panose="02020603050405020304" pitchFamily="18" charset="0"/>
               </a:rPr>
-              <a:t> limite compras’)</a:t>
+              <a:t> = Cliente(‘Fulano’, ‘01234567890’, 5000.00, 300.00)</a:t>
             </a:r>
           </a:p>
           <a:p>
@@ -11567,6 +11706,20 @@
               <a:buNone/>
             </a:pPr>
             <a:r>
+              <a:rPr lang="pt-BR" sz="2400" b="1" dirty="0">
+                <a:latin typeface="Times New Roman" panose="02020603050405020304" pitchFamily="18" charset="0"/>
+                <a:cs typeface="Times New Roman" panose="02020603050405020304" pitchFamily="18" charset="0"/>
+              </a:rPr>
+              <a:t>print</a:t>
+            </a:r>
+            <a:r>
+              <a:rPr lang="pt-BR" sz="2400" dirty="0">
+                <a:latin typeface="Times New Roman" panose="02020603050405020304" pitchFamily="18" charset="0"/>
+                <a:cs typeface="Times New Roman" panose="02020603050405020304" pitchFamily="18" charset="0"/>
+              </a:rPr>
+              <a:t>(</a:t>
+            </a:r>
+            <a:r>
               <a:rPr lang="pt-BR" sz="2400" dirty="0" err="1">
                 <a:latin typeface="Times New Roman" panose="02020603050405020304" pitchFamily="18" charset="0"/>
                 <a:cs typeface="Times New Roman" panose="02020603050405020304" pitchFamily="18" charset="0"/>
@@ -11578,7 +11731,7 @@
                 <a:latin typeface="Times New Roman" panose="02020603050405020304" pitchFamily="18" charset="0"/>
                 <a:cs typeface="Times New Roman" panose="02020603050405020304" pitchFamily="18" charset="0"/>
               </a:rPr>
-              <a:t> = Cliente(‘Fulano’, ‘01234567890’, 5000.00, 300.00)</a:t>
+              <a:t>)</a:t>
             </a:r>
           </a:p>
           <a:p>
@@ -11586,37 +11739,18 @@
               <a:buNone/>
             </a:pPr>
             <a:r>
+              <a:rPr lang="pt-BR" sz="2400" b="1" dirty="0">
+                <a:latin typeface="Times New Roman" panose="02020603050405020304" pitchFamily="18" charset="0"/>
+                <a:cs typeface="Times New Roman" panose="02020603050405020304" pitchFamily="18" charset="0"/>
+              </a:rPr>
+              <a:t>print</a:t>
+            </a:r>
+            <a:r>
               <a:rPr lang="pt-BR" sz="2400" dirty="0">
                 <a:latin typeface="Times New Roman" panose="02020603050405020304" pitchFamily="18" charset="0"/>
                 <a:cs typeface="Times New Roman" panose="02020603050405020304" pitchFamily="18" charset="0"/>
               </a:rPr>
-              <a:t>print (</a:t>
-            </a:r>
-            <a:r>
-              <a:rPr lang="pt-BR" sz="2400" dirty="0" err="1">
-                <a:latin typeface="Times New Roman" panose="02020603050405020304" pitchFamily="18" charset="0"/>
-                <a:cs typeface="Times New Roman" panose="02020603050405020304" pitchFamily="18" charset="0"/>
-              </a:rPr>
-              <a:t>umCliente</a:t>
-            </a:r>
-            <a:r>
-              <a:rPr lang="pt-BR" sz="2400" dirty="0">
-                <a:latin typeface="Times New Roman" panose="02020603050405020304" pitchFamily="18" charset="0"/>
-                <a:cs typeface="Times New Roman" panose="02020603050405020304" pitchFamily="18" charset="0"/>
-              </a:rPr>
-              <a:t>)</a:t>
-            </a:r>
-          </a:p>
-          <a:p>
-            <a:pPr marL="619125" lvl="1" indent="0" algn="just">
-              <a:buNone/>
-            </a:pPr>
-            <a:r>
-              <a:rPr lang="pt-BR" sz="2400" dirty="0">
-                <a:latin typeface="Times New Roman" panose="02020603050405020304" pitchFamily="18" charset="0"/>
-                <a:cs typeface="Times New Roman" panose="02020603050405020304" pitchFamily="18" charset="0"/>
-              </a:rPr>
-              <a:t>print(</a:t>
+              <a:t>(</a:t>
             </a:r>
             <a:r>
               <a:rPr lang="pt-BR" sz="2400" dirty="0" err="1">
@@ -11805,7 +11939,7 @@
                 <a:latin typeface="Times New Roman" panose="02020603050405020304" pitchFamily="18" charset="0"/>
                 <a:cs typeface="Times New Roman" panose="02020603050405020304" pitchFamily="18" charset="0"/>
               </a:rPr>
-              <a:t>são estruturas disponíveis como </a:t>
+              <a:t>São estruturas disponíveis como </a:t>
             </a:r>
             <a:r>
               <a:rPr lang="pt-BR" sz="2000" b="1" i="1" dirty="0" err="1">
@@ -11840,21 +11974,66 @@
                 <a:latin typeface="Times New Roman" panose="02020603050405020304" pitchFamily="18" charset="0"/>
                 <a:cs typeface="Times New Roman" panose="02020603050405020304" pitchFamily="18" charset="0"/>
               </a:rPr>
-              <a:t>Os elementos não são armazenados em uma ordem específica e confiável; </a:t>
+              <a:t>Coleções: </a:t>
             </a:r>
             <a:r>
               <a:rPr lang="pt-BR" sz="2000" b="1" dirty="0">
                 <a:latin typeface="Times New Roman" panose="02020603050405020304" pitchFamily="18" charset="0"/>
                 <a:cs typeface="Times New Roman" panose="02020603050405020304" pitchFamily="18" charset="0"/>
               </a:rPr>
-              <a:t>Conjuntos não contém elementos repetidos</a:t>
+              <a:t>Não ordenadas</a:t>
             </a:r>
             <a:r>
               <a:rPr lang="pt-BR" sz="2000" dirty="0">
                 <a:latin typeface="Times New Roman" panose="02020603050405020304" pitchFamily="18" charset="0"/>
                 <a:cs typeface="Times New Roman" panose="02020603050405020304" pitchFamily="18" charset="0"/>
               </a:rPr>
-              <a:t>.</a:t>
+              <a:t>; </a:t>
+            </a:r>
+            <a:r>
+              <a:rPr lang="pt-BR" sz="2000" b="1" dirty="0">
+                <a:latin typeface="Times New Roman" panose="02020603050405020304" pitchFamily="18" charset="0"/>
+                <a:cs typeface="Times New Roman" panose="02020603050405020304" pitchFamily="18" charset="0"/>
+              </a:rPr>
+              <a:t>Mutáveis</a:t>
+            </a:r>
+            <a:r>
+              <a:rPr lang="pt-BR" sz="2000" dirty="0">
+                <a:latin typeface="Times New Roman" panose="02020603050405020304" pitchFamily="18" charset="0"/>
+                <a:cs typeface="Times New Roman" panose="02020603050405020304" pitchFamily="18" charset="0"/>
+              </a:rPr>
+              <a:t>; </a:t>
+            </a:r>
+            <a:r>
+              <a:rPr lang="pt-BR" sz="2000" b="1" dirty="0">
+                <a:solidFill>
+                  <a:srgbClr val="FF0000"/>
+                </a:solidFill>
+                <a:latin typeface="Times New Roman" panose="02020603050405020304" pitchFamily="18" charset="0"/>
+                <a:cs typeface="Times New Roman" panose="02020603050405020304" pitchFamily="18" charset="0"/>
+              </a:rPr>
+              <a:t>Não indexadas</a:t>
+            </a:r>
+            <a:r>
+              <a:rPr lang="pt-BR" sz="2000" dirty="0">
+                <a:latin typeface="Times New Roman" panose="02020603050405020304" pitchFamily="18" charset="0"/>
+                <a:cs typeface="Times New Roman" panose="02020603050405020304" pitchFamily="18" charset="0"/>
+              </a:rPr>
+              <a:t>; </a:t>
+            </a:r>
+            <a:r>
+              <a:rPr lang="pt-BR" sz="2000" b="1" dirty="0">
+                <a:latin typeface="Times New Roman" panose="02020603050405020304" pitchFamily="18" charset="0"/>
+                <a:cs typeface="Times New Roman" panose="02020603050405020304" pitchFamily="18" charset="0"/>
+              </a:rPr>
+              <a:t>não permitem elementos repetidos</a:t>
+            </a:r>
+            <a:r>
+              <a:rPr lang="pt-BR" sz="2000" dirty="0">
+                <a:latin typeface="Times New Roman" panose="02020603050405020304" pitchFamily="18" charset="0"/>
+                <a:cs typeface="Times New Roman" panose="02020603050405020304" pitchFamily="18" charset="0"/>
+              </a:rPr>
+              <a:t>. </a:t>
             </a:r>
           </a:p>
           <a:p>
@@ -11901,7 +12080,7 @@
                 <a:latin typeface="Times New Roman" panose="02020603050405020304" pitchFamily="18" charset="0"/>
                 <a:cs typeface="Times New Roman" panose="02020603050405020304" pitchFamily="18" charset="0"/>
               </a:rPr>
-              <a:t>= {1, 2, 3, 4}; </a:t>
+              <a:t>= {1, 2, 3, 4};</a:t>
             </a:r>
           </a:p>
           <a:p>
@@ -12033,7 +12212,12 @@
             <p:ph type="title"/>
           </p:nvPr>
         </p:nvSpPr>
-        <p:spPr/>
+        <p:spPr>
+          <a:xfrm>
+            <a:off x="270164" y="603390"/>
+            <a:ext cx="8020977" cy="786926"/>
+          </a:xfrm>
+        </p:spPr>
         <p:txBody>
           <a:bodyPr>
             <a:normAutofit/>
@@ -12041,12 +12225,20 @@
           <a:lstStyle/>
           <a:p>
             <a:r>
+              <a:rPr lang="en-US" b="1" dirty="0">
+                <a:solidFill>
+                  <a:srgbClr val="0070C0"/>
+                </a:solidFill>
+              </a:rPr>
+              <a:t>Python – </a:t>
+            </a:r>
+            <a:r>
               <a:rPr lang="en-US" b="1" dirty="0" err="1">
                 <a:solidFill>
                   <a:srgbClr val="0070C0"/>
                 </a:solidFill>
               </a:rPr>
-              <a:t>Leitura</a:t>
+              <a:t>TDados</a:t>
             </a:r>
             <a:r>
               <a:rPr lang="en-US" b="1" dirty="0">
@@ -12062,7 +12254,23 @@
                   <a:srgbClr val="0070C0"/>
                 </a:solidFill>
               </a:rPr>
-              <a:t>Específica</a:t>
+              <a:t>Aglomerados</a:t>
+            </a:r>
+            <a:r>
+              <a:rPr lang="en-US" b="1" dirty="0">
+                <a:solidFill>
+                  <a:srgbClr val="0070C0"/>
+                </a:solidFill>
+              </a:rPr>
+              <a:t> </a:t>
+            </a:r>
+            <a:r>
+              <a:rPr lang="en-US" b="1" dirty="0" err="1">
+                <a:solidFill>
+                  <a:srgbClr val="0070C0"/>
+                </a:solidFill>
+              </a:rPr>
+              <a:t>DicIONÁRIO</a:t>
             </a:r>
             <a:endParaRPr lang="en-US" b="1" dirty="0">
               <a:solidFill>
@@ -12084,8 +12292,8 @@
         </p:nvSpPr>
         <p:spPr>
           <a:xfrm>
-            <a:off x="142865" y="1200151"/>
-            <a:ext cx="8865056" cy="3394472"/>
+            <a:off x="142865" y="1200150"/>
+            <a:ext cx="8865056" cy="3737370"/>
           </a:xfrm>
         </p:spPr>
         <p:txBody>
@@ -12094,125 +12302,327 @@
           </a:bodyPr>
           <a:lstStyle/>
           <a:p>
+            <a:pPr algn="just">
+              <a:buFont typeface="Wingdings" panose="05000000000000000000" pitchFamily="2" charset="2"/>
+              <a:buChar char="§"/>
+            </a:pPr>
+            <a:r>
+              <a:rPr lang="pt-BR" sz="2000" b="1" dirty="0">
+                <a:solidFill>
+                  <a:srgbClr val="FF0000"/>
+                </a:solidFill>
+                <a:latin typeface="Times New Roman" panose="02020603050405020304" pitchFamily="18" charset="0"/>
+                <a:cs typeface="Times New Roman" panose="02020603050405020304" pitchFamily="18" charset="0"/>
+              </a:rPr>
+              <a:t> </a:t>
+            </a:r>
+            <a:r>
+              <a:rPr lang="pt-BR" b="1" dirty="0">
+                <a:latin typeface="Times New Roman" panose="02020603050405020304" pitchFamily="18" charset="0"/>
+                <a:cs typeface="Times New Roman" panose="02020603050405020304" pitchFamily="18" charset="0"/>
+              </a:rPr>
+              <a:t>Dicionários</a:t>
+            </a:r>
+            <a:r>
+              <a:rPr lang="pt-BR" sz="2000" dirty="0">
+                <a:latin typeface="Times New Roman" panose="02020603050405020304" pitchFamily="18" charset="0"/>
+                <a:cs typeface="Times New Roman" panose="02020603050405020304" pitchFamily="18" charset="0"/>
+              </a:rPr>
+              <a:t> </a:t>
+            </a:r>
+          </a:p>
+          <a:p>
             <a:pPr marL="0" indent="0" algn="just">
               <a:buNone/>
             </a:pPr>
-            <a:endParaRPr lang="pt-BR" dirty="0">
+            <a:r>
+              <a:rPr lang="pt-BR" sz="2000" dirty="0">
+                <a:latin typeface="Times New Roman" panose="02020603050405020304" pitchFamily="18" charset="0"/>
+                <a:cs typeface="Times New Roman" panose="02020603050405020304" pitchFamily="18" charset="0"/>
+              </a:rPr>
+              <a:t>São estruturas Python, utilizadas para representar coleções que guarda valores </a:t>
+            </a:r>
+            <a:r>
+              <a:rPr lang="pt-BR" sz="2000" b="1" dirty="0">
+                <a:latin typeface="Times New Roman" panose="02020603050405020304" pitchFamily="18" charset="0"/>
+                <a:cs typeface="Times New Roman" panose="02020603050405020304" pitchFamily="18" charset="0"/>
+              </a:rPr>
+              <a:t>multidimensionais</a:t>
+            </a:r>
+            <a:r>
+              <a:rPr lang="pt-BR" sz="2000" dirty="0">
+                <a:latin typeface="Times New Roman" panose="02020603050405020304" pitchFamily="18" charset="0"/>
+                <a:cs typeface="Times New Roman" panose="02020603050405020304" pitchFamily="18" charset="0"/>
+              </a:rPr>
+              <a:t> </a:t>
+            </a:r>
+            <a:r>
+              <a:rPr lang="pt-BR" sz="2000" b="1" dirty="0">
+                <a:solidFill>
+                  <a:srgbClr val="FF0000"/>
+                </a:solidFill>
+                <a:latin typeface="Times New Roman" panose="02020603050405020304" pitchFamily="18" charset="0"/>
+                <a:cs typeface="Times New Roman" panose="02020603050405020304" pitchFamily="18" charset="0"/>
+              </a:rPr>
+              <a:t>para cada índice</a:t>
+            </a:r>
+            <a:r>
+              <a:rPr lang="pt-BR" sz="2000" dirty="0">
+                <a:latin typeface="Times New Roman" panose="02020603050405020304" pitchFamily="18" charset="0"/>
+                <a:cs typeface="Times New Roman" panose="02020603050405020304" pitchFamily="18" charset="0"/>
+              </a:rPr>
+              <a:t>. É um dicionário de chaves (termos) que estão associadas a valores (significados dos termos). </a:t>
+            </a:r>
+          </a:p>
+          <a:p>
+            <a:pPr marL="0" indent="0" algn="just">
+              <a:buNone/>
+            </a:pPr>
+            <a:r>
+              <a:rPr lang="pt-BR" sz="2000" b="1" dirty="0">
+                <a:latin typeface="Times New Roman" panose="02020603050405020304" pitchFamily="18" charset="0"/>
+                <a:cs typeface="Times New Roman" panose="02020603050405020304" pitchFamily="18" charset="0"/>
+              </a:rPr>
+              <a:t>Nota</a:t>
+            </a:r>
+            <a:r>
+              <a:rPr lang="pt-BR" sz="2000" dirty="0">
+                <a:latin typeface="Times New Roman" panose="02020603050405020304" pitchFamily="18" charset="0"/>
+                <a:cs typeface="Times New Roman" panose="02020603050405020304" pitchFamily="18" charset="0"/>
+              </a:rPr>
+              <a:t>: </a:t>
+            </a:r>
+            <a:r>
+              <a:rPr lang="pt-BR" sz="2000" b="1" dirty="0">
+                <a:solidFill>
+                  <a:srgbClr val="FF0000"/>
+                </a:solidFill>
+                <a:latin typeface="Times New Roman" panose="02020603050405020304" pitchFamily="18" charset="0"/>
+                <a:cs typeface="Times New Roman" panose="02020603050405020304" pitchFamily="18" charset="0"/>
+              </a:rPr>
+              <a:t>Métodos</a:t>
+            </a:r>
+            <a:r>
+              <a:rPr lang="pt-BR" sz="2000" dirty="0">
+                <a:latin typeface="Times New Roman" panose="02020603050405020304" pitchFamily="18" charset="0"/>
+                <a:cs typeface="Times New Roman" panose="02020603050405020304" pitchFamily="18" charset="0"/>
+              </a:rPr>
+              <a:t>: </a:t>
+            </a:r>
+            <a:r>
+              <a:rPr lang="pt-BR" sz="2000" dirty="0" err="1">
+                <a:latin typeface="Times New Roman" panose="02020603050405020304" pitchFamily="18" charset="0"/>
+                <a:cs typeface="Times New Roman" panose="02020603050405020304" pitchFamily="18" charset="0"/>
+              </a:rPr>
+              <a:t>dic.</a:t>
+            </a:r>
+            <a:r>
+              <a:rPr lang="pt-BR" sz="2000" b="1" dirty="0" err="1">
+                <a:latin typeface="Times New Roman" panose="02020603050405020304" pitchFamily="18" charset="0"/>
+                <a:cs typeface="Times New Roman" panose="02020603050405020304" pitchFamily="18" charset="0"/>
+              </a:rPr>
+              <a:t>get</a:t>
+            </a:r>
+            <a:r>
+              <a:rPr lang="pt-BR" sz="2000" dirty="0">
+                <a:latin typeface="Times New Roman" panose="02020603050405020304" pitchFamily="18" charset="0"/>
+                <a:cs typeface="Times New Roman" panose="02020603050405020304" pitchFamily="18" charset="0"/>
+              </a:rPr>
+              <a:t>(atributo), </a:t>
+            </a:r>
+            <a:r>
+              <a:rPr lang="pt-BR" sz="2000" dirty="0" err="1">
+                <a:latin typeface="Times New Roman" panose="02020603050405020304" pitchFamily="18" charset="0"/>
+                <a:cs typeface="Times New Roman" panose="02020603050405020304" pitchFamily="18" charset="0"/>
+              </a:rPr>
+              <a:t>dic.</a:t>
+            </a:r>
+            <a:r>
+              <a:rPr lang="pt-BR" sz="2000" b="1" dirty="0" err="1">
+                <a:latin typeface="Times New Roman" panose="02020603050405020304" pitchFamily="18" charset="0"/>
+                <a:cs typeface="Times New Roman" panose="02020603050405020304" pitchFamily="18" charset="0"/>
+              </a:rPr>
+              <a:t>keys</a:t>
+            </a:r>
+            <a:r>
+              <a:rPr lang="pt-BR" sz="2000" dirty="0">
+                <a:latin typeface="Times New Roman" panose="02020603050405020304" pitchFamily="18" charset="0"/>
+                <a:cs typeface="Times New Roman" panose="02020603050405020304" pitchFamily="18" charset="0"/>
+              </a:rPr>
+              <a:t>(); </a:t>
+            </a:r>
+            <a:r>
+              <a:rPr lang="pt-BR" sz="2000" dirty="0" err="1">
+                <a:latin typeface="Times New Roman" panose="02020603050405020304" pitchFamily="18" charset="0"/>
+                <a:cs typeface="Times New Roman" panose="02020603050405020304" pitchFamily="18" charset="0"/>
+              </a:rPr>
+              <a:t>dic.</a:t>
+            </a:r>
+            <a:r>
+              <a:rPr lang="pt-BR" sz="2000" b="1" dirty="0" err="1">
+                <a:latin typeface="Times New Roman" panose="02020603050405020304" pitchFamily="18" charset="0"/>
+                <a:cs typeface="Times New Roman" panose="02020603050405020304" pitchFamily="18" charset="0"/>
+              </a:rPr>
+              <a:t>values</a:t>
+            </a:r>
+            <a:r>
+              <a:rPr lang="pt-BR" sz="2000" dirty="0">
+                <a:latin typeface="Times New Roman" panose="02020603050405020304" pitchFamily="18" charset="0"/>
+                <a:cs typeface="Times New Roman" panose="02020603050405020304" pitchFamily="18" charset="0"/>
+              </a:rPr>
+              <a:t>(); </a:t>
+            </a:r>
+            <a:r>
+              <a:rPr lang="pt-BR" sz="2000" b="1" dirty="0">
+                <a:latin typeface="Times New Roman" panose="02020603050405020304" pitchFamily="18" charset="0"/>
+                <a:cs typeface="Times New Roman" panose="02020603050405020304" pitchFamily="18" charset="0"/>
+              </a:rPr>
+              <a:t>update; pop; </a:t>
+            </a:r>
+            <a:r>
+              <a:rPr lang="pt-BR" sz="2000" b="1" dirty="0" err="1">
+                <a:latin typeface="Times New Roman" panose="02020603050405020304" pitchFamily="18" charset="0"/>
+                <a:cs typeface="Times New Roman" panose="02020603050405020304" pitchFamily="18" charset="0"/>
+              </a:rPr>
+              <a:t>len</a:t>
+            </a:r>
+            <a:r>
+              <a:rPr lang="pt-BR" sz="2000" b="1" dirty="0">
+                <a:latin typeface="Times New Roman" panose="02020603050405020304" pitchFamily="18" charset="0"/>
+                <a:cs typeface="Times New Roman" panose="02020603050405020304" pitchFamily="18" charset="0"/>
+              </a:rPr>
+              <a:t>, etc</a:t>
+            </a:r>
+            <a:r>
+              <a:rPr lang="pt-BR" sz="2000" dirty="0">
+                <a:latin typeface="Times New Roman" panose="02020603050405020304" pitchFamily="18" charset="0"/>
+                <a:cs typeface="Times New Roman" panose="02020603050405020304" pitchFamily="18" charset="0"/>
+              </a:rPr>
+              <a:t>.</a:t>
+            </a:r>
+          </a:p>
+          <a:p>
+            <a:pPr marL="0" indent="0" algn="just">
+              <a:buNone/>
+            </a:pPr>
+            <a:r>
+              <a:rPr lang="da-DK" sz="2000" b="1" dirty="0">
+                <a:latin typeface="Times New Roman" panose="02020603050405020304" pitchFamily="18" charset="0"/>
+                <a:cs typeface="Times New Roman" panose="02020603050405020304" pitchFamily="18" charset="0"/>
+              </a:rPr>
+              <a:t>dicAlu = </a:t>
+            </a:r>
+            <a:r>
+              <a:rPr lang="da-DK" sz="2000" dirty="0">
+                <a:latin typeface="Times New Roman" panose="02020603050405020304" pitchFamily="18" charset="0"/>
+                <a:cs typeface="Times New Roman" panose="02020603050405020304" pitchFamily="18" charset="0"/>
+              </a:rPr>
+              <a:t>{‘nome’: ‘Julila’, ‘idade’:17, ‘disciplina’:[‘java’, ‘python’], ‘altura’:1.55};</a:t>
+            </a:r>
+          </a:p>
+          <a:p>
+            <a:pPr marL="0" indent="0" algn="just">
+              <a:buNone/>
+            </a:pPr>
+            <a:r>
+              <a:rPr lang="en-US" sz="2000" b="1" dirty="0">
+                <a:latin typeface="Times New Roman" panose="02020603050405020304" pitchFamily="18" charset="0"/>
+                <a:cs typeface="Times New Roman" panose="02020603050405020304" pitchFamily="18" charset="0"/>
+              </a:rPr>
+              <a:t>for</a:t>
+            </a:r>
+            <a:r>
+              <a:rPr lang="en-US" sz="2000" dirty="0">
+                <a:latin typeface="Times New Roman" panose="02020603050405020304" pitchFamily="18" charset="0"/>
+                <a:cs typeface="Times New Roman" panose="02020603050405020304" pitchFamily="18" charset="0"/>
+              </a:rPr>
+              <a:t> key </a:t>
+            </a:r>
+            <a:r>
+              <a:rPr lang="en-US" sz="2000" b="1" dirty="0">
+                <a:latin typeface="Times New Roman" panose="02020603050405020304" pitchFamily="18" charset="0"/>
+                <a:cs typeface="Times New Roman" panose="02020603050405020304" pitchFamily="18" charset="0"/>
+              </a:rPr>
+              <a:t>in</a:t>
+            </a:r>
+            <a:r>
+              <a:rPr lang="en-US" sz="2000" dirty="0">
+                <a:latin typeface="Times New Roman" panose="02020603050405020304" pitchFamily="18" charset="0"/>
+                <a:cs typeface="Times New Roman" panose="02020603050405020304" pitchFamily="18" charset="0"/>
+              </a:rPr>
+              <a:t> </a:t>
+            </a:r>
+            <a:r>
+              <a:rPr lang="en-US" sz="2000" dirty="0" err="1">
+                <a:latin typeface="Times New Roman" panose="02020603050405020304" pitchFamily="18" charset="0"/>
+                <a:cs typeface="Times New Roman" panose="02020603050405020304" pitchFamily="18" charset="0"/>
+              </a:rPr>
+              <a:t>dicAlu</a:t>
+            </a:r>
+            <a:r>
+              <a:rPr lang="en-US" sz="2000" dirty="0">
+                <a:latin typeface="Times New Roman" panose="02020603050405020304" pitchFamily="18" charset="0"/>
+                <a:cs typeface="Times New Roman" panose="02020603050405020304" pitchFamily="18" charset="0"/>
+              </a:rPr>
+              <a:t>[</a:t>
+            </a:r>
+            <a:r>
+              <a:rPr lang="en-US" sz="2000" dirty="0" err="1">
+                <a:latin typeface="Times New Roman" panose="02020603050405020304" pitchFamily="18" charset="0"/>
+                <a:cs typeface="Times New Roman" panose="02020603050405020304" pitchFamily="18" charset="0"/>
+              </a:rPr>
+              <a:t>i</a:t>
+            </a:r>
+            <a:r>
+              <a:rPr lang="en-US" sz="2000" dirty="0">
+                <a:latin typeface="Times New Roman" panose="02020603050405020304" pitchFamily="18" charset="0"/>
+                <a:cs typeface="Times New Roman" panose="02020603050405020304" pitchFamily="18" charset="0"/>
+              </a:rPr>
+              <a:t>].</a:t>
+            </a:r>
+            <a:r>
+              <a:rPr lang="en-US" sz="2000" b="1" dirty="0">
+                <a:latin typeface="Times New Roman" panose="02020603050405020304" pitchFamily="18" charset="0"/>
+                <a:cs typeface="Times New Roman" panose="02020603050405020304" pitchFamily="18" charset="0"/>
+              </a:rPr>
+              <a:t>keys</a:t>
+            </a:r>
+            <a:r>
+              <a:rPr lang="en-US" sz="2000" dirty="0">
+                <a:latin typeface="Times New Roman" panose="02020603050405020304" pitchFamily="18" charset="0"/>
+                <a:cs typeface="Times New Roman" panose="02020603050405020304" pitchFamily="18" charset="0"/>
+              </a:rPr>
+              <a:t>():</a:t>
+            </a:r>
+          </a:p>
+          <a:p>
+            <a:pPr marL="0" indent="0" algn="just">
+              <a:buNone/>
+            </a:pPr>
+            <a:r>
+              <a:rPr lang="en-US" sz="2000" dirty="0">
+                <a:latin typeface="Times New Roman" panose="02020603050405020304" pitchFamily="18" charset="0"/>
+                <a:cs typeface="Times New Roman" panose="02020603050405020304" pitchFamily="18" charset="0"/>
+              </a:rPr>
+              <a:t>       </a:t>
+            </a:r>
+            <a:r>
+              <a:rPr lang="en-US" sz="2000" b="1" dirty="0">
+                <a:latin typeface="Times New Roman" panose="02020603050405020304" pitchFamily="18" charset="0"/>
+                <a:cs typeface="Times New Roman" panose="02020603050405020304" pitchFamily="18" charset="0"/>
+              </a:rPr>
+              <a:t>print</a:t>
+            </a:r>
+            <a:r>
+              <a:rPr lang="en-US" sz="2000" dirty="0">
+                <a:latin typeface="Times New Roman" panose="02020603050405020304" pitchFamily="18" charset="0"/>
+                <a:cs typeface="Times New Roman" panose="02020603050405020304" pitchFamily="18" charset="0"/>
+              </a:rPr>
+              <a:t>(key, end = ' ')</a:t>
+            </a:r>
+            <a:endParaRPr lang="pt-BR" sz="2000" dirty="0">
               <a:latin typeface="Times New Roman" panose="02020603050405020304" pitchFamily="18" charset="0"/>
               <a:cs typeface="Times New Roman" panose="02020603050405020304" pitchFamily="18" charset="0"/>
-            </a:endParaRPr>
-          </a:p>
-          <a:p>
-            <a:pPr marL="0" indent="0" algn="just">
-              <a:buNone/>
-            </a:pPr>
-            <a:r>
-              <a:rPr lang="pt-BR" dirty="0">
-                <a:latin typeface="Times New Roman" panose="02020603050405020304" pitchFamily="18" charset="0"/>
-                <a:cs typeface="Times New Roman" panose="02020603050405020304" pitchFamily="18" charset="0"/>
-              </a:rPr>
-              <a:t>[1] Site:</a:t>
-            </a:r>
-          </a:p>
-          <a:p>
-            <a:pPr marL="0" indent="0" algn="just">
-              <a:buNone/>
-            </a:pPr>
-            <a:r>
-              <a:rPr lang="pt-BR" dirty="0">
-                <a:latin typeface="Times New Roman" panose="02020603050405020304" pitchFamily="18" charset="0"/>
-                <a:cs typeface="Times New Roman" panose="02020603050405020304" pitchFamily="18" charset="0"/>
-              </a:rPr>
-              <a:t> </a:t>
-            </a:r>
-            <a:r>
-              <a:rPr lang="pt-BR" dirty="0">
-                <a:latin typeface="Times New Roman" panose="02020603050405020304" pitchFamily="18" charset="0"/>
-                <a:cs typeface="Times New Roman" panose="02020603050405020304" pitchFamily="18" charset="0"/>
-                <a:hlinkClick r:id="rId3"/>
-              </a:rPr>
-              <a:t>https://www.w3schools.com/python/python_variables.asp</a:t>
-            </a:r>
-            <a:endParaRPr lang="pt-BR" dirty="0">
-              <a:latin typeface="Times New Roman" panose="02020603050405020304" pitchFamily="18" charset="0"/>
-              <a:cs typeface="Times New Roman" panose="02020603050405020304" pitchFamily="18" charset="0"/>
-            </a:endParaRPr>
-          </a:p>
-          <a:p>
-            <a:pPr marL="0" indent="0" algn="just">
-              <a:buNone/>
-            </a:pPr>
-            <a:endParaRPr lang="pt-BR" dirty="0">
-              <a:latin typeface="Times New Roman" panose="02020603050405020304" pitchFamily="18" charset="0"/>
-              <a:cs typeface="Times New Roman" panose="02020603050405020304" pitchFamily="18" charset="0"/>
-            </a:endParaRPr>
-          </a:p>
-          <a:p>
-            <a:pPr marL="0" indent="0" algn="just">
-              <a:buNone/>
-            </a:pPr>
-            <a:r>
-              <a:rPr lang="pt-BR" dirty="0">
-                <a:latin typeface="Times New Roman" panose="02020603050405020304" pitchFamily="18" charset="0"/>
-                <a:cs typeface="Times New Roman" panose="02020603050405020304" pitchFamily="18" charset="0"/>
-              </a:rPr>
-              <a:t>[2] Site: </a:t>
-            </a:r>
-            <a:r>
-              <a:rPr lang="pt-BR" dirty="0">
-                <a:latin typeface="Times New Roman" panose="02020603050405020304" pitchFamily="18" charset="0"/>
-                <a:cs typeface="Times New Roman" panose="02020603050405020304" pitchFamily="18" charset="0"/>
-                <a:hlinkClick r:id="rId4"/>
-              </a:rPr>
-              <a:t>https://docs.python.org/pt-br/3/tutorial/</a:t>
-            </a:r>
-            <a:endParaRPr lang="pt-BR" dirty="0">
-              <a:latin typeface="Times New Roman" panose="02020603050405020304" pitchFamily="18" charset="0"/>
-              <a:cs typeface="Times New Roman" panose="02020603050405020304" pitchFamily="18" charset="0"/>
-            </a:endParaRPr>
-          </a:p>
-          <a:p>
-            <a:pPr marL="0" indent="0" algn="just">
-              <a:buNone/>
-            </a:pPr>
-            <a:endParaRPr lang="pt-BR" dirty="0">
-              <a:latin typeface="Times New Roman" panose="02020603050405020304" pitchFamily="18" charset="0"/>
-              <a:cs typeface="Times New Roman" panose="02020603050405020304" pitchFamily="18" charset="0"/>
-            </a:endParaRPr>
-          </a:p>
-          <a:p>
-            <a:pPr marL="0" indent="0" algn="just">
-              <a:buNone/>
-            </a:pPr>
-            <a:endParaRPr lang="pt-BR" dirty="0">
-              <a:latin typeface="Times New Roman" panose="02020603050405020304" pitchFamily="18" charset="0"/>
-              <a:cs typeface="Times New Roman" panose="02020603050405020304" pitchFamily="18" charset="0"/>
-            </a:endParaRPr>
-          </a:p>
-          <a:p>
-            <a:pPr marL="0" indent="0" algn="just">
-              <a:buNone/>
-            </a:pPr>
-            <a:endParaRPr lang="pt-BR" dirty="0">
-              <a:latin typeface="Times New Roman" panose="02020603050405020304" pitchFamily="18" charset="0"/>
-              <a:cs typeface="Times New Roman" panose="02020603050405020304" pitchFamily="18" charset="0"/>
-            </a:endParaRPr>
-          </a:p>
-          <a:p>
-            <a:pPr marL="0" indent="0" algn="just">
-              <a:buNone/>
-            </a:pPr>
-            <a:endParaRPr lang="pt-BR" dirty="0">
-              <a:latin typeface="Times New Roman" panose="02020603050405020304" pitchFamily="18" charset="0"/>
-              <a:cs typeface="Times New Roman" panose="02020603050405020304" pitchFamily="18" charset="0"/>
-            </a:endParaRPr>
-          </a:p>
-          <a:p>
-            <a:pPr marL="0" indent="0" algn="just">
-              <a:buNone/>
-            </a:pPr>
-            <a:endParaRPr lang="pt-BR" dirty="0">
-              <a:latin typeface="Calibri" panose="020F0502020204030204" pitchFamily="34" charset="0"/>
             </a:endParaRPr>
           </a:p>
         </p:txBody>
@@ -12220,7 +12630,7 @@
     </p:spTree>
     <p:extLst>
       <p:ext uri="{BB962C8B-B14F-4D97-AF65-F5344CB8AC3E}">
-        <p14:creationId xmlns:p14="http://schemas.microsoft.com/office/powerpoint/2010/main" val="2747596967"/>
+        <p14:creationId xmlns:p14="http://schemas.microsoft.com/office/powerpoint/2010/main" val="3410658428"/>
       </p:ext>
     </p:extLst>
   </p:cSld>
@@ -12271,7 +12681,7 @@
                   <a:srgbClr val="0070C0"/>
                 </a:solidFill>
               </a:rPr>
-              <a:t>Aprenda</a:t>
+              <a:t>Leitura</a:t>
             </a:r>
             <a:r>
               <a:rPr lang="en-US" b="1" dirty="0">
@@ -12279,8 +12689,21 @@
                   <a:srgbClr val="0070C0"/>
                 </a:solidFill>
               </a:rPr>
-              <a:t>+</a:t>
-            </a:r>
+              <a:t> </a:t>
+            </a:r>
+            <a:r>
+              <a:rPr lang="en-US" b="1" dirty="0" err="1">
+                <a:solidFill>
+                  <a:srgbClr val="0070C0"/>
+                </a:solidFill>
+              </a:rPr>
+              <a:t>Específica</a:t>
+            </a:r>
+            <a:endParaRPr lang="en-US" b="1" dirty="0">
+              <a:solidFill>
+                <a:srgbClr val="0070C0"/>
+              </a:solidFill>
+            </a:endParaRPr>
           </a:p>
         </p:txBody>
       </p:sp>
@@ -12309,7 +12732,7 @@
             <a:pPr marL="0" indent="0" algn="just">
               <a:buNone/>
             </a:pPr>
-            <a:endParaRPr lang="pt-BR" sz="2000" dirty="0">
+            <a:endParaRPr lang="pt-BR" dirty="0">
               <a:latin typeface="Times New Roman" panose="02020603050405020304" pitchFamily="18" charset="0"/>
               <a:cs typeface="Times New Roman" panose="02020603050405020304" pitchFamily="18" charset="0"/>
             </a:endParaRPr>
@@ -12319,21 +12742,33 @@
               <a:buNone/>
             </a:pPr>
             <a:r>
-              <a:rPr lang="pt-BR" sz="2000" dirty="0">
-                <a:latin typeface="Times New Roman" panose="02020603050405020304" pitchFamily="18" charset="0"/>
-                <a:cs typeface="Times New Roman" panose="02020603050405020304" pitchFamily="18" charset="0"/>
-              </a:rPr>
-              <a:t>[1] </a:t>
-            </a:r>
-            <a:r>
-              <a:rPr lang="pt-BR" sz="2000" dirty="0">
+              <a:rPr lang="pt-BR" dirty="0">
+                <a:latin typeface="Times New Roman" panose="02020603050405020304" pitchFamily="18" charset="0"/>
+                <a:cs typeface="Times New Roman" panose="02020603050405020304" pitchFamily="18" charset="0"/>
+              </a:rPr>
+              <a:t>[1] Site:</a:t>
+            </a:r>
+          </a:p>
+          <a:p>
+            <a:pPr marL="0" indent="0" algn="just">
+              <a:buNone/>
+            </a:pPr>
+            <a:r>
+              <a:rPr lang="pt-BR" dirty="0">
+                <a:latin typeface="Times New Roman" panose="02020603050405020304" pitchFamily="18" charset="0"/>
+                <a:cs typeface="Times New Roman" panose="02020603050405020304" pitchFamily="18" charset="0"/>
+              </a:rPr>
+              <a:t> </a:t>
+            </a:r>
+            <a:r>
+              <a:rPr lang="pt-BR" dirty="0">
                 <a:latin typeface="Times New Roman" panose="02020603050405020304" pitchFamily="18" charset="0"/>
                 <a:cs typeface="Times New Roman" panose="02020603050405020304" pitchFamily="18" charset="0"/>
                 <a:hlinkClick r:id="rId3"/>
               </a:rPr>
-              <a:t>https://www.programiz.com/python-programming/variables-constants-literals</a:t>
-            </a:r>
-            <a:endParaRPr lang="pt-BR" sz="2000" dirty="0">
+              <a:t>https://www.w3schools.com/python/python_variables.asp</a:t>
+            </a:r>
+            <a:endParaRPr lang="pt-BR" dirty="0">
               <a:latin typeface="Times New Roman" panose="02020603050405020304" pitchFamily="18" charset="0"/>
               <a:cs typeface="Times New Roman" panose="02020603050405020304" pitchFamily="18" charset="0"/>
             </a:endParaRPr>
@@ -12342,7 +12777,7 @@
             <a:pPr marL="0" indent="0" algn="just">
               <a:buNone/>
             </a:pPr>
-            <a:endParaRPr lang="pt-BR" sz="2000" dirty="0">
+            <a:endParaRPr lang="pt-BR" dirty="0">
               <a:latin typeface="Times New Roman" panose="02020603050405020304" pitchFamily="18" charset="0"/>
               <a:cs typeface="Times New Roman" panose="02020603050405020304" pitchFamily="18" charset="0"/>
             </a:endParaRPr>
@@ -12352,21 +12787,21 @@
               <a:buNone/>
             </a:pPr>
             <a:r>
-              <a:rPr lang="pt-BR" sz="2000" dirty="0">
-                <a:latin typeface="Times New Roman" panose="02020603050405020304" pitchFamily="18" charset="0"/>
-                <a:cs typeface="Times New Roman" panose="02020603050405020304" pitchFamily="18" charset="0"/>
-              </a:rPr>
-              <a:t>[2] </a:t>
-            </a:r>
-            <a:r>
-              <a:rPr lang="pt-BR" sz="2000" dirty="0">
+              <a:rPr lang="pt-BR" dirty="0">
+                <a:latin typeface="Times New Roman" panose="02020603050405020304" pitchFamily="18" charset="0"/>
+                <a:cs typeface="Times New Roman" panose="02020603050405020304" pitchFamily="18" charset="0"/>
+              </a:rPr>
+              <a:t>[2] Site: </a:t>
+            </a:r>
+            <a:r>
+              <a:rPr lang="pt-BR" dirty="0">
                 <a:latin typeface="Times New Roman" panose="02020603050405020304" pitchFamily="18" charset="0"/>
                 <a:cs typeface="Times New Roman" panose="02020603050405020304" pitchFamily="18" charset="0"/>
                 <a:hlinkClick r:id="rId4"/>
               </a:rPr>
-              <a:t>https://www.programiz.com/python-programming/examples/swap-variables</a:t>
-            </a:r>
-            <a:endParaRPr lang="pt-BR" sz="2000" dirty="0">
+              <a:t>https://docs.python.org/pt-br/3/tutorial/</a:t>
+            </a:r>
+            <a:endParaRPr lang="pt-BR" dirty="0">
               <a:latin typeface="Times New Roman" panose="02020603050405020304" pitchFamily="18" charset="0"/>
               <a:cs typeface="Times New Roman" panose="02020603050405020304" pitchFamily="18" charset="0"/>
             </a:endParaRPr>
@@ -12375,7 +12810,7 @@
             <a:pPr marL="0" indent="0" algn="just">
               <a:buNone/>
             </a:pPr>
-            <a:endParaRPr lang="pt-BR" sz="2000" dirty="0">
+            <a:endParaRPr lang="pt-BR" dirty="0">
               <a:latin typeface="Times New Roman" panose="02020603050405020304" pitchFamily="18" charset="0"/>
               <a:cs typeface="Times New Roman" panose="02020603050405020304" pitchFamily="18" charset="0"/>
             </a:endParaRPr>
@@ -12384,48 +12819,7 @@
             <a:pPr marL="0" indent="0" algn="just">
               <a:buNone/>
             </a:pPr>
-            <a:r>
-              <a:rPr lang="pt-BR" sz="2000" dirty="0">
-                <a:latin typeface="Times New Roman" panose="02020603050405020304" pitchFamily="18" charset="0"/>
-                <a:cs typeface="Times New Roman" panose="02020603050405020304" pitchFamily="18" charset="0"/>
-              </a:rPr>
-              <a:t>- </a:t>
-            </a:r>
-            <a:r>
-              <a:rPr lang="pt-BR" sz="2000" dirty="0" err="1">
-                <a:latin typeface="Times New Roman" panose="02020603050405020304" pitchFamily="18" charset="0"/>
-                <a:cs typeface="Times New Roman" panose="02020603050405020304" pitchFamily="18" charset="0"/>
-              </a:rPr>
-              <a:t>Tuplas</a:t>
-            </a:r>
-            <a:r>
-              <a:rPr lang="pt-BR" sz="2000" dirty="0">
-                <a:latin typeface="Times New Roman" panose="02020603050405020304" pitchFamily="18" charset="0"/>
-                <a:cs typeface="Times New Roman" panose="02020603050405020304" pitchFamily="18" charset="0"/>
-              </a:rPr>
-              <a:t> Nomeadas</a:t>
-            </a:r>
-          </a:p>
-          <a:p>
-            <a:pPr marL="0" indent="0" algn="just">
-              <a:buNone/>
-            </a:pPr>
-            <a:r>
-              <a:rPr lang="pt-BR" sz="2000" dirty="0">
-                <a:latin typeface="Times New Roman" panose="02020603050405020304" pitchFamily="18" charset="0"/>
-                <a:cs typeface="Times New Roman" panose="02020603050405020304" pitchFamily="18" charset="0"/>
-              </a:rPr>
-              <a:t>[3] </a:t>
-            </a:r>
-            <a:r>
-              <a:rPr lang="pt-BR" sz="2000" dirty="0">
-                <a:latin typeface="Times New Roman" panose="02020603050405020304" pitchFamily="18" charset="0"/>
-                <a:cs typeface="Times New Roman" panose="02020603050405020304" pitchFamily="18" charset="0"/>
-                <a:hlinkClick r:id="rId5"/>
-              </a:rPr>
-              <a:t>https://www.youtube.com/watch?v=IkoaXbLsUg8</a:t>
-            </a:r>
-            <a:endParaRPr lang="pt-BR" sz="2000" dirty="0">
+            <a:endParaRPr lang="pt-BR" dirty="0">
               <a:latin typeface="Times New Roman" panose="02020603050405020304" pitchFamily="18" charset="0"/>
               <a:cs typeface="Times New Roman" panose="02020603050405020304" pitchFamily="18" charset="0"/>
             </a:endParaRPr>
@@ -12434,7 +12828,7 @@
             <a:pPr marL="0" indent="0" algn="just">
               <a:buNone/>
             </a:pPr>
-            <a:endParaRPr lang="pt-BR" sz="2000" dirty="0">
+            <a:endParaRPr lang="pt-BR" dirty="0">
               <a:latin typeface="Times New Roman" panose="02020603050405020304" pitchFamily="18" charset="0"/>
               <a:cs typeface="Times New Roman" panose="02020603050405020304" pitchFamily="18" charset="0"/>
             </a:endParaRPr>
@@ -12443,7 +12837,7 @@
             <a:pPr marL="0" indent="0" algn="just">
               <a:buNone/>
             </a:pPr>
-            <a:endParaRPr lang="pt-BR" sz="2000" dirty="0">
+            <a:endParaRPr lang="pt-BR" dirty="0">
               <a:latin typeface="Times New Roman" panose="02020603050405020304" pitchFamily="18" charset="0"/>
               <a:cs typeface="Times New Roman" panose="02020603050405020304" pitchFamily="18" charset="0"/>
             </a:endParaRPr>
@@ -12452,7 +12846,7 @@
             <a:pPr marL="0" indent="0" algn="just">
               <a:buNone/>
             </a:pPr>
-            <a:endParaRPr lang="pt-BR" sz="2000" dirty="0">
+            <a:endParaRPr lang="pt-BR" dirty="0">
               <a:latin typeface="Calibri" panose="020F0502020204030204" pitchFamily="34" charset="0"/>
             </a:endParaRPr>
           </a:p>
@@ -12461,7 +12855,7 @@
     </p:spTree>
     <p:extLst>
       <p:ext uri="{BB962C8B-B14F-4D97-AF65-F5344CB8AC3E}">
-        <p14:creationId xmlns:p14="http://schemas.microsoft.com/office/powerpoint/2010/main" val="3680270425"/>
+        <p14:creationId xmlns:p14="http://schemas.microsoft.com/office/powerpoint/2010/main" val="2747596967"/>
       </p:ext>
     </p:extLst>
   </p:cSld>
@@ -12512,7 +12906,7 @@
                   <a:srgbClr val="0070C0"/>
                 </a:solidFill>
               </a:rPr>
-              <a:t>Dinâmica</a:t>
+              <a:t>Aprenda</a:t>
             </a:r>
             <a:r>
               <a:rPr lang="en-US" b="1" dirty="0">
@@ -12520,21 +12914,8 @@
                   <a:srgbClr val="0070C0"/>
                 </a:solidFill>
               </a:rPr>
-              <a:t>/</a:t>
-            </a:r>
-            <a:r>
-              <a:rPr lang="en-US" b="1" dirty="0" err="1">
-                <a:solidFill>
-                  <a:srgbClr val="0070C0"/>
-                </a:solidFill>
-              </a:rPr>
-              <a:t>Atividades</a:t>
-            </a:r>
-            <a:endParaRPr lang="en-US" b="1" dirty="0">
-              <a:solidFill>
-                <a:srgbClr val="0070C0"/>
-              </a:solidFill>
-            </a:endParaRPr>
+              <a:t>+</a:t>
+            </a:r>
           </a:p>
         </p:txBody>
       </p:sp>
@@ -12550,8 +12931,8 @@
         </p:nvSpPr>
         <p:spPr>
           <a:xfrm>
-            <a:off x="139472" y="1063230"/>
-            <a:ext cx="8865056" cy="3606305"/>
+            <a:off x="142865" y="1200151"/>
+            <a:ext cx="8865056" cy="3394472"/>
           </a:xfrm>
         </p:spPr>
         <p:txBody>
@@ -12560,36 +12941,162 @@
           </a:bodyPr>
           <a:lstStyle/>
           <a:p>
-            <a:pPr algn="just">
-              <a:buFontTx/>
-              <a:buChar char="-"/>
+            <a:pPr marL="0" indent="0" algn="just">
+              <a:buNone/>
             </a:pPr>
-            <a:r>
-              <a:rPr lang="pt-BR" dirty="0">
-                <a:latin typeface="Times New Roman" panose="02020603050405020304" pitchFamily="18" charset="0"/>
-                <a:cs typeface="Times New Roman" panose="02020603050405020304" pitchFamily="18" charset="0"/>
-              </a:rPr>
-              <a:t>Exercícios de Fixação</a:t>
-            </a:r>
+            <a:endParaRPr lang="pt-BR" sz="2000" dirty="0">
+              <a:latin typeface="Times New Roman" panose="02020603050405020304" pitchFamily="18" charset="0"/>
+              <a:cs typeface="Times New Roman" panose="02020603050405020304" pitchFamily="18" charset="0"/>
+            </a:endParaRPr>
           </a:p>
           <a:p>
             <a:pPr marL="0" indent="0" algn="just">
               <a:buNone/>
             </a:pPr>
             <a:r>
-              <a:rPr lang="pt-BR" dirty="0">
-                <a:latin typeface="Times New Roman" panose="02020603050405020304" pitchFamily="18" charset="0"/>
-                <a:cs typeface="Times New Roman" panose="02020603050405020304" pitchFamily="18" charset="0"/>
-              </a:rPr>
-              <a:t>	Desafios em Sala de Aula.</a:t>
-            </a:r>
+              <a:rPr lang="pt-BR" sz="2000" dirty="0">
+                <a:latin typeface="Times New Roman" panose="02020603050405020304" pitchFamily="18" charset="0"/>
+                <a:cs typeface="Times New Roman" panose="02020603050405020304" pitchFamily="18" charset="0"/>
+              </a:rPr>
+              <a:t>[1] </a:t>
+            </a:r>
+            <a:r>
+              <a:rPr lang="pt-BR" sz="2000" dirty="0">
+                <a:latin typeface="Times New Roman" panose="02020603050405020304" pitchFamily="18" charset="0"/>
+                <a:cs typeface="Times New Roman" panose="02020603050405020304" pitchFamily="18" charset="0"/>
+                <a:hlinkClick r:id="rId3"/>
+              </a:rPr>
+              <a:t>https://www.programiz.com/python-programming/variables-constants-literals</a:t>
+            </a:r>
+            <a:endParaRPr lang="pt-BR" sz="2000" dirty="0">
+              <a:latin typeface="Times New Roman" panose="02020603050405020304" pitchFamily="18" charset="0"/>
+              <a:cs typeface="Times New Roman" panose="02020603050405020304" pitchFamily="18" charset="0"/>
+            </a:endParaRPr>
+          </a:p>
+          <a:p>
+            <a:pPr marL="0" indent="0" algn="just">
+              <a:buNone/>
+            </a:pPr>
+            <a:endParaRPr lang="pt-BR" sz="2000" dirty="0">
+              <a:latin typeface="Times New Roman" panose="02020603050405020304" pitchFamily="18" charset="0"/>
+              <a:cs typeface="Times New Roman" panose="02020603050405020304" pitchFamily="18" charset="0"/>
+            </a:endParaRPr>
+          </a:p>
+          <a:p>
+            <a:pPr marL="0" indent="0" algn="just">
+              <a:buNone/>
+            </a:pPr>
+            <a:r>
+              <a:rPr lang="pt-BR" sz="2000" dirty="0">
+                <a:latin typeface="Times New Roman" panose="02020603050405020304" pitchFamily="18" charset="0"/>
+                <a:cs typeface="Times New Roman" panose="02020603050405020304" pitchFamily="18" charset="0"/>
+              </a:rPr>
+              <a:t>[2] </a:t>
+            </a:r>
+            <a:r>
+              <a:rPr lang="pt-BR" sz="2000" dirty="0">
+                <a:latin typeface="Times New Roman" panose="02020603050405020304" pitchFamily="18" charset="0"/>
+                <a:cs typeface="Times New Roman" panose="02020603050405020304" pitchFamily="18" charset="0"/>
+                <a:hlinkClick r:id="rId4"/>
+              </a:rPr>
+              <a:t>https://www.programiz.com/python-programming/examples/swap-variables</a:t>
+            </a:r>
+            <a:endParaRPr lang="pt-BR" sz="2000" dirty="0">
+              <a:latin typeface="Times New Roman" panose="02020603050405020304" pitchFamily="18" charset="0"/>
+              <a:cs typeface="Times New Roman" panose="02020603050405020304" pitchFamily="18" charset="0"/>
+            </a:endParaRPr>
+          </a:p>
+          <a:p>
+            <a:pPr marL="0" indent="0" algn="just">
+              <a:buNone/>
+            </a:pPr>
+            <a:endParaRPr lang="pt-BR" sz="2000" dirty="0">
+              <a:latin typeface="Times New Roman" panose="02020603050405020304" pitchFamily="18" charset="0"/>
+              <a:cs typeface="Times New Roman" panose="02020603050405020304" pitchFamily="18" charset="0"/>
+            </a:endParaRPr>
+          </a:p>
+          <a:p>
+            <a:pPr marL="0" indent="0" algn="just">
+              <a:buNone/>
+            </a:pPr>
+            <a:r>
+              <a:rPr lang="pt-BR" sz="2000" dirty="0">
+                <a:latin typeface="Times New Roman" panose="02020603050405020304" pitchFamily="18" charset="0"/>
+                <a:cs typeface="Times New Roman" panose="02020603050405020304" pitchFamily="18" charset="0"/>
+              </a:rPr>
+              <a:t>- </a:t>
+            </a:r>
+            <a:r>
+              <a:rPr lang="pt-BR" sz="2000" dirty="0" err="1">
+                <a:latin typeface="Times New Roman" panose="02020603050405020304" pitchFamily="18" charset="0"/>
+                <a:cs typeface="Times New Roman" panose="02020603050405020304" pitchFamily="18" charset="0"/>
+              </a:rPr>
+              <a:t>Tuplas</a:t>
+            </a:r>
+            <a:r>
+              <a:rPr lang="pt-BR" sz="2000" dirty="0">
+                <a:latin typeface="Times New Roman" panose="02020603050405020304" pitchFamily="18" charset="0"/>
+                <a:cs typeface="Times New Roman" panose="02020603050405020304" pitchFamily="18" charset="0"/>
+              </a:rPr>
+              <a:t> Nomeadas</a:t>
+            </a:r>
+          </a:p>
+          <a:p>
+            <a:pPr marL="0" indent="0" algn="just">
+              <a:buNone/>
+            </a:pPr>
+            <a:r>
+              <a:rPr lang="pt-BR" sz="2000" dirty="0">
+                <a:latin typeface="Times New Roman" panose="02020603050405020304" pitchFamily="18" charset="0"/>
+                <a:cs typeface="Times New Roman" panose="02020603050405020304" pitchFamily="18" charset="0"/>
+              </a:rPr>
+              <a:t>[3] </a:t>
+            </a:r>
+            <a:r>
+              <a:rPr lang="pt-BR" sz="2000" dirty="0">
+                <a:latin typeface="Times New Roman" panose="02020603050405020304" pitchFamily="18" charset="0"/>
+                <a:cs typeface="Times New Roman" panose="02020603050405020304" pitchFamily="18" charset="0"/>
+                <a:hlinkClick r:id="rId5"/>
+              </a:rPr>
+              <a:t>https://www.youtube.com/watch?v=IkoaXbLsUg8</a:t>
+            </a:r>
+            <a:endParaRPr lang="pt-BR" sz="2000" dirty="0">
+              <a:latin typeface="Times New Roman" panose="02020603050405020304" pitchFamily="18" charset="0"/>
+              <a:cs typeface="Times New Roman" panose="02020603050405020304" pitchFamily="18" charset="0"/>
+            </a:endParaRPr>
+          </a:p>
+          <a:p>
+            <a:pPr marL="0" indent="0" algn="just">
+              <a:buNone/>
+            </a:pPr>
+            <a:endParaRPr lang="pt-BR" sz="2000" dirty="0">
+              <a:latin typeface="Times New Roman" panose="02020603050405020304" pitchFamily="18" charset="0"/>
+              <a:cs typeface="Times New Roman" panose="02020603050405020304" pitchFamily="18" charset="0"/>
+            </a:endParaRPr>
+          </a:p>
+          <a:p>
+            <a:pPr marL="0" indent="0" algn="just">
+              <a:buNone/>
+            </a:pPr>
+            <a:endParaRPr lang="pt-BR" sz="2000" dirty="0">
+              <a:latin typeface="Times New Roman" panose="02020603050405020304" pitchFamily="18" charset="0"/>
+              <a:cs typeface="Times New Roman" panose="02020603050405020304" pitchFamily="18" charset="0"/>
+            </a:endParaRPr>
+          </a:p>
+          <a:p>
+            <a:pPr marL="0" indent="0" algn="just">
+              <a:buNone/>
+            </a:pPr>
+            <a:endParaRPr lang="pt-BR" sz="2000" dirty="0">
+              <a:latin typeface="Calibri" panose="020F0502020204030204" pitchFamily="34" charset="0"/>
+            </a:endParaRPr>
           </a:p>
         </p:txBody>
       </p:sp>
     </p:spTree>
     <p:extLst>
       <p:ext uri="{BB962C8B-B14F-4D97-AF65-F5344CB8AC3E}">
-        <p14:creationId xmlns:p14="http://schemas.microsoft.com/office/powerpoint/2010/main" val="2470652989"/>
+        <p14:creationId xmlns:p14="http://schemas.microsoft.com/office/powerpoint/2010/main" val="3680270425"/>
       </p:ext>
     </p:extLst>
   </p:cSld>
@@ -12640,6 +13147,134 @@
                   <a:srgbClr val="0070C0"/>
                 </a:solidFill>
               </a:rPr>
+              <a:t>Dinâmica</a:t>
+            </a:r>
+            <a:r>
+              <a:rPr lang="en-US" b="1" dirty="0">
+                <a:solidFill>
+                  <a:srgbClr val="0070C0"/>
+                </a:solidFill>
+              </a:rPr>
+              <a:t>/</a:t>
+            </a:r>
+            <a:r>
+              <a:rPr lang="en-US" b="1" dirty="0" err="1">
+                <a:solidFill>
+                  <a:srgbClr val="0070C0"/>
+                </a:solidFill>
+              </a:rPr>
+              <a:t>Atividades</a:t>
+            </a:r>
+            <a:endParaRPr lang="en-US" b="1" dirty="0">
+              <a:solidFill>
+                <a:srgbClr val="0070C0"/>
+              </a:solidFill>
+            </a:endParaRPr>
+          </a:p>
+        </p:txBody>
+      </p:sp>
+      <p:sp>
+        <p:nvSpPr>
+          <p:cNvPr id="8" name="Text Placeholder 2"/>
+          <p:cNvSpPr>
+            <a:spLocks noGrp="1"/>
+          </p:cNvSpPr>
+          <p:nvPr>
+            <p:ph type="body" sz="half" idx="1"/>
+          </p:nvPr>
+        </p:nvSpPr>
+        <p:spPr>
+          <a:xfrm>
+            <a:off x="139472" y="1063230"/>
+            <a:ext cx="8865056" cy="3606305"/>
+          </a:xfrm>
+        </p:spPr>
+        <p:txBody>
+          <a:bodyPr>
+            <a:noAutofit/>
+          </a:bodyPr>
+          <a:lstStyle/>
+          <a:p>
+            <a:pPr algn="just">
+              <a:buFontTx/>
+              <a:buChar char="-"/>
+            </a:pPr>
+            <a:r>
+              <a:rPr lang="pt-BR" dirty="0">
+                <a:latin typeface="Times New Roman" panose="02020603050405020304" pitchFamily="18" charset="0"/>
+                <a:cs typeface="Times New Roman" panose="02020603050405020304" pitchFamily="18" charset="0"/>
+              </a:rPr>
+              <a:t>Exercícios de Fixação</a:t>
+            </a:r>
+          </a:p>
+          <a:p>
+            <a:pPr marL="0" indent="0" algn="just">
+              <a:buNone/>
+            </a:pPr>
+            <a:r>
+              <a:rPr lang="pt-BR" dirty="0">
+                <a:latin typeface="Times New Roman" panose="02020603050405020304" pitchFamily="18" charset="0"/>
+                <a:cs typeface="Times New Roman" panose="02020603050405020304" pitchFamily="18" charset="0"/>
+              </a:rPr>
+              <a:t>	Desafios em Sala de Aula.</a:t>
+            </a:r>
+          </a:p>
+        </p:txBody>
+      </p:sp>
+    </p:spTree>
+    <p:extLst>
+      <p:ext uri="{BB962C8B-B14F-4D97-AF65-F5344CB8AC3E}">
+        <p14:creationId xmlns:p14="http://schemas.microsoft.com/office/powerpoint/2010/main" val="2470652989"/>
+      </p:ext>
+    </p:extLst>
+  </p:cSld>
+  <p:clrMapOvr>
+    <a:masterClrMapping/>
+  </p:clrMapOvr>
+  <p:transition spd="med"/>
+</p:sld>
+</file>
+
+<file path=ppt/slides/slide27.xml><?xml version="1.0" encoding="utf-8"?>
+<p:sld xmlns:a="http://schemas.openxmlformats.org/drawingml/2006/main" xmlns:r="http://schemas.openxmlformats.org/officeDocument/2006/relationships" xmlns:p="http://schemas.openxmlformats.org/presentationml/2006/main">
+  <p:cSld>
+    <p:spTree>
+      <p:nvGrpSpPr>
+        <p:cNvPr id="1" name=""/>
+        <p:cNvGrpSpPr/>
+        <p:nvPr/>
+      </p:nvGrpSpPr>
+      <p:grpSpPr>
+        <a:xfrm>
+          <a:off x="0" y="0"/>
+          <a:ext cx="0" cy="0"/>
+          <a:chOff x="0" y="0"/>
+          <a:chExt cx="0" cy="0"/>
+        </a:xfrm>
+      </p:grpSpPr>
+      <p:sp>
+        <p:nvSpPr>
+          <p:cNvPr id="6" name="Title 1"/>
+          <p:cNvSpPr>
+            <a:spLocks noGrp="1"/>
+          </p:cNvSpPr>
+          <p:nvPr>
+            <p:ph type="title"/>
+          </p:nvPr>
+        </p:nvSpPr>
+        <p:spPr/>
+        <p:txBody>
+          <a:bodyPr>
+            <a:normAutofit/>
+          </a:bodyPr>
+          <a:lstStyle/>
+          <a:p>
+            <a:r>
+              <a:rPr lang="en-US" b="1" dirty="0" err="1">
+                <a:solidFill>
+                  <a:srgbClr val="0070C0"/>
+                </a:solidFill>
+              </a:rPr>
               <a:t>Referências</a:t>
             </a:r>
             <a:r>
@@ -12801,7 +13436,7 @@
 </p:sld>
 </file>
 
-<file path=ppt/slides/slide27.xml><?xml version="1.0" encoding="utf-8"?>
+<file path=ppt/slides/slide28.xml><?xml version="1.0" encoding="utf-8"?>
 <p:sld xmlns:a="http://schemas.openxmlformats.org/drawingml/2006/main" xmlns:r="http://schemas.openxmlformats.org/officeDocument/2006/relationships" xmlns:p="http://schemas.openxmlformats.org/presentationml/2006/main">
   <p:cSld>
     <p:spTree>
@@ -14748,7 +15383,7 @@
                 <a:latin typeface="Times New Roman" panose="02020603050405020304" pitchFamily="18" charset="0"/>
                 <a:cs typeface="Times New Roman" panose="02020603050405020304" pitchFamily="18" charset="0"/>
               </a:rPr>
-              <a:t> e </a:t>
+              <a:t>, </a:t>
             </a:r>
             <a:r>
               <a:rPr lang="pt-BR" sz="2400" b="1" dirty="0" err="1">
@@ -14762,8 +15397,19 @@
                 <a:latin typeface="Times New Roman" panose="02020603050405020304" pitchFamily="18" charset="0"/>
                 <a:cs typeface="Times New Roman" panose="02020603050405020304" pitchFamily="18" charset="0"/>
               </a:rPr>
-              <a:t>.</a:t>
-            </a:r>
+              <a:t>, reverse, </a:t>
+            </a:r>
+            <a:r>
+              <a:rPr lang="pt-BR" sz="2400" b="1">
+                <a:latin typeface="Times New Roman" panose="02020603050405020304" pitchFamily="18" charset="0"/>
+                <a:cs typeface="Times New Roman" panose="02020603050405020304" pitchFamily="18" charset="0"/>
+              </a:rPr>
+              <a:t>copy.</a:t>
+            </a:r>
+            <a:endParaRPr lang="pt-BR" sz="2400" b="1" dirty="0">
+              <a:latin typeface="Times New Roman" panose="02020603050405020304" pitchFamily="18" charset="0"/>
+              <a:cs typeface="Times New Roman" panose="02020603050405020304" pitchFamily="18" charset="0"/>
+            </a:endParaRPr>
           </a:p>
         </p:txBody>
       </p:sp>

</xml_diff>

<commit_message>
Aula Python Paradigmas 09Set2025 ...
</commit_message>
<xml_diff>
--- a/01 Classes/Aula 07 Programação Python - Tipos de Dados Aglomerados.pptx
+++ b/01 Classes/Aula 07 Programação Python - Tipos de Dados Aglomerados.pptx
@@ -2117,7 +2117,7 @@
           <a:p>
             <a:fld id="{48A87A34-81AB-432B-8DAE-1953F412C126}" type="datetimeFigureOut">
               <a:rPr lang="en-US" smtClean="0"/>
-              <a:t>9/6/2023</a:t>
+              <a:t>9/9/2025</a:t>
             </a:fld>
             <a:endParaRPr lang="en-US" dirty="0"/>
           </a:p>
@@ -2328,7 +2328,7 @@
           <a:p>
             <a:fld id="{48A87A34-81AB-432B-8DAE-1953F412C126}" type="datetimeFigureOut">
               <a:rPr lang="en-US" smtClean="0"/>
-              <a:t>9/6/2023</a:t>
+              <a:t>9/9/2025</a:t>
             </a:fld>
             <a:endParaRPr lang="en-US" dirty="0"/>
           </a:p>
@@ -2543,7 +2543,7 @@
           <a:p>
             <a:fld id="{48A87A34-81AB-432B-8DAE-1953F412C126}" type="datetimeFigureOut">
               <a:rPr lang="en-US" smtClean="0"/>
-              <a:t>9/6/2023</a:t>
+              <a:t>9/9/2025</a:t>
             </a:fld>
             <a:endParaRPr lang="en-US" dirty="0"/>
           </a:p>
@@ -2911,7 +2911,7 @@
           <a:p>
             <a:fld id="{48A87A34-81AB-432B-8DAE-1953F412C126}" type="datetimeFigureOut">
               <a:rPr lang="en-US" smtClean="0"/>
-              <a:t>9/6/2023</a:t>
+              <a:t>9/9/2025</a:t>
             </a:fld>
             <a:endParaRPr lang="en-US" dirty="0"/>
           </a:p>
@@ -3190,7 +3190,7 @@
           <a:p>
             <a:fld id="{48A87A34-81AB-432B-8DAE-1953F412C126}" type="datetimeFigureOut">
               <a:rPr lang="en-US" smtClean="0"/>
-              <a:t>9/6/2023</a:t>
+              <a:t>9/9/2025</a:t>
             </a:fld>
             <a:endParaRPr lang="en-US" dirty="0"/>
           </a:p>
@@ -3458,7 +3458,7 @@
           <a:p>
             <a:fld id="{48A87A34-81AB-432B-8DAE-1953F412C126}" type="datetimeFigureOut">
               <a:rPr lang="en-US" smtClean="0"/>
-              <a:t>9/6/2023</a:t>
+              <a:t>9/9/2025</a:t>
             </a:fld>
             <a:endParaRPr lang="en-US" dirty="0"/>
           </a:p>
@@ -3874,7 +3874,7 @@
           <a:p>
             <a:fld id="{48A87A34-81AB-432B-8DAE-1953F412C126}" type="datetimeFigureOut">
               <a:rPr lang="en-US" smtClean="0"/>
-              <a:t>9/6/2023</a:t>
+              <a:t>9/9/2025</a:t>
             </a:fld>
             <a:endParaRPr lang="en-US" dirty="0"/>
           </a:p>
@@ -4023,7 +4023,7 @@
           <a:p>
             <a:fld id="{48A87A34-81AB-432B-8DAE-1953F412C126}" type="datetimeFigureOut">
               <a:rPr lang="en-US" smtClean="0"/>
-              <a:t>9/6/2023</a:t>
+              <a:t>9/9/2025</a:t>
             </a:fld>
             <a:endParaRPr lang="en-US" dirty="0"/>
           </a:p>
@@ -4149,7 +4149,7 @@
           <a:p>
             <a:fld id="{48A87A34-81AB-432B-8DAE-1953F412C126}" type="datetimeFigureOut">
               <a:rPr lang="en-US" smtClean="0"/>
-              <a:t>9/6/2023</a:t>
+              <a:t>9/9/2025</a:t>
             </a:fld>
             <a:endParaRPr lang="en-US" dirty="0"/>
           </a:p>
@@ -4400,7 +4400,7 @@
           <a:p>
             <a:fld id="{48A87A34-81AB-432B-8DAE-1953F412C126}" type="datetimeFigureOut">
               <a:rPr lang="en-US" smtClean="0"/>
-              <a:t>9/6/2023</a:t>
+              <a:t>9/9/2025</a:t>
             </a:fld>
             <a:endParaRPr lang="en-US" dirty="0"/>
           </a:p>
@@ -4846,7 +4846,7 @@
             <a:fld id="{48A87A34-81AB-432B-8DAE-1953F412C126}" type="datetimeFigureOut">
               <a:rPr lang="en-US" smtClean="0"/>
               <a:pPr/>
-              <a:t>9/6/2023</a:t>
+              <a:t>9/9/2025</a:t>
             </a:fld>
             <a:endParaRPr lang="en-US" dirty="0"/>
           </a:p>
@@ -5013,6 +5013,13 @@
             <a:schemeClr val="lt1"/>
           </a:fontRef>
         </p:style>
+        <p:txBody>
+          <a:bodyPr/>
+          <a:lstStyle/>
+          <a:p>
+            <a:endParaRPr lang="pt-BR"/>
+          </a:p>
+        </p:txBody>
       </p:sp>
       <p:pic>
         <p:nvPicPr>
@@ -5174,7 +5181,7 @@
             <a:fld id="{48A87A34-81AB-432B-8DAE-1953F412C126}" type="datetimeFigureOut">
               <a:rPr lang="en-US" smtClean="0"/>
               <a:pPr/>
-              <a:t>9/6/2023</a:t>
+              <a:t>9/9/2025</a:t>
             </a:fld>
             <a:endParaRPr lang="en-US" dirty="0"/>
           </a:p>
@@ -6315,7 +6322,7 @@
               <a:buNone/>
             </a:pPr>
             <a:r>
-              <a:rPr lang="pt-BR" b="1" dirty="0">
+              <a:rPr lang="pt-BR" sz="2400" b="1" dirty="0">
                 <a:solidFill>
                   <a:srgbClr val="FF0000"/>
                 </a:solidFill>
@@ -6325,7 +6332,7 @@
               <a:t>Exemplo Lista: </a:t>
             </a:r>
             <a:r>
-              <a:rPr lang="pt-BR" dirty="0" err="1">
+              <a:rPr lang="pt-BR" sz="2400" dirty="0" err="1">
                 <a:solidFill>
                   <a:schemeClr val="tx1"/>
                 </a:solidFill>
@@ -6335,7 +6342,7 @@
               <a:t>umaLista</a:t>
             </a:r>
             <a:r>
-              <a:rPr lang="pt-BR" dirty="0">
+              <a:rPr lang="pt-BR" sz="2400" dirty="0">
                 <a:solidFill>
                   <a:schemeClr val="tx1"/>
                 </a:solidFill>
@@ -6351,17 +6358,24 @@
               <a:buChar char="-"/>
             </a:pPr>
             <a:r>
-              <a:rPr lang="pt-BR" dirty="0">
-                <a:solidFill>
-                  <a:schemeClr val="tx1"/>
-                </a:solidFill>
-                <a:latin typeface="Times New Roman" panose="02020603050405020304" pitchFamily="18" charset="0"/>
-                <a:cs typeface="Times New Roman" panose="02020603050405020304" pitchFamily="18" charset="0"/>
-              </a:rPr>
-              <a:t>Seleciona tudo até o indicado com”</a:t>
-            </a:r>
-            <a:r>
-              <a:rPr lang="pt-BR" b="1" dirty="0">
+              <a:rPr lang="pt-BR" sz="2400" dirty="0">
+                <a:solidFill>
+                  <a:schemeClr val="tx1"/>
+                </a:solidFill>
+                <a:latin typeface="Times New Roman" panose="02020603050405020304" pitchFamily="18" charset="0"/>
+                <a:cs typeface="Times New Roman" panose="02020603050405020304" pitchFamily="18" charset="0"/>
+              </a:rPr>
+              <a:t>Seleciona tudo até o indicado com</a:t>
+            </a:r>
+            <a:r>
+              <a:rPr lang="en-US" sz="2400" dirty="0">
+                <a:latin typeface="Times New Roman" panose="02020603050405020304" pitchFamily="18" charset="0"/>
+                <a:cs typeface="Times New Roman" panose="02020603050405020304" pitchFamily="18" charset="0"/>
+              </a:rPr>
+              <a:t> '</a:t>
+            </a:r>
+            <a:r>
+              <a:rPr lang="pt-BR" sz="2400" b="1" dirty="0">
                 <a:solidFill>
                   <a:srgbClr val="0070C0"/>
                 </a:solidFill>
@@ -6371,14 +6385,14 @@
               <a:t>:</a:t>
             </a:r>
             <a:r>
-              <a:rPr lang="pt-BR" dirty="0">
-                <a:latin typeface="Times New Roman" panose="02020603050405020304" pitchFamily="18" charset="0"/>
-                <a:cs typeface="Times New Roman" panose="02020603050405020304" pitchFamily="18" charset="0"/>
-              </a:rPr>
-              <a:t>”</a:t>
-            </a:r>
-            <a:r>
-              <a:rPr lang="pt-BR" dirty="0">
+              <a:rPr lang="en-US" sz="2400" dirty="0">
+                <a:latin typeface="Times New Roman" panose="02020603050405020304" pitchFamily="18" charset="0"/>
+                <a:cs typeface="Times New Roman" panose="02020603050405020304" pitchFamily="18" charset="0"/>
+              </a:rPr>
+              <a:t>'</a:t>
+            </a:r>
+            <a:r>
+              <a:rPr lang="pt-BR" sz="2400" dirty="0">
                 <a:solidFill>
                   <a:schemeClr val="tx1"/>
                 </a:solidFill>
@@ -6388,7 +6402,7 @@
               <a:t> </a:t>
             </a:r>
             <a:r>
-              <a:rPr lang="pt-BR" b="1" dirty="0">
+              <a:rPr lang="pt-BR" sz="2400" b="1" dirty="0">
                 <a:solidFill>
                   <a:srgbClr val="FF0000"/>
                 </a:solidFill>
@@ -6403,7 +6417,7 @@
               <a:buNone/>
             </a:pPr>
             <a:r>
-              <a:rPr lang="pt-BR" dirty="0">
+              <a:rPr lang="pt-BR" sz="2400" dirty="0">
                 <a:solidFill>
                   <a:schemeClr val="tx1"/>
                 </a:solidFill>
@@ -6413,7 +6427,7 @@
               <a:t>   Ex.: </a:t>
             </a:r>
             <a:r>
-              <a:rPr lang="pt-BR" b="1" dirty="0">
+              <a:rPr lang="pt-BR" sz="2400" b="1" dirty="0">
                 <a:solidFill>
                   <a:schemeClr val="tx1"/>
                 </a:solidFill>
@@ -6423,7 +6437,7 @@
               <a:t>print</a:t>
             </a:r>
             <a:r>
-              <a:rPr lang="pt-BR" dirty="0">
+              <a:rPr lang="pt-BR" sz="2400" dirty="0">
                 <a:solidFill>
                   <a:schemeClr val="tx1"/>
                 </a:solidFill>
@@ -6433,7 +6447,7 @@
               <a:t>(</a:t>
             </a:r>
             <a:r>
-              <a:rPr lang="pt-BR" dirty="0" err="1">
+              <a:rPr lang="pt-BR" sz="2400" dirty="0" err="1">
                 <a:solidFill>
                   <a:schemeClr val="tx1"/>
                 </a:solidFill>
@@ -6443,7 +6457,7 @@
               <a:t>umaLista</a:t>
             </a:r>
             <a:r>
-              <a:rPr lang="pt-BR" dirty="0">
+              <a:rPr lang="pt-BR" sz="2400" dirty="0">
                 <a:solidFill>
                   <a:schemeClr val="tx1"/>
                 </a:solidFill>
@@ -6459,17 +6473,24 @@
               <a:buChar char="-"/>
             </a:pPr>
             <a:r>
-              <a:rPr lang="pt-BR" dirty="0">
-                <a:solidFill>
-                  <a:schemeClr val="tx1"/>
-                </a:solidFill>
-                <a:latin typeface="Times New Roman" panose="02020603050405020304" pitchFamily="18" charset="0"/>
-                <a:cs typeface="Times New Roman" panose="02020603050405020304" pitchFamily="18" charset="0"/>
-              </a:rPr>
-              <a:t>Seleciona faixa, da posição informada até o fim com ”</a:t>
-            </a:r>
-            <a:r>
-              <a:rPr lang="pt-BR" b="1" dirty="0">
+              <a:rPr lang="pt-BR" sz="2400" dirty="0">
+                <a:solidFill>
+                  <a:schemeClr val="tx1"/>
+                </a:solidFill>
+                <a:latin typeface="Times New Roman" panose="02020603050405020304" pitchFamily="18" charset="0"/>
+                <a:cs typeface="Times New Roman" panose="02020603050405020304" pitchFamily="18" charset="0"/>
+              </a:rPr>
+              <a:t>Seleciona faixa, da posição informada até o fim com </a:t>
+            </a:r>
+            <a:r>
+              <a:rPr lang="en-US" sz="2400" dirty="0">
+                <a:latin typeface="Times New Roman" panose="02020603050405020304" pitchFamily="18" charset="0"/>
+                <a:cs typeface="Times New Roman" panose="02020603050405020304" pitchFamily="18" charset="0"/>
+              </a:rPr>
+              <a:t>'</a:t>
+            </a:r>
+            <a:r>
+              <a:rPr lang="pt-BR" sz="2400" b="1" dirty="0">
                 <a:solidFill>
                   <a:srgbClr val="0070C0"/>
                 </a:solidFill>
@@ -6479,13 +6500,13 @@
               <a:t>:</a:t>
             </a:r>
             <a:r>
-              <a:rPr lang="pt-BR" dirty="0">
-                <a:latin typeface="Times New Roman" panose="02020603050405020304" pitchFamily="18" charset="0"/>
-                <a:cs typeface="Times New Roman" panose="02020603050405020304" pitchFamily="18" charset="0"/>
-              </a:rPr>
-              <a:t>”</a:t>
-            </a:r>
-            <a:endParaRPr lang="pt-BR" b="1" dirty="0">
+              <a:rPr lang="en-US" sz="2400" dirty="0">
+                <a:latin typeface="Times New Roman" panose="02020603050405020304" pitchFamily="18" charset="0"/>
+                <a:cs typeface="Times New Roman" panose="02020603050405020304" pitchFamily="18" charset="0"/>
+              </a:rPr>
+              <a:t>'</a:t>
+            </a:r>
+            <a:endParaRPr lang="pt-BR" sz="2400" b="1" dirty="0">
               <a:solidFill>
                 <a:srgbClr val="FF0000"/>
               </a:solidFill>
@@ -6498,7 +6519,7 @@
               <a:buNone/>
             </a:pPr>
             <a:r>
-              <a:rPr lang="pt-BR" dirty="0">
+              <a:rPr lang="pt-BR" sz="2400" dirty="0">
                 <a:solidFill>
                   <a:schemeClr val="tx1"/>
                 </a:solidFill>
@@ -6508,7 +6529,7 @@
               <a:t>   Ex.: </a:t>
             </a:r>
             <a:r>
-              <a:rPr lang="pt-BR" b="1" dirty="0">
+              <a:rPr lang="pt-BR" sz="2400" b="1" dirty="0">
                 <a:solidFill>
                   <a:schemeClr val="tx1"/>
                 </a:solidFill>
@@ -6518,7 +6539,7 @@
               <a:t>print</a:t>
             </a:r>
             <a:r>
-              <a:rPr lang="pt-BR" dirty="0">
+              <a:rPr lang="pt-BR" sz="2400" dirty="0">
                 <a:solidFill>
                   <a:schemeClr val="tx1"/>
                 </a:solidFill>
@@ -6528,7 +6549,7 @@
               <a:t>(</a:t>
             </a:r>
             <a:r>
-              <a:rPr lang="pt-BR" dirty="0" err="1">
+              <a:rPr lang="pt-BR" sz="2400" dirty="0" err="1">
                 <a:solidFill>
                   <a:schemeClr val="tx1"/>
                 </a:solidFill>
@@ -6538,7 +6559,7 @@
               <a:t>umaLista</a:t>
             </a:r>
             <a:r>
-              <a:rPr lang="pt-BR" dirty="0">
+              <a:rPr lang="pt-BR" sz="2400" dirty="0">
                 <a:solidFill>
                   <a:schemeClr val="tx1"/>
                 </a:solidFill>
@@ -6552,7 +6573,7 @@
             <a:pPr marL="0" indent="0" algn="just">
               <a:buNone/>
             </a:pPr>
-            <a:endParaRPr lang="pt-BR" dirty="0">
+            <a:endParaRPr lang="pt-BR" sz="2400" dirty="0">
               <a:solidFill>
                 <a:schemeClr val="tx1"/>
               </a:solidFill>
@@ -6735,24 +6756,65 @@
                 <a:latin typeface="Times New Roman" panose="02020603050405020304" pitchFamily="18" charset="0"/>
                 <a:cs typeface="Times New Roman" panose="02020603050405020304" pitchFamily="18" charset="0"/>
               </a:rPr>
-              <a:t>Seleciona faixa, “de tanto em tanto” com salto de 2 ”</a:t>
+              <a:t>Seleciona faixa, </a:t>
+            </a:r>
+            <a:r>
+              <a:rPr lang="en-US" sz="2400" dirty="0">
+                <a:latin typeface="Times New Roman" panose="02020603050405020304" pitchFamily="18" charset="0"/>
+                <a:cs typeface="Times New Roman" panose="02020603050405020304" pitchFamily="18" charset="0"/>
+              </a:rPr>
+              <a:t>'</a:t>
             </a:r>
             <a:r>
               <a:rPr lang="pt-BR" sz="2400" b="1" dirty="0">
                 <a:solidFill>
+                  <a:srgbClr val="FF0000"/>
+                </a:solidFill>
+                <a:latin typeface="Times New Roman" panose="02020603050405020304" pitchFamily="18" charset="0"/>
+                <a:cs typeface="Times New Roman" panose="02020603050405020304" pitchFamily="18" charset="0"/>
+              </a:rPr>
+              <a:t>de tanto em tanto</a:t>
+            </a:r>
+            <a:r>
+              <a:rPr lang="en-US" sz="2400" dirty="0">
+                <a:latin typeface="Times New Roman" panose="02020603050405020304" pitchFamily="18" charset="0"/>
+                <a:cs typeface="Times New Roman" panose="02020603050405020304" pitchFamily="18" charset="0"/>
+              </a:rPr>
+              <a:t>'</a:t>
+            </a:r>
+            <a:r>
+              <a:rPr lang="pt-BR" sz="2400" dirty="0">
+                <a:solidFill>
+                  <a:schemeClr val="tx1"/>
+                </a:solidFill>
+                <a:latin typeface="Times New Roman" panose="02020603050405020304" pitchFamily="18" charset="0"/>
+                <a:cs typeface="Times New Roman" panose="02020603050405020304" pitchFamily="18" charset="0"/>
+              </a:rPr>
+              <a:t> com salto de 2 </a:t>
+            </a:r>
+            <a:r>
+              <a:rPr lang="en-US" sz="2400" dirty="0">
+                <a:latin typeface="Times New Roman" panose="02020603050405020304" pitchFamily="18" charset="0"/>
+                <a:cs typeface="Times New Roman" panose="02020603050405020304" pitchFamily="18" charset="0"/>
+              </a:rPr>
+              <a:t>'</a:t>
+            </a:r>
+            <a:r>
+              <a:rPr lang="pt-BR" sz="2400" b="1" dirty="0">
+                <a:solidFill>
                   <a:srgbClr val="0070C0"/>
                 </a:solidFill>
                 <a:latin typeface="Times New Roman" panose="02020603050405020304" pitchFamily="18" charset="0"/>
                 <a:cs typeface="Times New Roman" panose="02020603050405020304" pitchFamily="18" charset="0"/>
               </a:rPr>
-              <a:t> ::</a:t>
-            </a:r>
-            <a:r>
-              <a:rPr lang="pt-BR" sz="2400" dirty="0">
-                <a:latin typeface="Times New Roman" panose="02020603050405020304" pitchFamily="18" charset="0"/>
-                <a:cs typeface="Times New Roman" panose="02020603050405020304" pitchFamily="18" charset="0"/>
-              </a:rPr>
-              <a:t>”</a:t>
+              <a:t>::</a:t>
+            </a:r>
+            <a:r>
+              <a:rPr lang="en-US" sz="2400" dirty="0">
+                <a:latin typeface="Times New Roman" panose="02020603050405020304" pitchFamily="18" charset="0"/>
+                <a:cs typeface="Times New Roman" panose="02020603050405020304" pitchFamily="18" charset="0"/>
+              </a:rPr>
+              <a:t>'</a:t>
             </a:r>
             <a:endParaRPr lang="pt-BR" sz="2400" b="1" dirty="0">
               <a:solidFill>
@@ -6830,7 +6892,14 @@
                 <a:latin typeface="Times New Roman" panose="02020603050405020304" pitchFamily="18" charset="0"/>
                 <a:cs typeface="Times New Roman" panose="02020603050405020304" pitchFamily="18" charset="0"/>
               </a:rPr>
-              <a:t>Seleciona faixa, da posição inicial com salto de 3 ”</a:t>
+              <a:t>Seleciona faixa, da posição inicial com salto de 3 </a:t>
+            </a:r>
+            <a:r>
+              <a:rPr lang="en-US" sz="2400" dirty="0">
+                <a:latin typeface="Times New Roman" panose="02020603050405020304" pitchFamily="18" charset="0"/>
+                <a:cs typeface="Times New Roman" panose="02020603050405020304" pitchFamily="18" charset="0"/>
+              </a:rPr>
+              <a:t>'</a:t>
             </a:r>
             <a:r>
               <a:rPr lang="pt-BR" sz="2400" b="1" dirty="0">
@@ -6843,11 +6912,11 @@
               <a:t>:</a:t>
             </a:r>
             <a:r>
-              <a:rPr lang="pt-BR" sz="2400" dirty="0">
-                <a:latin typeface="Times New Roman" panose="02020603050405020304" pitchFamily="18" charset="0"/>
-                <a:cs typeface="Times New Roman" panose="02020603050405020304" pitchFamily="18" charset="0"/>
-              </a:rPr>
-              <a:t>”</a:t>
+              <a:rPr lang="en-US" sz="2400" dirty="0">
+                <a:latin typeface="Times New Roman" panose="02020603050405020304" pitchFamily="18" charset="0"/>
+                <a:cs typeface="Times New Roman" panose="02020603050405020304" pitchFamily="18" charset="0"/>
+              </a:rPr>
+              <a:t>'</a:t>
             </a:r>
             <a:endParaRPr lang="pt-BR" sz="2400" b="1" dirty="0">
               <a:solidFill>
@@ -6925,7 +6994,14 @@
                 <a:latin typeface="Times New Roman" panose="02020603050405020304" pitchFamily="18" charset="0"/>
                 <a:cs typeface="Times New Roman" panose="02020603050405020304" pitchFamily="18" charset="0"/>
               </a:rPr>
-              <a:t>Seleciona faixa, da posição inicial com salto de 2 ”</a:t>
+              <a:t>Seleciona faixa, da posição inicial com salto de 2 </a:t>
+            </a:r>
+            <a:r>
+              <a:rPr lang="en-US" sz="2400" dirty="0">
+                <a:latin typeface="Times New Roman" panose="02020603050405020304" pitchFamily="18" charset="0"/>
+                <a:cs typeface="Times New Roman" panose="02020603050405020304" pitchFamily="18" charset="0"/>
+              </a:rPr>
+              <a:t>'</a:t>
             </a:r>
             <a:r>
               <a:rPr lang="pt-BR" sz="2400" b="1" dirty="0">
@@ -6938,11 +7014,11 @@
               <a:t>:</a:t>
             </a:r>
             <a:r>
-              <a:rPr lang="pt-BR" sz="2400" dirty="0">
-                <a:latin typeface="Times New Roman" panose="02020603050405020304" pitchFamily="18" charset="0"/>
-                <a:cs typeface="Times New Roman" panose="02020603050405020304" pitchFamily="18" charset="0"/>
-              </a:rPr>
-              <a:t>”</a:t>
+              <a:rPr lang="en-US" sz="2400" dirty="0">
+                <a:latin typeface="Times New Roman" panose="02020603050405020304" pitchFamily="18" charset="0"/>
+                <a:cs typeface="Times New Roman" panose="02020603050405020304" pitchFamily="18" charset="0"/>
+              </a:rPr>
+              <a:t>'</a:t>
             </a:r>
             <a:endParaRPr lang="pt-BR" sz="2400" b="1" dirty="0">
               <a:solidFill>
@@ -7732,7 +7808,14 @@
                 <a:latin typeface="Times New Roman" panose="02020603050405020304" pitchFamily="18" charset="0"/>
                 <a:cs typeface="Times New Roman" panose="02020603050405020304" pitchFamily="18" charset="0"/>
               </a:rPr>
-              <a:t>Forma realmente um “</a:t>
+              <a:t>Forma realmente um </a:t>
+            </a:r>
+            <a:r>
+              <a:rPr lang="en-US" sz="2000" dirty="0">
+                <a:latin typeface="Times New Roman" panose="02020603050405020304" pitchFamily="18" charset="0"/>
+                <a:cs typeface="Times New Roman" panose="02020603050405020304" pitchFamily="18" charset="0"/>
+              </a:rPr>
+              <a:t>'</a:t>
             </a:r>
             <a:r>
               <a:rPr lang="pt-BR" sz="2000" b="1" dirty="0">
@@ -7745,15 +7828,19 @@
               <a:t>grupo de dados</a:t>
             </a:r>
             <a:r>
-              <a:rPr lang="pt-BR" sz="2000" dirty="0">
-                <a:solidFill>
-                  <a:schemeClr val="tx1"/>
-                </a:solidFill>
-                <a:latin typeface="Times New Roman" panose="02020603050405020304" pitchFamily="18" charset="0"/>
-                <a:cs typeface="Times New Roman" panose="02020603050405020304" pitchFamily="18" charset="0"/>
-              </a:rPr>
-              <a:t>”</a:t>
-            </a:r>
+              <a:rPr lang="en-US" sz="2000" dirty="0">
+                <a:latin typeface="Times New Roman" panose="02020603050405020304" pitchFamily="18" charset="0"/>
+                <a:cs typeface="Times New Roman" panose="02020603050405020304" pitchFamily="18" charset="0"/>
+              </a:rPr>
+              <a:t>'</a:t>
+            </a:r>
+            <a:endParaRPr lang="pt-BR" sz="2000" dirty="0">
+              <a:solidFill>
+                <a:schemeClr val="tx1"/>
+              </a:solidFill>
+              <a:latin typeface="Times New Roman" panose="02020603050405020304" pitchFamily="18" charset="0"/>
+              <a:cs typeface="Times New Roman" panose="02020603050405020304" pitchFamily="18" charset="0"/>
+            </a:endParaRPr>
           </a:p>
           <a:p>
             <a:pPr marL="0" indent="0" algn="just">
@@ -8882,9 +8969,7 @@
             </a:r>
           </a:p>
           <a:p>
-            <a:pPr marL="0" indent="0" algn="just">
-              <a:buNone/>
-            </a:pPr>
+            <a:pPr algn="just"/>
             <a:r>
               <a:rPr lang="pt-BR" sz="2400" b="1" dirty="0">
                 <a:solidFill>
@@ -8953,13 +9038,45 @@
                 <a:latin typeface="Times New Roman" panose="02020603050405020304" pitchFamily="18" charset="0"/>
                 <a:cs typeface="Times New Roman" panose="02020603050405020304" pitchFamily="18" charset="0"/>
               </a:rPr>
-              <a:t>, "Fulano“);</a:t>
-            </a:r>
-          </a:p>
-          <a:p>
-            <a:pPr marL="0" indent="0" algn="just">
-              <a:buNone/>
-            </a:pPr>
+              <a:t>, </a:t>
+            </a:r>
+            <a:r>
+              <a:rPr lang="en-US" sz="2400" dirty="0">
+                <a:latin typeface="Times New Roman" panose="02020603050405020304" pitchFamily="18" charset="0"/>
+                <a:cs typeface="Times New Roman" panose="02020603050405020304" pitchFamily="18" charset="0"/>
+              </a:rPr>
+              <a:t>'</a:t>
+            </a:r>
+            <a:r>
+              <a:rPr lang="pt-BR" sz="2400" dirty="0">
+                <a:solidFill>
+                  <a:schemeClr val="tx1"/>
+                </a:solidFill>
+                <a:latin typeface="Times New Roman" panose="02020603050405020304" pitchFamily="18" charset="0"/>
+                <a:cs typeface="Times New Roman" panose="02020603050405020304" pitchFamily="18" charset="0"/>
+              </a:rPr>
+              <a:t>Fulano</a:t>
+            </a:r>
+            <a:r>
+              <a:rPr lang="en-US" sz="2400" dirty="0">
+                <a:latin typeface="Times New Roman" panose="02020603050405020304" pitchFamily="18" charset="0"/>
+                <a:cs typeface="Times New Roman" panose="02020603050405020304" pitchFamily="18" charset="0"/>
+              </a:rPr>
+              <a:t>'</a:t>
+            </a:r>
+            <a:r>
+              <a:rPr lang="pt-BR" sz="2400" dirty="0">
+                <a:solidFill>
+                  <a:schemeClr val="tx1"/>
+                </a:solidFill>
+                <a:latin typeface="Times New Roman" panose="02020603050405020304" pitchFamily="18" charset="0"/>
+                <a:cs typeface="Times New Roman" panose="02020603050405020304" pitchFamily="18" charset="0"/>
+              </a:rPr>
+              <a:t>);</a:t>
+            </a:r>
+          </a:p>
+          <a:p>
+            <a:pPr algn="just"/>
             <a:r>
               <a:rPr lang="pt-BR" sz="2400" b="1" dirty="0">
                 <a:solidFill>
@@ -9028,7 +9145,41 @@
                 <a:latin typeface="Times New Roman" panose="02020603050405020304" pitchFamily="18" charset="0"/>
                 <a:cs typeface="Times New Roman" panose="02020603050405020304" pitchFamily="18" charset="0"/>
               </a:rPr>
-              <a:t>, "01234567890“);</a:t>
+              <a:t>, </a:t>
+            </a:r>
+            <a:r>
+              <a:rPr lang="en-US" sz="2400" dirty="0">
+                <a:latin typeface="Times New Roman" panose="02020603050405020304" pitchFamily="18" charset="0"/>
+                <a:cs typeface="Times New Roman" panose="02020603050405020304" pitchFamily="18" charset="0"/>
+              </a:rPr>
+              <a:t>'</a:t>
+            </a:r>
+            <a:r>
+              <a:rPr lang="pt-BR" sz="2400" dirty="0">
+                <a:solidFill>
+                  <a:schemeClr val="tx1"/>
+                </a:solidFill>
+                <a:latin typeface="Times New Roman" panose="02020603050405020304" pitchFamily="18" charset="0"/>
+                <a:cs typeface="Times New Roman" panose="02020603050405020304" pitchFamily="18" charset="0"/>
+              </a:rPr>
+              <a:t>01234567890</a:t>
+            </a:r>
+            <a:r>
+              <a:rPr lang="en-US" sz="2400" dirty="0">
+                <a:latin typeface="Times New Roman" panose="02020603050405020304" pitchFamily="18" charset="0"/>
+                <a:cs typeface="Times New Roman" panose="02020603050405020304" pitchFamily="18" charset="0"/>
+              </a:rPr>
+              <a:t>'</a:t>
+            </a:r>
+            <a:r>
+              <a:rPr lang="pt-BR" sz="2400" dirty="0">
+                <a:solidFill>
+                  <a:schemeClr val="tx1"/>
+                </a:solidFill>
+                <a:latin typeface="Times New Roman" panose="02020603050405020304" pitchFamily="18" charset="0"/>
+                <a:cs typeface="Times New Roman" panose="02020603050405020304" pitchFamily="18" charset="0"/>
+              </a:rPr>
+              <a:t>);</a:t>
             </a:r>
           </a:p>
           <a:p>
@@ -9278,6 +9429,7 @@
                   <a:srgbClr val="FF0000"/>
                 </a:solidFill>
                 <a:latin typeface="Times New Roman" panose="02020603050405020304" pitchFamily="18" charset="0"/>
+                <a:ea typeface="Tahoma" panose="020B0604030504040204" pitchFamily="34" charset="0"/>
                 <a:cs typeface="Times New Roman" panose="02020603050405020304" pitchFamily="18" charset="0"/>
               </a:rPr>
               <a:t>Registro (Exemplo: </a:t>
@@ -9285,6 +9437,7 @@
             <a:r>
               <a:rPr lang="pt-BR" sz="2400" b="1" dirty="0">
                 <a:latin typeface="Times New Roman" panose="02020603050405020304" pitchFamily="18" charset="0"/>
+                <a:ea typeface="Tahoma" panose="020B0604030504040204" pitchFamily="34" charset="0"/>
                 <a:cs typeface="Times New Roman" panose="02020603050405020304" pitchFamily="18" charset="0"/>
               </a:rPr>
               <a:t>Python</a:t>
@@ -9295,6 +9448,7 @@
                   <a:srgbClr val="FF0000"/>
                 </a:solidFill>
                 <a:latin typeface="Times New Roman" panose="02020603050405020304" pitchFamily="18" charset="0"/>
+                <a:ea typeface="Tahoma" panose="020B0604030504040204" pitchFamily="34" charset="0"/>
                 <a:cs typeface="Times New Roman" panose="02020603050405020304" pitchFamily="18" charset="0"/>
               </a:rPr>
               <a:t>)</a:t>
@@ -9304,6 +9458,7 @@
                 <a:schemeClr val="tx1"/>
               </a:solidFill>
               <a:latin typeface="Times New Roman" panose="02020603050405020304" pitchFamily="18" charset="0"/>
+              <a:ea typeface="Tahoma" panose="020B0604030504040204" pitchFamily="34" charset="0"/>
               <a:cs typeface="Times New Roman" panose="02020603050405020304" pitchFamily="18" charset="0"/>
             </a:endParaRPr>
           </a:p>
@@ -9316,8 +9471,9 @@
                 <a:solidFill>
                   <a:schemeClr val="tx1"/>
                 </a:solidFill>
-                <a:latin typeface="Times New Roman" panose="02020603050405020304" pitchFamily="18" charset="0"/>
-                <a:cs typeface="Times New Roman" panose="02020603050405020304" pitchFamily="18" charset="0"/>
+                <a:latin typeface="Tahoma" panose="020B0604030504040204" pitchFamily="34" charset="0"/>
+                <a:ea typeface="Tahoma" panose="020B0604030504040204" pitchFamily="34" charset="0"/>
+                <a:cs typeface="Tahoma" panose="020B0604030504040204" pitchFamily="34" charset="0"/>
               </a:rPr>
               <a:t> </a:t>
             </a:r>
@@ -9330,8 +9486,9 @@
               <a:solidFill>
                 <a:schemeClr val="tx1"/>
               </a:solidFill>
-              <a:latin typeface="Times New Roman" panose="02020603050405020304" pitchFamily="18" charset="0"/>
-              <a:cs typeface="Times New Roman" panose="02020603050405020304" pitchFamily="18" charset="0"/>
+              <a:latin typeface="Tahoma" panose="020B0604030504040204" pitchFamily="34" charset="0"/>
+              <a:ea typeface="Tahoma" panose="020B0604030504040204" pitchFamily="34" charset="0"/>
+              <a:cs typeface="Tahoma" panose="020B0604030504040204" pitchFamily="34" charset="0"/>
             </a:endParaRPr>
           </a:p>
         </p:txBody>
@@ -9351,7 +9508,7 @@
         <p:spPr>
           <a:xfrm>
             <a:off x="186182" y="1730007"/>
-            <a:ext cx="8206255" cy="2308324"/>
+            <a:ext cx="8206255" cy="3046988"/>
           </a:xfrm>
           <a:prstGeom prst="rect">
             <a:avLst/>
@@ -9366,15 +9523,15 @@
           <a:p>
             <a:r>
               <a:rPr lang="pt-BR" sz="2400" b="1" dirty="0" err="1">
-                <a:latin typeface="Arial" panose="020B0604020202020204" pitchFamily="34" charset="0"/>
-                <a:cs typeface="Arial" panose="020B0604020202020204" pitchFamily="34" charset="0"/>
+                <a:latin typeface="Times New Roman" panose="02020603050405020304" pitchFamily="18" charset="0"/>
+                <a:cs typeface="Times New Roman" panose="02020603050405020304" pitchFamily="18" charset="0"/>
               </a:rPr>
               <a:t>import</a:t>
             </a:r>
             <a:r>
               <a:rPr lang="pt-BR" sz="2400" b="1" dirty="0">
-                <a:latin typeface="Arial" panose="020B0604020202020204" pitchFamily="34" charset="0"/>
-                <a:cs typeface="Arial" panose="020B0604020202020204" pitchFamily="34" charset="0"/>
+                <a:latin typeface="Times New Roman" panose="02020603050405020304" pitchFamily="18" charset="0"/>
+                <a:cs typeface="Times New Roman" panose="02020603050405020304" pitchFamily="18" charset="0"/>
               </a:rPr>
               <a:t> </a:t>
             </a:r>
@@ -9383,8 +9540,8 @@
                 <a:solidFill>
                   <a:srgbClr val="FF0000"/>
                 </a:solidFill>
-                <a:latin typeface="Arial" panose="020B0604020202020204" pitchFamily="34" charset="0"/>
-                <a:cs typeface="Arial" panose="020B0604020202020204" pitchFamily="34" charset="0"/>
+                <a:latin typeface="Times New Roman" panose="02020603050405020304" pitchFamily="18" charset="0"/>
+                <a:cs typeface="Times New Roman" panose="02020603050405020304" pitchFamily="18" charset="0"/>
               </a:rPr>
               <a:t>struct</a:t>
             </a:r>
@@ -9392,18 +9549,27 @@
               <a:solidFill>
                 <a:srgbClr val="FF0000"/>
               </a:solidFill>
-              <a:latin typeface="Arial" panose="020B0604020202020204" pitchFamily="34" charset="0"/>
-              <a:cs typeface="Arial" panose="020B0604020202020204" pitchFamily="34" charset="0"/>
+              <a:latin typeface="Times New Roman" panose="02020603050405020304" pitchFamily="18" charset="0"/>
+              <a:cs typeface="Times New Roman" panose="02020603050405020304" pitchFamily="18" charset="0"/>
             </a:endParaRPr>
           </a:p>
           <a:p>
+            <a:endParaRPr lang="pt-BR" sz="2400" b="1" dirty="0">
+              <a:solidFill>
+                <a:srgbClr val="FF0000"/>
+              </a:solidFill>
+              <a:latin typeface="Times New Roman" panose="02020603050405020304" pitchFamily="18" charset="0"/>
+              <a:cs typeface="Times New Roman" panose="02020603050405020304" pitchFamily="18" charset="0"/>
+            </a:endParaRPr>
+          </a:p>
+          <a:p>
             <a:r>
               <a:rPr lang="pt-BR" sz="2400" b="1" dirty="0">
                 <a:solidFill>
                   <a:srgbClr val="FF0000"/>
                 </a:solidFill>
-                <a:latin typeface="Arial" panose="020B0604020202020204" pitchFamily="34" charset="0"/>
-                <a:cs typeface="Arial" panose="020B0604020202020204" pitchFamily="34" charset="0"/>
+                <a:latin typeface="Times New Roman" panose="02020603050405020304" pitchFamily="18" charset="0"/>
+                <a:cs typeface="Times New Roman" panose="02020603050405020304" pitchFamily="18" charset="0"/>
               </a:rPr>
               <a:t>Cliente = (‘80s I I 11s f I')</a:t>
             </a:r>
@@ -9411,15 +9577,15 @@
           <a:p>
             <a:r>
               <a:rPr lang="pt-BR" sz="2400" dirty="0" err="1">
-                <a:latin typeface="Arial" panose="020B0604020202020204" pitchFamily="34" charset="0"/>
-                <a:cs typeface="Arial" panose="020B0604020202020204" pitchFamily="34" charset="0"/>
+                <a:latin typeface="Times New Roman" panose="02020603050405020304" pitchFamily="18" charset="0"/>
+                <a:cs typeface="Times New Roman" panose="02020603050405020304" pitchFamily="18" charset="0"/>
               </a:rPr>
               <a:t>umCliente</a:t>
             </a:r>
             <a:r>
               <a:rPr lang="pt-BR" sz="2400" dirty="0">
-                <a:latin typeface="Arial" panose="020B0604020202020204" pitchFamily="34" charset="0"/>
-                <a:cs typeface="Arial" panose="020B0604020202020204" pitchFamily="34" charset="0"/>
+                <a:latin typeface="Times New Roman" panose="02020603050405020304" pitchFamily="18" charset="0"/>
+                <a:cs typeface="Times New Roman" panose="02020603050405020304" pitchFamily="18" charset="0"/>
               </a:rPr>
               <a:t> = </a:t>
             </a:r>
@@ -9428,134 +9594,182 @@
                 <a:solidFill>
                   <a:srgbClr val="FF0000"/>
                 </a:solidFill>
-                <a:latin typeface="Arial" panose="020B0604020202020204" pitchFamily="34" charset="0"/>
-                <a:cs typeface="Arial" panose="020B0604020202020204" pitchFamily="34" charset="0"/>
+                <a:latin typeface="Times New Roman" panose="02020603050405020304" pitchFamily="18" charset="0"/>
+                <a:cs typeface="Times New Roman" panose="02020603050405020304" pitchFamily="18" charset="0"/>
               </a:rPr>
               <a:t>struct</a:t>
             </a:r>
             <a:r>
               <a:rPr lang="pt-BR" sz="2400" dirty="0" err="1">
-                <a:latin typeface="Arial" panose="020B0604020202020204" pitchFamily="34" charset="0"/>
-                <a:cs typeface="Arial" panose="020B0604020202020204" pitchFamily="34" charset="0"/>
+                <a:latin typeface="Times New Roman" panose="02020603050405020304" pitchFamily="18" charset="0"/>
+                <a:cs typeface="Times New Roman" panose="02020603050405020304" pitchFamily="18" charset="0"/>
               </a:rPr>
               <a:t>.</a:t>
             </a:r>
             <a:r>
               <a:rPr lang="pt-BR" sz="2400" b="1" dirty="0" err="1">
-                <a:latin typeface="Arial" panose="020B0604020202020204" pitchFamily="34" charset="0"/>
-                <a:cs typeface="Arial" panose="020B0604020202020204" pitchFamily="34" charset="0"/>
+                <a:latin typeface="Times New Roman" panose="02020603050405020304" pitchFamily="18" charset="0"/>
+                <a:cs typeface="Times New Roman" panose="02020603050405020304" pitchFamily="18" charset="0"/>
               </a:rPr>
               <a:t>pack</a:t>
             </a:r>
             <a:r>
               <a:rPr lang="pt-BR" sz="2400" dirty="0">
-                <a:latin typeface="Arial" panose="020B0604020202020204" pitchFamily="34" charset="0"/>
-                <a:cs typeface="Arial" panose="020B0604020202020204" pitchFamily="34" charset="0"/>
+                <a:latin typeface="Times New Roman" panose="02020603050405020304" pitchFamily="18" charset="0"/>
+                <a:cs typeface="Times New Roman" panose="02020603050405020304" pitchFamily="18" charset="0"/>
+              </a:rPr>
+              <a:t>(Cliente, b</a:t>
+            </a:r>
+            <a:r>
+              <a:rPr lang="en-US" sz="2400" dirty="0">
+                <a:latin typeface="Times New Roman" panose="02020603050405020304" pitchFamily="18" charset="0"/>
+                <a:cs typeface="Times New Roman" panose="02020603050405020304" pitchFamily="18" charset="0"/>
+              </a:rPr>
+              <a:t> '</a:t>
+            </a:r>
+            <a:r>
+              <a:rPr lang="pt-BR" sz="2400" dirty="0">
+                <a:latin typeface="Times New Roman" panose="02020603050405020304" pitchFamily="18" charset="0"/>
+                <a:cs typeface="Times New Roman" panose="02020603050405020304" pitchFamily="18" charset="0"/>
+              </a:rPr>
+              <a:t>Fulano</a:t>
+            </a:r>
+            <a:r>
+              <a:rPr lang="en-US" sz="2400" dirty="0">
+                <a:latin typeface="Times New Roman" panose="02020603050405020304" pitchFamily="18" charset="0"/>
+                <a:cs typeface="Times New Roman" panose="02020603050405020304" pitchFamily="18" charset="0"/>
+              </a:rPr>
+              <a:t>' </a:t>
+            </a:r>
+            <a:r>
+              <a:rPr lang="pt-BR" sz="2400" dirty="0">
+                <a:latin typeface="Times New Roman" panose="02020603050405020304" pitchFamily="18" charset="0"/>
+                <a:cs typeface="Times New Roman" panose="02020603050405020304" pitchFamily="18" charset="0"/>
+              </a:rPr>
+              <a:t>, 0, 2, b</a:t>
+            </a:r>
+            <a:r>
+              <a:rPr lang="en-US" sz="2400" dirty="0">
+                <a:latin typeface="Times New Roman" panose="02020603050405020304" pitchFamily="18" charset="0"/>
+                <a:cs typeface="Times New Roman" panose="02020603050405020304" pitchFamily="18" charset="0"/>
+              </a:rPr>
+              <a:t> '</a:t>
+            </a:r>
+            <a:r>
+              <a:rPr lang="pt-BR" sz="2400" dirty="0">
+                <a:latin typeface="Times New Roman" panose="02020603050405020304" pitchFamily="18" charset="0"/>
+                <a:cs typeface="Times New Roman" panose="02020603050405020304" pitchFamily="18" charset="0"/>
+              </a:rPr>
+              <a:t>123456789001</a:t>
+            </a:r>
+            <a:r>
+              <a:rPr lang="en-US" sz="2400" dirty="0">
+                <a:latin typeface="Times New Roman" panose="02020603050405020304" pitchFamily="18" charset="0"/>
+                <a:cs typeface="Times New Roman" panose="02020603050405020304" pitchFamily="18" charset="0"/>
+              </a:rPr>
+              <a:t>'</a:t>
+            </a:r>
+            <a:r>
+              <a:rPr lang="pt-BR" sz="2400" dirty="0">
+                <a:latin typeface="Times New Roman" panose="02020603050405020304" pitchFamily="18" charset="0"/>
+                <a:cs typeface="Times New Roman" panose="02020603050405020304" pitchFamily="18" charset="0"/>
+              </a:rPr>
+              <a:t>, 5000.00, 3)</a:t>
+            </a:r>
+          </a:p>
+          <a:p>
+            <a:endParaRPr lang="pt-BR" sz="2400" dirty="0">
+              <a:latin typeface="Times New Roman" panose="02020603050405020304" pitchFamily="18" charset="0"/>
+              <a:cs typeface="Times New Roman" panose="02020603050405020304" pitchFamily="18" charset="0"/>
+            </a:endParaRPr>
+          </a:p>
+          <a:p>
+            <a:r>
+              <a:rPr lang="pt-BR" sz="2400" b="1" dirty="0">
+                <a:latin typeface="Times New Roman" panose="02020603050405020304" pitchFamily="18" charset="0"/>
+                <a:cs typeface="Times New Roman" panose="02020603050405020304" pitchFamily="18" charset="0"/>
+              </a:rPr>
+              <a:t>print</a:t>
+            </a:r>
+            <a:r>
+              <a:rPr lang="pt-BR" sz="2400" dirty="0">
+                <a:latin typeface="Times New Roman" panose="02020603050405020304" pitchFamily="18" charset="0"/>
+                <a:cs typeface="Times New Roman" panose="02020603050405020304" pitchFamily="18" charset="0"/>
+              </a:rPr>
+              <a:t>(</a:t>
+            </a:r>
+            <a:r>
+              <a:rPr lang="pt-BR" sz="2400" dirty="0" err="1">
+                <a:latin typeface="Times New Roman" panose="02020603050405020304" pitchFamily="18" charset="0"/>
+                <a:cs typeface="Times New Roman" panose="02020603050405020304" pitchFamily="18" charset="0"/>
+              </a:rPr>
+              <a:t>umCliente</a:t>
+            </a:r>
+            <a:r>
+              <a:rPr lang="pt-BR" sz="2400" dirty="0">
+                <a:latin typeface="Times New Roman" panose="02020603050405020304" pitchFamily="18" charset="0"/>
+                <a:cs typeface="Times New Roman" panose="02020603050405020304" pitchFamily="18" charset="0"/>
+              </a:rPr>
+              <a:t>)</a:t>
+            </a:r>
+          </a:p>
+          <a:p>
+            <a:r>
+              <a:rPr lang="pt-BR" sz="2400" b="1" dirty="0">
+                <a:latin typeface="Times New Roman" panose="02020603050405020304" pitchFamily="18" charset="0"/>
+                <a:cs typeface="Times New Roman" panose="02020603050405020304" pitchFamily="18" charset="0"/>
+              </a:rPr>
+              <a:t>print</a:t>
+            </a:r>
+            <a:r>
+              <a:rPr lang="pt-BR" sz="2400" dirty="0">
+                <a:latin typeface="Times New Roman" panose="02020603050405020304" pitchFamily="18" charset="0"/>
+                <a:cs typeface="Times New Roman" panose="02020603050405020304" pitchFamily="18" charset="0"/>
+              </a:rPr>
+              <a:t>(</a:t>
+            </a:r>
+            <a:r>
+              <a:rPr lang="pt-BR" sz="2400" b="1" dirty="0" err="1">
+                <a:solidFill>
+                  <a:srgbClr val="FF0000"/>
+                </a:solidFill>
+                <a:latin typeface="Times New Roman" panose="02020603050405020304" pitchFamily="18" charset="0"/>
+                <a:cs typeface="Times New Roman" panose="02020603050405020304" pitchFamily="18" charset="0"/>
+              </a:rPr>
+              <a:t>struct</a:t>
+            </a:r>
+            <a:r>
+              <a:rPr lang="pt-BR" sz="2400" dirty="0" err="1">
+                <a:latin typeface="Times New Roman" panose="02020603050405020304" pitchFamily="18" charset="0"/>
+                <a:cs typeface="Times New Roman" panose="02020603050405020304" pitchFamily="18" charset="0"/>
+              </a:rPr>
+              <a:t>.</a:t>
+            </a:r>
+            <a:r>
+              <a:rPr lang="pt-BR" sz="2400" b="1" dirty="0" err="1">
+                <a:latin typeface="Times New Roman" panose="02020603050405020304" pitchFamily="18" charset="0"/>
+                <a:cs typeface="Times New Roman" panose="02020603050405020304" pitchFamily="18" charset="0"/>
+              </a:rPr>
+              <a:t>unpack</a:t>
+            </a:r>
+            <a:r>
+              <a:rPr lang="pt-BR" sz="2400" dirty="0">
+                <a:latin typeface="Times New Roman" panose="02020603050405020304" pitchFamily="18" charset="0"/>
+                <a:cs typeface="Times New Roman" panose="02020603050405020304" pitchFamily="18" charset="0"/>
               </a:rPr>
               <a:t>(Cliente, </a:t>
             </a:r>
             <a:r>
               <a:rPr lang="pt-BR" sz="2400" dirty="0" err="1">
-                <a:latin typeface="Arial" panose="020B0604020202020204" pitchFamily="34" charset="0"/>
-                <a:cs typeface="Arial" panose="020B0604020202020204" pitchFamily="34" charset="0"/>
-              </a:rPr>
-              <a:t>b"Fulano</a:t>
+                <a:latin typeface="Times New Roman" panose="02020603050405020304" pitchFamily="18" charset="0"/>
+                <a:cs typeface="Times New Roman" panose="02020603050405020304" pitchFamily="18" charset="0"/>
+              </a:rPr>
+              <a:t>umCliente</a:t>
             </a:r>
             <a:r>
               <a:rPr lang="pt-BR" sz="2400" dirty="0">
-                <a:latin typeface="Arial" panose="020B0604020202020204" pitchFamily="34" charset="0"/>
-                <a:cs typeface="Arial" panose="020B0604020202020204" pitchFamily="34" charset="0"/>
-              </a:rPr>
-              <a:t>", 0, 2, b’123456789001, 5000.00, 3)</a:t>
-            </a:r>
-          </a:p>
-          <a:p>
-            <a:r>
-              <a:rPr lang="pt-BR" sz="2400" b="1" dirty="0">
-                <a:latin typeface="Arial" panose="020B0604020202020204" pitchFamily="34" charset="0"/>
-                <a:cs typeface="Arial" panose="020B0604020202020204" pitchFamily="34" charset="0"/>
-              </a:rPr>
-              <a:t>print</a:t>
-            </a:r>
-            <a:r>
-              <a:rPr lang="pt-BR" sz="2400" dirty="0">
-                <a:latin typeface="Arial" panose="020B0604020202020204" pitchFamily="34" charset="0"/>
-                <a:cs typeface="Arial" panose="020B0604020202020204" pitchFamily="34" charset="0"/>
-              </a:rPr>
-              <a:t>(</a:t>
-            </a:r>
-            <a:r>
-              <a:rPr lang="pt-BR" sz="2400" dirty="0" err="1">
-                <a:latin typeface="Arial" panose="020B0604020202020204" pitchFamily="34" charset="0"/>
-                <a:cs typeface="Arial" panose="020B0604020202020204" pitchFamily="34" charset="0"/>
-              </a:rPr>
-              <a:t>umCliente</a:t>
-            </a:r>
-            <a:r>
-              <a:rPr lang="pt-BR" sz="2400" dirty="0">
-                <a:latin typeface="Arial" panose="020B0604020202020204" pitchFamily="34" charset="0"/>
-                <a:cs typeface="Arial" panose="020B0604020202020204" pitchFamily="34" charset="0"/>
-              </a:rPr>
-              <a:t>)</a:t>
-            </a:r>
-          </a:p>
-          <a:p>
-            <a:r>
-              <a:rPr lang="pt-BR" sz="2400" b="1" dirty="0">
-                <a:latin typeface="Arial" panose="020B0604020202020204" pitchFamily="34" charset="0"/>
-                <a:cs typeface="Arial" panose="020B0604020202020204" pitchFamily="34" charset="0"/>
-              </a:rPr>
-              <a:t>print</a:t>
-            </a:r>
-            <a:r>
-              <a:rPr lang="pt-BR" sz="2400" dirty="0">
-                <a:latin typeface="Arial" panose="020B0604020202020204" pitchFamily="34" charset="0"/>
-                <a:cs typeface="Arial" panose="020B0604020202020204" pitchFamily="34" charset="0"/>
-              </a:rPr>
-              <a:t>(</a:t>
-            </a:r>
-            <a:r>
-              <a:rPr lang="pt-BR" sz="2400" b="1" dirty="0" err="1">
-                <a:solidFill>
-                  <a:srgbClr val="FF0000"/>
-                </a:solidFill>
-                <a:latin typeface="Arial" panose="020B0604020202020204" pitchFamily="34" charset="0"/>
-                <a:cs typeface="Arial" panose="020B0604020202020204" pitchFamily="34" charset="0"/>
-              </a:rPr>
-              <a:t>struct</a:t>
-            </a:r>
-            <a:r>
-              <a:rPr lang="pt-BR" sz="2400" dirty="0" err="1">
-                <a:latin typeface="Arial" panose="020B0604020202020204" pitchFamily="34" charset="0"/>
-                <a:cs typeface="Arial" panose="020B0604020202020204" pitchFamily="34" charset="0"/>
-              </a:rPr>
-              <a:t>.</a:t>
-            </a:r>
-            <a:r>
-              <a:rPr lang="pt-BR" sz="2400" b="1" dirty="0" err="1">
-                <a:latin typeface="Arial" panose="020B0604020202020204" pitchFamily="34" charset="0"/>
-                <a:cs typeface="Arial" panose="020B0604020202020204" pitchFamily="34" charset="0"/>
-              </a:rPr>
-              <a:t>unpack</a:t>
-            </a:r>
-            <a:r>
-              <a:rPr lang="pt-BR" sz="2400" dirty="0">
-                <a:latin typeface="Arial" panose="020B0604020202020204" pitchFamily="34" charset="0"/>
-                <a:cs typeface="Arial" panose="020B0604020202020204" pitchFamily="34" charset="0"/>
-              </a:rPr>
-              <a:t>(Cliente, </a:t>
-            </a:r>
-            <a:r>
-              <a:rPr lang="pt-BR" sz="2400" dirty="0" err="1">
-                <a:latin typeface="Arial" panose="020B0604020202020204" pitchFamily="34" charset="0"/>
-                <a:cs typeface="Arial" panose="020B0604020202020204" pitchFamily="34" charset="0"/>
-              </a:rPr>
-              <a:t>umCliente</a:t>
-            </a:r>
-            <a:r>
-              <a:rPr lang="pt-BR" sz="2400" dirty="0">
-                <a:latin typeface="Arial" panose="020B0604020202020204" pitchFamily="34" charset="0"/>
-                <a:cs typeface="Arial" panose="020B0604020202020204" pitchFamily="34" charset="0"/>
+                <a:latin typeface="Times New Roman" panose="02020603050405020304" pitchFamily="18" charset="0"/>
+                <a:cs typeface="Times New Roman" panose="02020603050405020304" pitchFamily="18" charset="0"/>
               </a:rPr>
               <a:t>))</a:t>
             </a:r>
@@ -9677,7 +9891,7 @@
               <a:buChar char="§"/>
             </a:pPr>
             <a:r>
-              <a:rPr lang="pt-BR" b="1" dirty="0">
+              <a:rPr lang="pt-BR" sz="2400" b="1" dirty="0">
                 <a:solidFill>
                   <a:srgbClr val="FF0000"/>
                 </a:solidFill>
@@ -9687,21 +9901,21 @@
               <a:t> Registos </a:t>
             </a:r>
             <a:r>
-              <a:rPr lang="pt-BR" b="1" dirty="0">
+              <a:rPr lang="pt-BR" sz="2400" b="1" dirty="0">
                 <a:latin typeface="Times New Roman" panose="02020603050405020304" pitchFamily="18" charset="0"/>
                 <a:cs typeface="Times New Roman" panose="02020603050405020304" pitchFamily="18" charset="0"/>
               </a:rPr>
               <a:t>em </a:t>
             </a:r>
             <a:r>
-              <a:rPr lang="pt-BR" b="1" dirty="0" err="1">
+              <a:rPr lang="pt-BR" sz="2400" b="1" dirty="0" err="1">
                 <a:latin typeface="Times New Roman" panose="02020603050405020304" pitchFamily="18" charset="0"/>
                 <a:cs typeface="Times New Roman" panose="02020603050405020304" pitchFamily="18" charset="0"/>
               </a:rPr>
               <a:t>Pyhton</a:t>
             </a:r>
             <a:r>
-              <a:rPr lang="pt-BR" dirty="0">
+              <a:rPr lang="pt-BR" sz="2400" dirty="0">
                 <a:solidFill>
                   <a:schemeClr val="tx1"/>
                 </a:solidFill>
@@ -9716,7 +9930,7 @@
               <a:buNone/>
             </a:pPr>
             <a:r>
-              <a:rPr lang="pt-BR" dirty="0">
+              <a:rPr lang="pt-BR" sz="2400" dirty="0">
                 <a:solidFill>
                   <a:schemeClr val="tx1"/>
                 </a:solidFill>
@@ -9726,7 +9940,7 @@
               <a:t>– </a:t>
             </a:r>
             <a:r>
-              <a:rPr lang="pt-BR" b="1" dirty="0">
+              <a:rPr lang="pt-BR" sz="2400" b="1" dirty="0">
                 <a:solidFill>
                   <a:schemeClr val="tx1"/>
                 </a:solidFill>
@@ -9736,7 +9950,7 @@
               <a:t>Foco primário</a:t>
             </a:r>
             <a:r>
-              <a:rPr lang="pt-BR" dirty="0">
+              <a:rPr lang="pt-BR" sz="2400" dirty="0">
                 <a:solidFill>
                   <a:schemeClr val="tx1"/>
                 </a:solidFill>
@@ -9746,7 +9960,7 @@
               <a:t>: trocar dados com C/C++, </a:t>
             </a:r>
             <a:r>
-              <a:rPr lang="pt-BR" dirty="0" err="1">
+              <a:rPr lang="pt-BR" sz="2400" dirty="0" err="1">
                 <a:solidFill>
                   <a:schemeClr val="tx1"/>
                 </a:solidFill>
@@ -9755,7 +9969,7 @@
               </a:rPr>
               <a:t>etc</a:t>
             </a:r>
-            <a:endParaRPr lang="pt-BR" dirty="0">
+            <a:endParaRPr lang="pt-BR" sz="2400" dirty="0">
               <a:solidFill>
                 <a:schemeClr val="tx1"/>
               </a:solidFill>
@@ -9767,7 +9981,7 @@
             <a:pPr marL="0" indent="0" algn="just">
               <a:buNone/>
             </a:pPr>
-            <a:endParaRPr lang="pt-BR" dirty="0">
+            <a:endParaRPr lang="pt-BR" sz="2400" dirty="0">
               <a:solidFill>
                 <a:schemeClr val="tx1"/>
               </a:solidFill>
@@ -9781,14 +9995,14 @@
               <a:buChar char="§"/>
             </a:pPr>
             <a:r>
-              <a:rPr lang="pt-BR" dirty="0">
+              <a:rPr lang="pt-BR" sz="2400" dirty="0">
                 <a:latin typeface="Times New Roman" panose="02020603050405020304" pitchFamily="18" charset="0"/>
                 <a:cs typeface="Times New Roman" panose="02020603050405020304" pitchFamily="18" charset="0"/>
               </a:rPr>
               <a:t> </a:t>
             </a:r>
             <a:r>
-              <a:rPr lang="pt-BR" b="1" dirty="0">
+              <a:rPr lang="pt-BR" sz="2400" b="1" dirty="0">
                 <a:solidFill>
                   <a:srgbClr val="FF0000"/>
                 </a:solidFill>
@@ -9798,7 +10012,7 @@
               <a:t>Como guardar dados organizados em Python</a:t>
             </a:r>
             <a:r>
-              <a:rPr lang="pt-BR" dirty="0">
+              <a:rPr lang="pt-BR" sz="2400" dirty="0">
                 <a:solidFill>
                   <a:schemeClr val="tx1"/>
                 </a:solidFill>
@@ -9813,7 +10027,7 @@
               <a:buNone/>
             </a:pPr>
             <a:r>
-              <a:rPr lang="pt-BR" dirty="0">
+              <a:rPr lang="pt-BR" sz="2400" dirty="0">
                 <a:solidFill>
                   <a:schemeClr val="tx1"/>
                 </a:solidFill>
@@ -9823,7 +10037,7 @@
               <a:t>– </a:t>
             </a:r>
             <a:r>
-              <a:rPr lang="pt-BR" b="1" dirty="0">
+              <a:rPr lang="pt-BR" sz="2400" b="1" dirty="0">
                 <a:solidFill>
                   <a:schemeClr val="tx1"/>
                 </a:solidFill>
@@ -9833,7 +10047,7 @@
               <a:t>Forma mais conveniente</a:t>
             </a:r>
             <a:r>
-              <a:rPr lang="pt-BR" dirty="0">
+              <a:rPr lang="pt-BR" sz="2400" dirty="0">
                 <a:solidFill>
                   <a:schemeClr val="tx1"/>
                 </a:solidFill>
@@ -9843,7 +10057,7 @@
               <a:t>... </a:t>
             </a:r>
             <a:r>
-              <a:rPr lang="pt-BR" b="1" dirty="0" err="1">
+              <a:rPr lang="pt-BR" sz="2400" b="1" dirty="0" err="1">
                 <a:solidFill>
                   <a:srgbClr val="FF0000"/>
                 </a:solidFill>
@@ -9853,7 +10067,7 @@
               <a:t>Tuplas</a:t>
             </a:r>
             <a:r>
-              <a:rPr lang="pt-BR" b="1" dirty="0">
+              <a:rPr lang="pt-BR" sz="2400" b="1" dirty="0">
                 <a:solidFill>
                   <a:srgbClr val="FF0000"/>
                 </a:solidFill>
@@ -9863,7 +10077,7 @@
               <a:t> nomeadas</a:t>
             </a:r>
             <a:r>
-              <a:rPr lang="pt-BR" dirty="0">
+              <a:rPr lang="pt-BR" sz="2400" dirty="0">
                 <a:solidFill>
                   <a:schemeClr val="tx1"/>
                 </a:solidFill>
@@ -10006,7 +10220,7 @@
               <a:buChar char="§"/>
             </a:pPr>
             <a:r>
-              <a:rPr lang="pt-BR" sz="3200" b="1" dirty="0">
+              <a:rPr lang="pt-BR" sz="2400" b="1" dirty="0">
                 <a:solidFill>
                   <a:srgbClr val="FF0000"/>
                 </a:solidFill>
@@ -10016,7 +10230,7 @@
               <a:t> </a:t>
             </a:r>
             <a:r>
-              <a:rPr lang="pt-BR" sz="3200" b="1" dirty="0" err="1">
+              <a:rPr lang="pt-BR" sz="2400" b="1" dirty="0" err="1">
                 <a:solidFill>
                   <a:srgbClr val="FF0000"/>
                 </a:solidFill>
@@ -10026,21 +10240,21 @@
               <a:t>Tuplas</a:t>
             </a:r>
             <a:r>
-              <a:rPr lang="pt-BR" sz="3200" b="1" dirty="0">
+              <a:rPr lang="pt-BR" sz="2400" b="1" dirty="0">
                 <a:latin typeface="Times New Roman" panose="02020603050405020304" pitchFamily="18" charset="0"/>
                 <a:cs typeface="Times New Roman" panose="02020603050405020304" pitchFamily="18" charset="0"/>
               </a:rPr>
               <a:t> - Agrupamentos</a:t>
             </a:r>
             <a:r>
-              <a:rPr lang="pt-BR" sz="3200" dirty="0">
+              <a:rPr lang="pt-BR" sz="2400" dirty="0">
                 <a:latin typeface="Times New Roman" panose="02020603050405020304" pitchFamily="18" charset="0"/>
                 <a:cs typeface="Times New Roman" panose="02020603050405020304" pitchFamily="18" charset="0"/>
               </a:rPr>
               <a:t> de dados </a:t>
             </a:r>
             <a:r>
-              <a:rPr lang="pt-BR" sz="3200" b="1" dirty="0">
+              <a:rPr lang="pt-BR" sz="2400" b="1" dirty="0">
                 <a:solidFill>
                   <a:srgbClr val="FF0000"/>
                 </a:solidFill>
@@ -10055,14 +10269,14 @@
               <a:buNone/>
             </a:pPr>
             <a:r>
-              <a:rPr lang="pt-BR" sz="3200" dirty="0">
+              <a:rPr lang="pt-BR" sz="2400" dirty="0">
                 <a:latin typeface="Times New Roman" panose="02020603050405020304" pitchFamily="18" charset="0"/>
                 <a:cs typeface="Times New Roman" panose="02020603050405020304" pitchFamily="18" charset="0"/>
               </a:rPr>
               <a:t>– Existe em Python, F#</a:t>
             </a:r>
             <a:r>
-              <a:rPr lang="pt-BR" sz="3200" dirty="0">
+              <a:rPr lang="pt-BR" sz="2400" dirty="0">
                 <a:solidFill>
                   <a:schemeClr val="tx1"/>
                 </a:solidFill>
@@ -10072,7 +10286,7 @@
               <a:t> (F Sharp .NET), </a:t>
             </a:r>
             <a:r>
-              <a:rPr lang="pt-BR" sz="3200" dirty="0" err="1">
+              <a:rPr lang="pt-BR" sz="2400" dirty="0" err="1">
                 <a:solidFill>
                   <a:schemeClr val="tx1"/>
                 </a:solidFill>
@@ -10082,7 +10296,7 @@
               <a:t>etc</a:t>
             </a:r>
             <a:r>
-              <a:rPr lang="pt-BR" sz="3200" dirty="0">
+              <a:rPr lang="pt-BR" sz="2400" dirty="0">
                 <a:latin typeface="Times New Roman" panose="02020603050405020304" pitchFamily="18" charset="0"/>
                 <a:cs typeface="Times New Roman" panose="02020603050405020304" pitchFamily="18" charset="0"/>
               </a:rPr>
@@ -10094,28 +10308,28 @@
               <a:buNone/>
             </a:pPr>
             <a:r>
-              <a:rPr lang="pt-BR" sz="3200" dirty="0">
+              <a:rPr lang="pt-BR" sz="2400" dirty="0">
                 <a:latin typeface="Times New Roman" panose="02020603050405020304" pitchFamily="18" charset="0"/>
                 <a:cs typeface="Times New Roman" panose="02020603050405020304" pitchFamily="18" charset="0"/>
               </a:rPr>
               <a:t>– É como definir um </a:t>
             </a:r>
             <a:r>
-              <a:rPr lang="pt-BR" sz="3200" b="1" dirty="0">
+              <a:rPr lang="pt-BR" sz="2400" b="1" dirty="0">
                 <a:latin typeface="Times New Roman" panose="02020603050405020304" pitchFamily="18" charset="0"/>
                 <a:cs typeface="Times New Roman" panose="02020603050405020304" pitchFamily="18" charset="0"/>
               </a:rPr>
               <a:t>registro</a:t>
             </a:r>
             <a:r>
-              <a:rPr lang="pt-BR" sz="3200" dirty="0">
+              <a:rPr lang="pt-BR" sz="2400" dirty="0">
                 <a:latin typeface="Times New Roman" panose="02020603050405020304" pitchFamily="18" charset="0"/>
                 <a:cs typeface="Times New Roman" panose="02020603050405020304" pitchFamily="18" charset="0"/>
               </a:rPr>
               <a:t>, porém </a:t>
             </a:r>
             <a:r>
-              <a:rPr lang="pt-BR" sz="3200" b="1" dirty="0">
+              <a:rPr lang="pt-BR" sz="2400" b="1" dirty="0">
                 <a:solidFill>
                   <a:srgbClr val="FF0000"/>
                 </a:solidFill>
@@ -10125,12 +10339,21 @@
               <a:t>imutável</a:t>
             </a:r>
             <a:r>
-              <a:rPr lang="pt-BR" sz="3200" dirty="0">
+              <a:rPr lang="pt-BR" sz="2400" dirty="0">
                 <a:latin typeface="Times New Roman" panose="02020603050405020304" pitchFamily="18" charset="0"/>
                 <a:cs typeface="Times New Roman" panose="02020603050405020304" pitchFamily="18" charset="0"/>
               </a:rPr>
               <a:t> </a:t>
             </a:r>
+          </a:p>
+          <a:p>
+            <a:pPr marL="0" indent="0" algn="just">
+              <a:buNone/>
+            </a:pPr>
+            <a:endParaRPr lang="pt-BR" sz="2400" dirty="0">
+              <a:latin typeface="Times New Roman" panose="02020603050405020304" pitchFamily="18" charset="0"/>
+              <a:cs typeface="Times New Roman" panose="02020603050405020304" pitchFamily="18" charset="0"/>
+            </a:endParaRPr>
           </a:p>
           <a:p>
             <a:pPr algn="just">
@@ -10138,21 +10361,21 @@
               <a:buChar char="§"/>
             </a:pPr>
             <a:r>
-              <a:rPr lang="pt-BR" sz="3200" dirty="0">
+              <a:rPr lang="pt-BR" sz="2400" dirty="0">
                 <a:latin typeface="Times New Roman" panose="02020603050405020304" pitchFamily="18" charset="0"/>
                 <a:cs typeface="Times New Roman" panose="02020603050405020304" pitchFamily="18" charset="0"/>
               </a:rPr>
               <a:t> Em </a:t>
             </a:r>
             <a:r>
-              <a:rPr lang="pt-BR" sz="3200" b="1" dirty="0">
+              <a:rPr lang="pt-BR" sz="2400" b="1" dirty="0">
                 <a:latin typeface="Times New Roman" panose="02020603050405020304" pitchFamily="18" charset="0"/>
                 <a:cs typeface="Times New Roman" panose="02020603050405020304" pitchFamily="18" charset="0"/>
               </a:rPr>
               <a:t>Python</a:t>
             </a:r>
             <a:r>
-              <a:rPr lang="pt-BR" sz="3200" dirty="0">
+              <a:rPr lang="pt-BR" sz="2400" dirty="0">
                 <a:latin typeface="Times New Roman" panose="02020603050405020304" pitchFamily="18" charset="0"/>
                 <a:cs typeface="Times New Roman" panose="02020603050405020304" pitchFamily="18" charset="0"/>
               </a:rPr>
@@ -10164,14 +10387,14 @@
               <a:buNone/>
             </a:pPr>
             <a:r>
-              <a:rPr lang="pt-BR" sz="3200" dirty="0">
+              <a:rPr lang="pt-BR" sz="2400" dirty="0">
                 <a:latin typeface="Times New Roman" panose="02020603050405020304" pitchFamily="18" charset="0"/>
                 <a:cs typeface="Times New Roman" panose="02020603050405020304" pitchFamily="18" charset="0"/>
               </a:rPr>
               <a:t>– Definido por</a:t>
             </a:r>
             <a:r>
-              <a:rPr lang="pt-BR" sz="3200" b="1" dirty="0">
+              <a:rPr lang="pt-BR" sz="2400" b="1" dirty="0">
                 <a:solidFill>
                   <a:srgbClr val="FF0000"/>
                 </a:solidFill>
@@ -10181,7 +10404,7 @@
               <a:t> parênteses</a:t>
             </a:r>
             <a:r>
-              <a:rPr lang="pt-BR" sz="3200" dirty="0">
+              <a:rPr lang="pt-BR" sz="2400" dirty="0">
                 <a:latin typeface="Times New Roman" panose="02020603050405020304" pitchFamily="18" charset="0"/>
                 <a:cs typeface="Times New Roman" panose="02020603050405020304" pitchFamily="18" charset="0"/>
               </a:rPr>
@@ -10192,7 +10415,7 @@
             <a:pPr marL="0" indent="0" algn="just">
               <a:buNone/>
             </a:pPr>
-            <a:endParaRPr lang="pt-BR" sz="3200" dirty="0">
+            <a:endParaRPr lang="pt-BR" sz="2400" dirty="0">
               <a:solidFill>
                 <a:schemeClr val="tx1"/>
               </a:solidFill>
@@ -10332,7 +10555,7 @@
               <a:buNone/>
             </a:pPr>
             <a:r>
-              <a:rPr lang="pt-BR" sz="3200" b="1" dirty="0">
+              <a:rPr lang="pt-BR" sz="2400" b="1" dirty="0">
                 <a:solidFill>
                   <a:srgbClr val="FF0000"/>
                 </a:solidFill>
@@ -10342,21 +10565,21 @@
               <a:t>Exemplo1</a:t>
             </a:r>
             <a:r>
-              <a:rPr lang="pt-BR" sz="3200" dirty="0">
+              <a:rPr lang="pt-BR" sz="2400" dirty="0">
                 <a:latin typeface="Times New Roman" panose="02020603050405020304" pitchFamily="18" charset="0"/>
                 <a:cs typeface="Times New Roman" panose="02020603050405020304" pitchFamily="18" charset="0"/>
               </a:rPr>
               <a:t>: </a:t>
             </a:r>
             <a:r>
-              <a:rPr lang="pt-BR" sz="3200" b="1" dirty="0" err="1">
+              <a:rPr lang="pt-BR" sz="2400" b="1" dirty="0" err="1">
                 <a:latin typeface="Times New Roman" panose="02020603050405020304" pitchFamily="18" charset="0"/>
                 <a:cs typeface="Times New Roman" panose="02020603050405020304" pitchFamily="18" charset="0"/>
               </a:rPr>
               <a:t>Tupla</a:t>
             </a:r>
             <a:r>
-              <a:rPr lang="pt-BR" sz="3200" b="1" dirty="0">
+              <a:rPr lang="pt-BR" sz="2400" b="1" dirty="0">
                 <a:latin typeface="Times New Roman" panose="02020603050405020304" pitchFamily="18" charset="0"/>
                 <a:cs typeface="Times New Roman" panose="02020603050405020304" pitchFamily="18" charset="0"/>
               </a:rPr>
@@ -10367,59 +10590,7 @@
             <a:pPr marL="0" indent="0" algn="just">
               <a:buNone/>
             </a:pPr>
-            <a:r>
-              <a:rPr lang="pt-BR" sz="3200" dirty="0" err="1">
-                <a:latin typeface="Times New Roman" panose="02020603050405020304" pitchFamily="18" charset="0"/>
-                <a:cs typeface="Times New Roman" panose="02020603050405020304" pitchFamily="18" charset="0"/>
-              </a:rPr>
-              <a:t>umaTupla</a:t>
-            </a:r>
-            <a:r>
-              <a:rPr lang="pt-BR" sz="3200" dirty="0">
-                <a:latin typeface="Times New Roman" panose="02020603050405020304" pitchFamily="18" charset="0"/>
-                <a:cs typeface="Times New Roman" panose="02020603050405020304" pitchFamily="18" charset="0"/>
-              </a:rPr>
-              <a:t> = (15, 9.4, “pera”)</a:t>
-            </a:r>
-          </a:p>
-          <a:p>
-            <a:pPr marL="0" indent="0" algn="just">
-              <a:buNone/>
-            </a:pPr>
-            <a:r>
-              <a:rPr lang="pt-BR" sz="3200" b="1" dirty="0">
-                <a:latin typeface="Times New Roman" panose="02020603050405020304" pitchFamily="18" charset="0"/>
-                <a:cs typeface="Times New Roman" panose="02020603050405020304" pitchFamily="18" charset="0"/>
-              </a:rPr>
-              <a:t>print</a:t>
-            </a:r>
-            <a:r>
-              <a:rPr lang="pt-BR" sz="3200" dirty="0">
-                <a:latin typeface="Times New Roman" panose="02020603050405020304" pitchFamily="18" charset="0"/>
-                <a:cs typeface="Times New Roman" panose="02020603050405020304" pitchFamily="18" charset="0"/>
-              </a:rPr>
-              <a:t>(</a:t>
-            </a:r>
-            <a:r>
-              <a:rPr lang="pt-BR" sz="3200" dirty="0" err="1">
-                <a:latin typeface="Times New Roman" panose="02020603050405020304" pitchFamily="18" charset="0"/>
-                <a:cs typeface="Times New Roman" panose="02020603050405020304" pitchFamily="18" charset="0"/>
-              </a:rPr>
-              <a:t>umaTupla</a:t>
-            </a:r>
-            <a:r>
-              <a:rPr lang="pt-BR" sz="3200" dirty="0">
-                <a:latin typeface="Times New Roman" panose="02020603050405020304" pitchFamily="18" charset="0"/>
-                <a:cs typeface="Times New Roman" panose="02020603050405020304" pitchFamily="18" charset="0"/>
-              </a:rPr>
-              <a:t>)</a:t>
-            </a:r>
-          </a:p>
-          <a:p>
-            <a:pPr marL="0" indent="0" algn="just">
-              <a:buNone/>
-            </a:pPr>
-            <a:endParaRPr lang="pt-BR" sz="3200" dirty="0">
+            <a:endParaRPr lang="pt-BR" sz="2400" dirty="0">
               <a:latin typeface="Times New Roman" panose="02020603050405020304" pitchFamily="18" charset="0"/>
               <a:cs typeface="Times New Roman" panose="02020603050405020304" pitchFamily="18" charset="0"/>
             </a:endParaRPr>
@@ -10428,7 +10599,96 @@
             <a:pPr marL="0" indent="0" algn="just">
               <a:buNone/>
             </a:pPr>
-            <a:endParaRPr lang="pt-BR" sz="3200" dirty="0">
+            <a:r>
+              <a:rPr lang="pt-BR" sz="2400" dirty="0" err="1">
+                <a:latin typeface="Times New Roman" panose="02020603050405020304" pitchFamily="18" charset="0"/>
+                <a:cs typeface="Times New Roman" panose="02020603050405020304" pitchFamily="18" charset="0"/>
+              </a:rPr>
+              <a:t>umaTupla</a:t>
+            </a:r>
+            <a:r>
+              <a:rPr lang="pt-BR" sz="2400" dirty="0">
+                <a:latin typeface="Times New Roman" panose="02020603050405020304" pitchFamily="18" charset="0"/>
+                <a:cs typeface="Times New Roman" panose="02020603050405020304" pitchFamily="18" charset="0"/>
+              </a:rPr>
+              <a:t> = (15, 9.4, </a:t>
+            </a:r>
+            <a:r>
+              <a:rPr lang="en-US" sz="2400" dirty="0">
+                <a:latin typeface="Times New Roman" panose="02020603050405020304" pitchFamily="18" charset="0"/>
+                <a:cs typeface="Times New Roman" panose="02020603050405020304" pitchFamily="18" charset="0"/>
+              </a:rPr>
+              <a:t>'</a:t>
+            </a:r>
+            <a:r>
+              <a:rPr lang="pt-BR" sz="2400" dirty="0">
+                <a:latin typeface="Times New Roman" panose="02020603050405020304" pitchFamily="18" charset="0"/>
+                <a:cs typeface="Times New Roman" panose="02020603050405020304" pitchFamily="18" charset="0"/>
+              </a:rPr>
+              <a:t>pera</a:t>
+            </a:r>
+            <a:r>
+              <a:rPr lang="en-US" sz="2400" dirty="0">
+                <a:latin typeface="Times New Roman" panose="02020603050405020304" pitchFamily="18" charset="0"/>
+                <a:cs typeface="Times New Roman" panose="02020603050405020304" pitchFamily="18" charset="0"/>
+              </a:rPr>
+              <a:t>'</a:t>
+            </a:r>
+            <a:r>
+              <a:rPr lang="pt-BR" sz="2400" dirty="0">
+                <a:latin typeface="Times New Roman" panose="02020603050405020304" pitchFamily="18" charset="0"/>
+                <a:cs typeface="Times New Roman" panose="02020603050405020304" pitchFamily="18" charset="0"/>
+              </a:rPr>
+              <a:t>)</a:t>
+            </a:r>
+          </a:p>
+          <a:p>
+            <a:pPr marL="0" indent="0" algn="just">
+              <a:buNone/>
+            </a:pPr>
+            <a:r>
+              <a:rPr lang="pt-BR" sz="2400" b="1" dirty="0">
+                <a:latin typeface="Times New Roman" panose="02020603050405020304" pitchFamily="18" charset="0"/>
+                <a:cs typeface="Times New Roman" panose="02020603050405020304" pitchFamily="18" charset="0"/>
+              </a:rPr>
+              <a:t>print</a:t>
+            </a:r>
+            <a:r>
+              <a:rPr lang="pt-BR" sz="2400" dirty="0">
+                <a:latin typeface="Times New Roman" panose="02020603050405020304" pitchFamily="18" charset="0"/>
+                <a:cs typeface="Times New Roman" panose="02020603050405020304" pitchFamily="18" charset="0"/>
+              </a:rPr>
+              <a:t>(</a:t>
+            </a:r>
+            <a:r>
+              <a:rPr lang="pt-BR" sz="2400" dirty="0" err="1">
+                <a:latin typeface="Times New Roman" panose="02020603050405020304" pitchFamily="18" charset="0"/>
+                <a:cs typeface="Times New Roman" panose="02020603050405020304" pitchFamily="18" charset="0"/>
+              </a:rPr>
+              <a:t>umaTupla</a:t>
+            </a:r>
+            <a:r>
+              <a:rPr lang="pt-BR" sz="2400" dirty="0">
+                <a:latin typeface="Times New Roman" panose="02020603050405020304" pitchFamily="18" charset="0"/>
+                <a:cs typeface="Times New Roman" panose="02020603050405020304" pitchFamily="18" charset="0"/>
+              </a:rPr>
+              <a:t>)</a:t>
+            </a:r>
+          </a:p>
+          <a:p>
+            <a:pPr marL="0" indent="0" algn="just">
+              <a:buNone/>
+            </a:pPr>
+            <a:endParaRPr lang="pt-BR" sz="2400" dirty="0">
+              <a:latin typeface="Times New Roman" panose="02020603050405020304" pitchFamily="18" charset="0"/>
+              <a:cs typeface="Times New Roman" panose="02020603050405020304" pitchFamily="18" charset="0"/>
+            </a:endParaRPr>
+          </a:p>
+          <a:p>
+            <a:pPr marL="0" indent="0" algn="just">
+              <a:buNone/>
+            </a:pPr>
+            <a:endParaRPr lang="pt-BR" sz="2400" dirty="0">
               <a:latin typeface="Times New Roman" panose="02020603050405020304" pitchFamily="18" charset="0"/>
               <a:cs typeface="Times New Roman" panose="02020603050405020304" pitchFamily="18" charset="0"/>
             </a:endParaRPr>
@@ -10565,7 +10825,7 @@
               <a:buNone/>
             </a:pPr>
             <a:r>
-              <a:rPr lang="pt-BR" b="1" dirty="0">
+              <a:rPr lang="pt-BR" sz="2400" b="1" dirty="0">
                 <a:solidFill>
                   <a:srgbClr val="FF0000"/>
                 </a:solidFill>
@@ -10575,7 +10835,7 @@
               <a:t>Exemplo2</a:t>
             </a:r>
             <a:r>
-              <a:rPr lang="pt-BR" dirty="0">
+              <a:rPr lang="pt-BR" sz="2400" dirty="0">
                 <a:latin typeface="Times New Roman" panose="02020603050405020304" pitchFamily="18" charset="0"/>
                 <a:cs typeface="Times New Roman" panose="02020603050405020304" pitchFamily="18" charset="0"/>
               </a:rPr>
@@ -10587,11 +10847,67 @@
               <a:buNone/>
             </a:pPr>
             <a:r>
-              <a:rPr lang="pt-BR" dirty="0">
-                <a:latin typeface="Times New Roman" panose="02020603050405020304" pitchFamily="18" charset="0"/>
-                <a:cs typeface="Times New Roman" panose="02020603050405020304" pitchFamily="18" charset="0"/>
-              </a:rPr>
-              <a:t>cliente = (“Julia Cardoso", "01234567890", 7000.0, 17)</a:t>
+              <a:rPr lang="pt-BR" sz="2400" dirty="0">
+                <a:latin typeface="Times New Roman" panose="02020603050405020304" pitchFamily="18" charset="0"/>
+                <a:cs typeface="Times New Roman" panose="02020603050405020304" pitchFamily="18" charset="0"/>
+              </a:rPr>
+              <a:t>cliente = (</a:t>
+            </a:r>
+            <a:r>
+              <a:rPr lang="en-US" sz="2400" dirty="0">
+                <a:latin typeface="Times New Roman" panose="02020603050405020304" pitchFamily="18" charset="0"/>
+                <a:cs typeface="Times New Roman" panose="02020603050405020304" pitchFamily="18" charset="0"/>
+              </a:rPr>
+              <a:t>'</a:t>
+            </a:r>
+            <a:r>
+              <a:rPr lang="pt-BR" sz="2400" dirty="0">
+                <a:latin typeface="Times New Roman" panose="02020603050405020304" pitchFamily="18" charset="0"/>
+                <a:cs typeface="Times New Roman" panose="02020603050405020304" pitchFamily="18" charset="0"/>
+              </a:rPr>
+              <a:t>Julia Cardoso</a:t>
+            </a:r>
+            <a:r>
+              <a:rPr lang="en-US" sz="2400" dirty="0">
+                <a:latin typeface="Times New Roman" panose="02020603050405020304" pitchFamily="18" charset="0"/>
+                <a:cs typeface="Times New Roman" panose="02020603050405020304" pitchFamily="18" charset="0"/>
+              </a:rPr>
+              <a:t>' </a:t>
+            </a:r>
+            <a:r>
+              <a:rPr lang="pt-BR" sz="2400" dirty="0">
+                <a:latin typeface="Times New Roman" panose="02020603050405020304" pitchFamily="18" charset="0"/>
+                <a:cs typeface="Times New Roman" panose="02020603050405020304" pitchFamily="18" charset="0"/>
+              </a:rPr>
+              <a:t>, </a:t>
+            </a:r>
+            <a:r>
+              <a:rPr lang="en-US" sz="2400" dirty="0">
+                <a:latin typeface="Times New Roman" panose="02020603050405020304" pitchFamily="18" charset="0"/>
+                <a:cs typeface="Times New Roman" panose="02020603050405020304" pitchFamily="18" charset="0"/>
+              </a:rPr>
+              <a:t>'</a:t>
+            </a:r>
+            <a:r>
+              <a:rPr lang="pt-BR" sz="2400" dirty="0">
+                <a:latin typeface="Times New Roman" panose="02020603050405020304" pitchFamily="18" charset="0"/>
+                <a:cs typeface="Times New Roman" panose="02020603050405020304" pitchFamily="18" charset="0"/>
+              </a:rPr>
+              <a:t>01234567890</a:t>
+            </a:r>
+            <a:r>
+              <a:rPr lang="en-US" sz="2400" dirty="0">
+                <a:latin typeface="Times New Roman" panose="02020603050405020304" pitchFamily="18" charset="0"/>
+                <a:cs typeface="Times New Roman" panose="02020603050405020304" pitchFamily="18" charset="0"/>
+              </a:rPr>
+              <a:t>' </a:t>
+            </a:r>
+            <a:r>
+              <a:rPr lang="pt-BR" sz="2400" dirty="0">
+                <a:latin typeface="Times New Roman" panose="02020603050405020304" pitchFamily="18" charset="0"/>
+                <a:cs typeface="Times New Roman" panose="02020603050405020304" pitchFamily="18" charset="0"/>
+              </a:rPr>
+              <a:t>, 7000.0, 17)</a:t>
             </a:r>
           </a:p>
           <a:p>
@@ -10599,14 +10915,14 @@
               <a:buNone/>
             </a:pPr>
             <a:r>
-              <a:rPr lang="pt-BR" b="1" dirty="0">
+              <a:rPr lang="pt-BR" sz="2400" b="1" dirty="0">
                 <a:latin typeface="Times New Roman" panose="02020603050405020304" pitchFamily="18" charset="0"/>
                 <a:cs typeface="Times New Roman" panose="02020603050405020304" pitchFamily="18" charset="0"/>
               </a:rPr>
               <a:t>print</a:t>
             </a:r>
             <a:r>
-              <a:rPr lang="pt-BR" dirty="0">
+              <a:rPr lang="pt-BR" sz="2400" dirty="0">
                 <a:latin typeface="Times New Roman" panose="02020603050405020304" pitchFamily="18" charset="0"/>
                 <a:cs typeface="Times New Roman" panose="02020603050405020304" pitchFamily="18" charset="0"/>
               </a:rPr>
@@ -10617,7 +10933,7 @@
             <a:pPr marL="0" indent="0" algn="just">
               <a:buNone/>
             </a:pPr>
-            <a:endParaRPr lang="pt-BR" dirty="0">
+            <a:endParaRPr lang="pt-BR" sz="2400" dirty="0">
               <a:latin typeface="Times New Roman" panose="02020603050405020304" pitchFamily="18" charset="0"/>
               <a:cs typeface="Times New Roman" panose="02020603050405020304" pitchFamily="18" charset="0"/>
             </a:endParaRPr>
@@ -10627,21 +10943,21 @@
               <a:buNone/>
             </a:pPr>
             <a:r>
-              <a:rPr lang="pt-BR" b="1" dirty="0">
+              <a:rPr lang="pt-BR" sz="2400" b="1" dirty="0">
                 <a:latin typeface="Times New Roman" panose="02020603050405020304" pitchFamily="18" charset="0"/>
                 <a:cs typeface="Times New Roman" panose="02020603050405020304" pitchFamily="18" charset="0"/>
               </a:rPr>
               <a:t>Nota</a:t>
             </a:r>
             <a:r>
-              <a:rPr lang="pt-BR" dirty="0">
+              <a:rPr lang="pt-BR" sz="2400" dirty="0">
                 <a:latin typeface="Times New Roman" panose="02020603050405020304" pitchFamily="18" charset="0"/>
                 <a:cs typeface="Times New Roman" panose="02020603050405020304" pitchFamily="18" charset="0"/>
               </a:rPr>
               <a:t>: O acesso é como em </a:t>
             </a:r>
             <a:r>
-              <a:rPr lang="pt-BR" b="1" dirty="0">
+              <a:rPr lang="pt-BR" sz="2400" b="1" dirty="0">
                 <a:solidFill>
                   <a:srgbClr val="FF0000"/>
                 </a:solidFill>
@@ -10656,14 +10972,14 @@
               <a:buNone/>
             </a:pPr>
             <a:r>
-              <a:rPr lang="pt-BR" dirty="0">
+              <a:rPr lang="pt-BR" sz="2400" dirty="0">
                 <a:latin typeface="Times New Roman" panose="02020603050405020304" pitchFamily="18" charset="0"/>
                 <a:cs typeface="Times New Roman" panose="02020603050405020304" pitchFamily="18" charset="0"/>
               </a:rPr>
               <a:t>	   </a:t>
             </a:r>
             <a:r>
-              <a:rPr lang="pt-BR" b="1" dirty="0" err="1">
+              <a:rPr lang="pt-BR" sz="2400" b="1" dirty="0" err="1">
                 <a:solidFill>
                   <a:srgbClr val="FF0000"/>
                 </a:solidFill>
@@ -10673,7 +10989,7 @@
               <a:t>Tupla</a:t>
             </a:r>
             <a:r>
-              <a:rPr lang="pt-BR" dirty="0">
+              <a:rPr lang="pt-BR" sz="2400" dirty="0">
                 <a:latin typeface="Times New Roman" panose="02020603050405020304" pitchFamily="18" charset="0"/>
                 <a:cs typeface="Times New Roman" panose="02020603050405020304" pitchFamily="18" charset="0"/>
               </a:rPr>
@@ -11341,14 +11657,42 @@
               <a:buNone/>
             </a:pPr>
             <a:r>
-              <a:rPr lang="pt-BR" dirty="0">
-                <a:latin typeface="Times New Roman" panose="02020603050405020304" pitchFamily="18" charset="0"/>
-                <a:cs typeface="Times New Roman" panose="02020603050405020304" pitchFamily="18" charset="0"/>
-              </a:rPr>
-              <a:t>cliente[1] = "12345678900" #</a:t>
-            </a:r>
-            <a:r>
-              <a:rPr lang="pt-BR" b="1" dirty="0">
+              <a:rPr lang="pt-BR" sz="2400" dirty="0">
+                <a:latin typeface="Times New Roman" panose="02020603050405020304" pitchFamily="18" charset="0"/>
+                <a:cs typeface="Times New Roman" panose="02020603050405020304" pitchFamily="18" charset="0"/>
+              </a:rPr>
+              <a:t>cliente[1] = </a:t>
+            </a:r>
+            <a:r>
+              <a:rPr lang="en-US" sz="2400" dirty="0">
+                <a:latin typeface="Times New Roman" panose="02020603050405020304" pitchFamily="18" charset="0"/>
+                <a:cs typeface="Times New Roman" panose="02020603050405020304" pitchFamily="18" charset="0"/>
+              </a:rPr>
+              <a:t>'</a:t>
+            </a:r>
+            <a:r>
+              <a:rPr lang="pt-BR" sz="2400" dirty="0">
+                <a:latin typeface="Times New Roman" panose="02020603050405020304" pitchFamily="18" charset="0"/>
+                <a:cs typeface="Times New Roman" panose="02020603050405020304" pitchFamily="18" charset="0"/>
+              </a:rPr>
+              <a:t>12345678900</a:t>
+            </a:r>
+            <a:r>
+              <a:rPr lang="en-US" sz="2400" dirty="0">
+                <a:latin typeface="Times New Roman" panose="02020603050405020304" pitchFamily="18" charset="0"/>
+                <a:cs typeface="Times New Roman" panose="02020603050405020304" pitchFamily="18" charset="0"/>
+              </a:rPr>
+              <a:t>' </a:t>
+            </a:r>
+            <a:r>
+              <a:rPr lang="pt-BR" sz="2400" dirty="0">
+                <a:latin typeface="Times New Roman" panose="02020603050405020304" pitchFamily="18" charset="0"/>
+                <a:cs typeface="Times New Roman" panose="02020603050405020304" pitchFamily="18" charset="0"/>
+              </a:rPr>
+              <a:t> #</a:t>
+            </a:r>
+            <a:r>
+              <a:rPr lang="pt-BR" sz="2400" b="1" dirty="0">
                 <a:solidFill>
                   <a:srgbClr val="FF0000"/>
                 </a:solidFill>
@@ -11358,7 +11702,7 @@
               <a:t>Tupla, </a:t>
             </a:r>
             <a:r>
-              <a:rPr lang="pt-BR" b="1" dirty="0" err="1">
+              <a:rPr lang="pt-BR" sz="2400" b="1" dirty="0" err="1">
                 <a:solidFill>
                   <a:srgbClr val="FF0000"/>
                 </a:solidFill>
@@ -11368,7 +11712,7 @@
               <a:t>error</a:t>
             </a:r>
             <a:r>
-              <a:rPr lang="pt-BR" dirty="0">
+              <a:rPr lang="pt-BR" sz="2400" dirty="0">
                 <a:latin typeface="Times New Roman" panose="02020603050405020304" pitchFamily="18" charset="0"/>
                 <a:cs typeface="Times New Roman" panose="02020603050405020304" pitchFamily="18" charset="0"/>
               </a:rPr>
@@ -11379,7 +11723,7 @@
             <a:pPr marL="0" indent="0" algn="just">
               <a:buNone/>
             </a:pPr>
-            <a:endParaRPr lang="pt-BR" dirty="0">
+            <a:endParaRPr lang="pt-BR" sz="2400" dirty="0">
               <a:latin typeface="Times New Roman" panose="02020603050405020304" pitchFamily="18" charset="0"/>
               <a:cs typeface="Times New Roman" panose="02020603050405020304" pitchFamily="18" charset="0"/>
             </a:endParaRPr>
@@ -11390,7 +11734,7 @@
               <a:buChar char="§"/>
             </a:pPr>
             <a:r>
-              <a:rPr lang="pt-BR" b="1" dirty="0">
+              <a:rPr lang="pt-BR" sz="2400" b="1" dirty="0">
                 <a:solidFill>
                   <a:srgbClr val="FF0000"/>
                 </a:solidFill>
@@ -11400,7 +11744,7 @@
               <a:t>Apagando uma </a:t>
             </a:r>
             <a:r>
-              <a:rPr lang="pt-BR" b="1" dirty="0" err="1">
+              <a:rPr lang="pt-BR" sz="2400" b="1" dirty="0" err="1">
                 <a:solidFill>
                   <a:srgbClr val="FF0000"/>
                 </a:solidFill>
@@ -11410,7 +11754,7 @@
               <a:t>Tupla</a:t>
             </a:r>
             <a:r>
-              <a:rPr lang="pt-BR" b="1" dirty="0">
+              <a:rPr lang="pt-BR" sz="2400" b="1" dirty="0">
                 <a:solidFill>
                   <a:srgbClr val="FF0000"/>
                 </a:solidFill>
@@ -11420,27 +11764,27 @@
               <a:t>: </a:t>
             </a:r>
             <a:r>
-              <a:rPr lang="pt-BR" b="1" dirty="0" err="1">
+              <a:rPr lang="pt-BR" sz="2400" b="1" dirty="0" err="1">
                 <a:latin typeface="Times New Roman" panose="02020603050405020304" pitchFamily="18" charset="0"/>
                 <a:cs typeface="Times New Roman" panose="02020603050405020304" pitchFamily="18" charset="0"/>
               </a:rPr>
               <a:t>del</a:t>
             </a:r>
             <a:r>
-              <a:rPr lang="pt-BR" dirty="0">
+              <a:rPr lang="pt-BR" sz="2400" dirty="0">
                 <a:latin typeface="Times New Roman" panose="02020603050405020304" pitchFamily="18" charset="0"/>
                 <a:cs typeface="Times New Roman" panose="02020603050405020304" pitchFamily="18" charset="0"/>
               </a:rPr>
               <a:t> nome da </a:t>
             </a:r>
             <a:r>
-              <a:rPr lang="pt-BR" dirty="0" err="1">
+              <a:rPr lang="pt-BR" sz="2400" dirty="0" err="1">
                 <a:latin typeface="Times New Roman" panose="02020603050405020304" pitchFamily="18" charset="0"/>
                 <a:cs typeface="Times New Roman" panose="02020603050405020304" pitchFamily="18" charset="0"/>
               </a:rPr>
               <a:t>Tupla</a:t>
             </a:r>
-            <a:endParaRPr lang="pt-BR" dirty="0">
+            <a:endParaRPr lang="pt-BR" sz="2400" dirty="0">
               <a:latin typeface="Times New Roman" panose="02020603050405020304" pitchFamily="18" charset="0"/>
               <a:cs typeface="Times New Roman" panose="02020603050405020304" pitchFamily="18" charset="0"/>
             </a:endParaRPr>
@@ -11450,28 +11794,28 @@
               <a:buNone/>
             </a:pPr>
             <a:r>
-              <a:rPr lang="pt-BR" b="1" dirty="0">
+              <a:rPr lang="pt-BR" sz="2400" b="1" dirty="0">
                 <a:latin typeface="Times New Roman" panose="02020603050405020304" pitchFamily="18" charset="0"/>
                 <a:cs typeface="Times New Roman" panose="02020603050405020304" pitchFamily="18" charset="0"/>
               </a:rPr>
               <a:t>	Exemplo</a:t>
             </a:r>
             <a:r>
-              <a:rPr lang="pt-BR" dirty="0">
+              <a:rPr lang="pt-BR" sz="2400" dirty="0">
                 <a:latin typeface="Times New Roman" panose="02020603050405020304" pitchFamily="18" charset="0"/>
                 <a:cs typeface="Times New Roman" panose="02020603050405020304" pitchFamily="18" charset="0"/>
               </a:rPr>
               <a:t>: </a:t>
             </a:r>
             <a:r>
-              <a:rPr lang="pt-BR" b="1" dirty="0" err="1">
+              <a:rPr lang="pt-BR" sz="2400" b="1" dirty="0" err="1">
                 <a:latin typeface="Times New Roman" panose="02020603050405020304" pitchFamily="18" charset="0"/>
                 <a:cs typeface="Times New Roman" panose="02020603050405020304" pitchFamily="18" charset="0"/>
               </a:rPr>
               <a:t>del</a:t>
             </a:r>
             <a:r>
-              <a:rPr lang="pt-BR" dirty="0">
+              <a:rPr lang="pt-BR" sz="2400" dirty="0">
                 <a:latin typeface="Times New Roman" panose="02020603050405020304" pitchFamily="18" charset="0"/>
                 <a:cs typeface="Times New Roman" panose="02020603050405020304" pitchFamily="18" charset="0"/>
               </a:rPr>
@@ -11611,7 +11955,7 @@
               <a:buChar char="§"/>
             </a:pPr>
             <a:r>
-              <a:rPr lang="pt-BR" b="1" dirty="0" err="1">
+              <a:rPr lang="pt-BR" sz="2000" b="1" dirty="0" err="1">
                 <a:solidFill>
                   <a:srgbClr val="FF0000"/>
                 </a:solidFill>
@@ -11621,7 +11965,7 @@
               <a:t>Tupla</a:t>
             </a:r>
             <a:r>
-              <a:rPr lang="pt-BR" b="1" dirty="0">
+              <a:rPr lang="pt-BR" sz="2000" b="1" dirty="0">
                 <a:solidFill>
                   <a:srgbClr val="FF0000"/>
                 </a:solidFill>
@@ -11636,28 +11980,28 @@
               <a:buNone/>
             </a:pPr>
             <a:r>
-              <a:rPr lang="pt-BR" b="1" dirty="0">
+              <a:rPr lang="pt-BR" sz="2000" b="1" dirty="0">
                 <a:latin typeface="Times New Roman" panose="02020603050405020304" pitchFamily="18" charset="0"/>
                 <a:cs typeface="Times New Roman" panose="02020603050405020304" pitchFamily="18" charset="0"/>
               </a:rPr>
               <a:t>Similar a </a:t>
             </a:r>
             <a:r>
-              <a:rPr lang="pt-BR" b="1" dirty="0" err="1">
+              <a:rPr lang="pt-BR" sz="2000" b="1" dirty="0" err="1">
                 <a:latin typeface="Times New Roman" panose="02020603050405020304" pitchFamily="18" charset="0"/>
                 <a:cs typeface="Times New Roman" panose="02020603050405020304" pitchFamily="18" charset="0"/>
               </a:rPr>
               <a:t>struct</a:t>
             </a:r>
             <a:r>
-              <a:rPr lang="pt-BR" b="1" dirty="0">
+              <a:rPr lang="pt-BR" sz="2000" b="1" dirty="0">
                 <a:latin typeface="Times New Roman" panose="02020603050405020304" pitchFamily="18" charset="0"/>
                 <a:cs typeface="Times New Roman" panose="02020603050405020304" pitchFamily="18" charset="0"/>
               </a:rPr>
               <a:t> em C. </a:t>
             </a:r>
             <a:r>
-              <a:rPr lang="pt-BR" b="1" dirty="0">
+              <a:rPr lang="pt-BR" sz="2000" b="1" dirty="0">
                 <a:solidFill>
                   <a:srgbClr val="FF0000"/>
                 </a:solidFill>
@@ -11672,55 +12016,55 @@
               <a:buNone/>
             </a:pPr>
             <a:r>
-              <a:rPr lang="pt-BR" sz="2400" b="1" dirty="0" err="1">
+              <a:rPr lang="pt-BR" sz="2000" b="1" dirty="0" err="1">
                 <a:latin typeface="Times New Roman" panose="02020603050405020304" pitchFamily="18" charset="0"/>
                 <a:cs typeface="Times New Roman" panose="02020603050405020304" pitchFamily="18" charset="0"/>
               </a:rPr>
               <a:t>from</a:t>
             </a:r>
             <a:r>
-              <a:rPr lang="pt-BR" sz="2400" dirty="0">
+              <a:rPr lang="pt-BR" sz="2000" dirty="0">
                 <a:latin typeface="Times New Roman" panose="02020603050405020304" pitchFamily="18" charset="0"/>
                 <a:cs typeface="Times New Roman" panose="02020603050405020304" pitchFamily="18" charset="0"/>
               </a:rPr>
               <a:t> </a:t>
             </a:r>
             <a:r>
-              <a:rPr lang="pt-BR" sz="2400" dirty="0" err="1">
+              <a:rPr lang="pt-BR" sz="2000" dirty="0" err="1">
                 <a:latin typeface="Times New Roman" panose="02020603050405020304" pitchFamily="18" charset="0"/>
                 <a:cs typeface="Times New Roman" panose="02020603050405020304" pitchFamily="18" charset="0"/>
               </a:rPr>
               <a:t>collections</a:t>
             </a:r>
             <a:r>
-              <a:rPr lang="pt-BR" sz="2400" dirty="0">
+              <a:rPr lang="pt-BR" sz="2000" dirty="0">
                 <a:latin typeface="Times New Roman" panose="02020603050405020304" pitchFamily="18" charset="0"/>
                 <a:cs typeface="Times New Roman" panose="02020603050405020304" pitchFamily="18" charset="0"/>
               </a:rPr>
               <a:t> </a:t>
             </a:r>
             <a:r>
-              <a:rPr lang="pt-BR" sz="2400" b="1" dirty="0" err="1">
+              <a:rPr lang="pt-BR" sz="2000" b="1" dirty="0" err="1">
                 <a:latin typeface="Times New Roman" panose="02020603050405020304" pitchFamily="18" charset="0"/>
                 <a:cs typeface="Times New Roman" panose="02020603050405020304" pitchFamily="18" charset="0"/>
               </a:rPr>
               <a:t>import</a:t>
             </a:r>
             <a:r>
-              <a:rPr lang="pt-BR" sz="2400" dirty="0">
+              <a:rPr lang="pt-BR" sz="2000" dirty="0">
                 <a:latin typeface="Times New Roman" panose="02020603050405020304" pitchFamily="18" charset="0"/>
                 <a:cs typeface="Times New Roman" panose="02020603050405020304" pitchFamily="18" charset="0"/>
               </a:rPr>
               <a:t> </a:t>
             </a:r>
             <a:r>
-              <a:rPr lang="pt-BR" sz="2400" dirty="0" err="1">
+              <a:rPr lang="pt-BR" sz="2000" dirty="0" err="1">
                 <a:latin typeface="Times New Roman" panose="02020603050405020304" pitchFamily="18" charset="0"/>
                 <a:cs typeface="Times New Roman" panose="02020603050405020304" pitchFamily="18" charset="0"/>
               </a:rPr>
               <a:t>namedtuple</a:t>
             </a:r>
-            <a:endParaRPr lang="pt-BR" sz="2400" dirty="0">
+            <a:endParaRPr lang="pt-BR" sz="2000" dirty="0">
               <a:latin typeface="Times New Roman" panose="02020603050405020304" pitchFamily="18" charset="0"/>
               <a:cs typeface="Times New Roman" panose="02020603050405020304" pitchFamily="18" charset="0"/>
             </a:endParaRPr>
@@ -11730,39 +12074,95 @@
               <a:buNone/>
             </a:pPr>
             <a:r>
-              <a:rPr lang="pt-BR" sz="2400" dirty="0">
+              <a:rPr lang="pt-BR" sz="2000" dirty="0">
                 <a:latin typeface="Times New Roman" panose="02020603050405020304" pitchFamily="18" charset="0"/>
                 <a:cs typeface="Times New Roman" panose="02020603050405020304" pitchFamily="18" charset="0"/>
               </a:rPr>
               <a:t>Cliente = </a:t>
             </a:r>
             <a:r>
-              <a:rPr lang="pt-BR" sz="2400" b="1" dirty="0" err="1">
+              <a:rPr lang="pt-BR" sz="2000" b="1" dirty="0" err="1">
                 <a:latin typeface="Times New Roman" panose="02020603050405020304" pitchFamily="18" charset="0"/>
                 <a:cs typeface="Times New Roman" panose="02020603050405020304" pitchFamily="18" charset="0"/>
               </a:rPr>
               <a:t>namedtuple</a:t>
             </a:r>
             <a:r>
-              <a:rPr lang="pt-BR" sz="2400" dirty="0">
-                <a:latin typeface="Times New Roman" panose="02020603050405020304" pitchFamily="18" charset="0"/>
-                <a:cs typeface="Times New Roman" panose="02020603050405020304" pitchFamily="18" charset="0"/>
-              </a:rPr>
-              <a:t>(‘Cliente’, ‘nome </a:t>
-            </a:r>
-            <a:r>
-              <a:rPr lang="pt-BR" sz="2400" dirty="0" err="1">
+              <a:rPr lang="pt-BR" sz="2000" dirty="0">
+                <a:latin typeface="Times New Roman" panose="02020603050405020304" pitchFamily="18" charset="0"/>
+                <a:cs typeface="Times New Roman" panose="02020603050405020304" pitchFamily="18" charset="0"/>
+              </a:rPr>
+              <a:t>(</a:t>
+            </a:r>
+            <a:r>
+              <a:rPr lang="en-US" sz="2000" dirty="0">
+                <a:latin typeface="Times New Roman" panose="02020603050405020304" pitchFamily="18" charset="0"/>
+                <a:cs typeface="Times New Roman" panose="02020603050405020304" pitchFamily="18" charset="0"/>
+              </a:rPr>
+              <a:t>'</a:t>
+            </a:r>
+            <a:r>
+              <a:rPr lang="pt-BR" sz="2000" dirty="0">
+                <a:latin typeface="Times New Roman" panose="02020603050405020304" pitchFamily="18" charset="0"/>
+                <a:cs typeface="Times New Roman" panose="02020603050405020304" pitchFamily="18" charset="0"/>
+              </a:rPr>
+              <a:t>Cliente</a:t>
+            </a:r>
+            <a:r>
+              <a:rPr lang="en-US" sz="2000" dirty="0">
+                <a:latin typeface="Times New Roman" panose="02020603050405020304" pitchFamily="18" charset="0"/>
+                <a:cs typeface="Times New Roman" panose="02020603050405020304" pitchFamily="18" charset="0"/>
+              </a:rPr>
+              <a:t>'</a:t>
+            </a:r>
+            <a:r>
+              <a:rPr lang="pt-BR" sz="2000" dirty="0">
+                <a:latin typeface="Times New Roman" panose="02020603050405020304" pitchFamily="18" charset="0"/>
+                <a:cs typeface="Times New Roman" panose="02020603050405020304" pitchFamily="18" charset="0"/>
+              </a:rPr>
+              <a:t>, </a:t>
+            </a:r>
+            <a:r>
+              <a:rPr lang="en-US" sz="2000" dirty="0">
+                <a:latin typeface="Times New Roman" panose="02020603050405020304" pitchFamily="18" charset="0"/>
+                <a:cs typeface="Times New Roman" panose="02020603050405020304" pitchFamily="18" charset="0"/>
+              </a:rPr>
+              <a:t>'</a:t>
+            </a:r>
+            <a:r>
+              <a:rPr lang="pt-BR" sz="2000" dirty="0">
+                <a:latin typeface="Times New Roman" panose="02020603050405020304" pitchFamily="18" charset="0"/>
+                <a:cs typeface="Times New Roman" panose="02020603050405020304" pitchFamily="18" charset="0"/>
+              </a:rPr>
+              <a:t>nome </a:t>
+            </a:r>
+            <a:r>
+              <a:rPr lang="pt-BR" sz="2000" dirty="0" err="1">
                 <a:latin typeface="Times New Roman" panose="02020603050405020304" pitchFamily="18" charset="0"/>
                 <a:cs typeface="Times New Roman" panose="02020603050405020304" pitchFamily="18" charset="0"/>
               </a:rPr>
               <a:t>cpf</a:t>
             </a:r>
             <a:r>
-              <a:rPr lang="pt-BR" sz="2400" dirty="0">
-                <a:latin typeface="Times New Roman" panose="02020603050405020304" pitchFamily="18" charset="0"/>
-                <a:cs typeface="Times New Roman" panose="02020603050405020304" pitchFamily="18" charset="0"/>
-              </a:rPr>
-              <a:t> limite compras’)</a:t>
+              <a:rPr lang="pt-BR" sz="2000" dirty="0">
+                <a:latin typeface="Times New Roman" panose="02020603050405020304" pitchFamily="18" charset="0"/>
+                <a:cs typeface="Times New Roman" panose="02020603050405020304" pitchFamily="18" charset="0"/>
+              </a:rPr>
+              <a:t> limite compras</a:t>
+            </a:r>
+            <a:r>
+              <a:rPr lang="en-US" sz="2000" dirty="0">
+                <a:latin typeface="Times New Roman" panose="02020603050405020304" pitchFamily="18" charset="0"/>
+                <a:cs typeface="Times New Roman" panose="02020603050405020304" pitchFamily="18" charset="0"/>
+              </a:rPr>
+              <a:t>'</a:t>
+            </a:r>
+            <a:r>
+              <a:rPr lang="pt-BR" sz="2000" dirty="0">
+                <a:latin typeface="Times New Roman" panose="02020603050405020304" pitchFamily="18" charset="0"/>
+                <a:cs typeface="Times New Roman" panose="02020603050405020304" pitchFamily="18" charset="0"/>
+              </a:rPr>
+              <a:t>)</a:t>
             </a:r>
           </a:p>
           <a:p>
@@ -11770,18 +12170,74 @@
               <a:buNone/>
             </a:pPr>
             <a:r>
-              <a:rPr lang="pt-BR" sz="2400" dirty="0" err="1">
+              <a:rPr lang="pt-BR" sz="2000" dirty="0" err="1">
                 <a:latin typeface="Times New Roman" panose="02020603050405020304" pitchFamily="18" charset="0"/>
                 <a:cs typeface="Times New Roman" panose="02020603050405020304" pitchFamily="18" charset="0"/>
               </a:rPr>
               <a:t>umCliente</a:t>
             </a:r>
             <a:r>
-              <a:rPr lang="pt-BR" sz="2400" dirty="0">
-                <a:latin typeface="Times New Roman" panose="02020603050405020304" pitchFamily="18" charset="0"/>
-                <a:cs typeface="Times New Roman" panose="02020603050405020304" pitchFamily="18" charset="0"/>
-              </a:rPr>
-              <a:t> = Cliente(‘Fulano’, ‘01234567890’, 5000.00, 300.00)</a:t>
+              <a:rPr lang="pt-BR" sz="2000" dirty="0">
+                <a:latin typeface="Times New Roman" panose="02020603050405020304" pitchFamily="18" charset="0"/>
+                <a:cs typeface="Times New Roman" panose="02020603050405020304" pitchFamily="18" charset="0"/>
+              </a:rPr>
+              <a:t> = Cliente(</a:t>
+            </a:r>
+            <a:r>
+              <a:rPr lang="en-US" sz="2000" dirty="0">
+                <a:latin typeface="Times New Roman" panose="02020603050405020304" pitchFamily="18" charset="0"/>
+                <a:cs typeface="Times New Roman" panose="02020603050405020304" pitchFamily="18" charset="0"/>
+              </a:rPr>
+              <a:t>'</a:t>
+            </a:r>
+            <a:r>
+              <a:rPr lang="pt-BR" sz="2000" dirty="0">
+                <a:latin typeface="Times New Roman" panose="02020603050405020304" pitchFamily="18" charset="0"/>
+                <a:cs typeface="Times New Roman" panose="02020603050405020304" pitchFamily="18" charset="0"/>
+              </a:rPr>
+              <a:t>Fulano</a:t>
+            </a:r>
+            <a:r>
+              <a:rPr lang="en-US" sz="2000" dirty="0">
+                <a:latin typeface="Times New Roman" panose="02020603050405020304" pitchFamily="18" charset="0"/>
+                <a:cs typeface="Times New Roman" panose="02020603050405020304" pitchFamily="18" charset="0"/>
+              </a:rPr>
+              <a:t>'</a:t>
+            </a:r>
+            <a:r>
+              <a:rPr lang="pt-BR" sz="2000" dirty="0">
+                <a:latin typeface="Times New Roman" panose="02020603050405020304" pitchFamily="18" charset="0"/>
+                <a:cs typeface="Times New Roman" panose="02020603050405020304" pitchFamily="18" charset="0"/>
+              </a:rPr>
+              <a:t>, </a:t>
+            </a:r>
+            <a:r>
+              <a:rPr lang="en-US" sz="2000" dirty="0">
+                <a:latin typeface="Times New Roman" panose="02020603050405020304" pitchFamily="18" charset="0"/>
+                <a:cs typeface="Times New Roman" panose="02020603050405020304" pitchFamily="18" charset="0"/>
+              </a:rPr>
+              <a:t>'</a:t>
+            </a:r>
+            <a:r>
+              <a:rPr lang="pt-BR" sz="2000" dirty="0">
+                <a:latin typeface="Times New Roman" panose="02020603050405020304" pitchFamily="18" charset="0"/>
+                <a:cs typeface="Times New Roman" panose="02020603050405020304" pitchFamily="18" charset="0"/>
+              </a:rPr>
+              <a:t>01234567890</a:t>
+            </a:r>
+            <a:r>
+              <a:rPr lang="en-US" sz="2000" dirty="0">
+                <a:latin typeface="Times New Roman" panose="02020603050405020304" pitchFamily="18" charset="0"/>
+                <a:cs typeface="Times New Roman" panose="02020603050405020304" pitchFamily="18" charset="0"/>
+              </a:rPr>
+              <a:t>'</a:t>
+            </a:r>
+            <a:r>
+              <a:rPr lang="pt-BR" sz="2000" dirty="0">
+                <a:latin typeface="Times New Roman" panose="02020603050405020304" pitchFamily="18" charset="0"/>
+                <a:cs typeface="Times New Roman" panose="02020603050405020304" pitchFamily="18" charset="0"/>
+              </a:rPr>
+              <a:t>, 5000.00, 300.00)</a:t>
             </a:r>
           </a:p>
           <a:p>
@@ -11789,28 +12245,28 @@
               <a:buNone/>
             </a:pPr>
             <a:r>
-              <a:rPr lang="pt-BR" sz="2400" b="1" dirty="0">
+              <a:rPr lang="pt-BR" sz="2000" b="1" dirty="0">
                 <a:latin typeface="Times New Roman" panose="02020603050405020304" pitchFamily="18" charset="0"/>
                 <a:cs typeface="Times New Roman" panose="02020603050405020304" pitchFamily="18" charset="0"/>
               </a:rPr>
               <a:t>print</a:t>
             </a:r>
             <a:r>
-              <a:rPr lang="pt-BR" sz="2400" dirty="0">
+              <a:rPr lang="pt-BR" sz="2000" dirty="0">
                 <a:latin typeface="Times New Roman" panose="02020603050405020304" pitchFamily="18" charset="0"/>
                 <a:cs typeface="Times New Roman" panose="02020603050405020304" pitchFamily="18" charset="0"/>
               </a:rPr>
               <a:t>(</a:t>
             </a:r>
             <a:r>
-              <a:rPr lang="pt-BR" sz="2400" dirty="0" err="1">
+              <a:rPr lang="pt-BR" sz="2000" dirty="0" err="1">
                 <a:latin typeface="Times New Roman" panose="02020603050405020304" pitchFamily="18" charset="0"/>
                 <a:cs typeface="Times New Roman" panose="02020603050405020304" pitchFamily="18" charset="0"/>
               </a:rPr>
               <a:t>umCliente</a:t>
             </a:r>
             <a:r>
-              <a:rPr lang="pt-BR" sz="2400" dirty="0">
+              <a:rPr lang="pt-BR" sz="2000" dirty="0">
                 <a:latin typeface="Times New Roman" panose="02020603050405020304" pitchFamily="18" charset="0"/>
                 <a:cs typeface="Times New Roman" panose="02020603050405020304" pitchFamily="18" charset="0"/>
               </a:rPr>
@@ -11822,28 +12278,28 @@
               <a:buNone/>
             </a:pPr>
             <a:r>
-              <a:rPr lang="pt-BR" sz="2400" b="1" dirty="0">
+              <a:rPr lang="pt-BR" sz="2000" b="1" dirty="0">
                 <a:latin typeface="Times New Roman" panose="02020603050405020304" pitchFamily="18" charset="0"/>
                 <a:cs typeface="Times New Roman" panose="02020603050405020304" pitchFamily="18" charset="0"/>
               </a:rPr>
               <a:t>print</a:t>
             </a:r>
             <a:r>
-              <a:rPr lang="pt-BR" sz="2400" dirty="0">
+              <a:rPr lang="pt-BR" sz="2000" dirty="0">
                 <a:latin typeface="Times New Roman" panose="02020603050405020304" pitchFamily="18" charset="0"/>
                 <a:cs typeface="Times New Roman" panose="02020603050405020304" pitchFamily="18" charset="0"/>
               </a:rPr>
               <a:t>(</a:t>
             </a:r>
             <a:r>
-              <a:rPr lang="pt-BR" sz="2400" dirty="0" err="1">
+              <a:rPr lang="pt-BR" sz="2000" dirty="0" err="1">
                 <a:latin typeface="Times New Roman" panose="02020603050405020304" pitchFamily="18" charset="0"/>
                 <a:cs typeface="Times New Roman" panose="02020603050405020304" pitchFamily="18" charset="0"/>
               </a:rPr>
               <a:t>umCliente.cpf</a:t>
             </a:r>
             <a:r>
-              <a:rPr lang="pt-BR" sz="2400" dirty="0">
+              <a:rPr lang="pt-BR" sz="2000" dirty="0">
                 <a:latin typeface="Times New Roman" panose="02020603050405020304" pitchFamily="18" charset="0"/>
                 <a:cs typeface="Times New Roman" panose="02020603050405020304" pitchFamily="18" charset="0"/>
               </a:rPr>
@@ -11854,7 +12310,7 @@
             <a:pPr marL="0" indent="0" algn="just">
               <a:buNone/>
             </a:pPr>
-            <a:endParaRPr lang="pt-BR" dirty="0">
+            <a:endParaRPr lang="pt-BR" sz="2000" dirty="0">
               <a:latin typeface="Times New Roman" panose="02020603050405020304" pitchFamily="18" charset="0"/>
               <a:cs typeface="Times New Roman" panose="02020603050405020304" pitchFamily="18" charset="0"/>
             </a:endParaRPr>
@@ -11979,27 +12435,17 @@
               <a:buChar char="§"/>
             </a:pPr>
             <a:r>
-              <a:rPr lang="pt-BR" b="1" dirty="0">
+              <a:rPr lang="pt-BR" sz="2000" b="1" dirty="0">
                 <a:solidFill>
                   <a:srgbClr val="FF0000"/>
                 </a:solidFill>
                 <a:latin typeface="Times New Roman" panose="02020603050405020304" pitchFamily="18" charset="0"/>
                 <a:cs typeface="Times New Roman" panose="02020603050405020304" pitchFamily="18" charset="0"/>
               </a:rPr>
-              <a:t>Conjunto</a:t>
+              <a:t>Conjunto - </a:t>
             </a:r>
             <a:r>
               <a:rPr lang="pt-BR" sz="2000" b="1" dirty="0">
-                <a:solidFill>
-                  <a:srgbClr val="FF0000"/>
-                </a:solidFill>
-                <a:latin typeface="Times New Roman" panose="02020603050405020304" pitchFamily="18" charset="0"/>
-                <a:cs typeface="Times New Roman" panose="02020603050405020304" pitchFamily="18" charset="0"/>
-              </a:rPr>
-              <a:t> - </a:t>
-            </a:r>
-            <a:r>
-              <a:rPr lang="pt-BR" b="1" dirty="0">
                 <a:latin typeface="Times New Roman" panose="02020603050405020304" pitchFamily="18" charset="0"/>
                 <a:cs typeface="Times New Roman" panose="02020603050405020304" pitchFamily="18" charset="0"/>
               </a:rPr>
@@ -12390,281 +12836,442 @@
               <a:buChar char="§"/>
             </a:pPr>
             <a:r>
+              <a:rPr lang="pt-BR" sz="2400" b="1" dirty="0">
+                <a:solidFill>
+                  <a:srgbClr val="FF0000"/>
+                </a:solidFill>
+                <a:latin typeface="Times New Roman" panose="02020603050405020304" pitchFamily="18" charset="0"/>
+                <a:cs typeface="Times New Roman" panose="02020603050405020304" pitchFamily="18" charset="0"/>
+              </a:rPr>
+              <a:t> </a:t>
+            </a:r>
+            <a:r>
+              <a:rPr lang="pt-BR" sz="2400" b="1" dirty="0">
+                <a:latin typeface="Times New Roman" panose="02020603050405020304" pitchFamily="18" charset="0"/>
+                <a:cs typeface="Times New Roman" panose="02020603050405020304" pitchFamily="18" charset="0"/>
+              </a:rPr>
+              <a:t>Dicionários</a:t>
+            </a:r>
+            <a:r>
+              <a:rPr lang="pt-BR" sz="2400" dirty="0">
+                <a:latin typeface="Times New Roman" panose="02020603050405020304" pitchFamily="18" charset="0"/>
+                <a:cs typeface="Times New Roman" panose="02020603050405020304" pitchFamily="18" charset="0"/>
+              </a:rPr>
+              <a:t> </a:t>
+            </a:r>
+          </a:p>
+          <a:p>
+            <a:pPr marL="0" indent="0" algn="just">
+              <a:buNone/>
+            </a:pPr>
+            <a:r>
+              <a:rPr lang="pt-BR" sz="2000" dirty="0">
+                <a:latin typeface="Times New Roman" panose="02020603050405020304" pitchFamily="18" charset="0"/>
+                <a:cs typeface="Times New Roman" panose="02020603050405020304" pitchFamily="18" charset="0"/>
+              </a:rPr>
+              <a:t>São estruturas Python, utilizadas para representar coleções que guarda valores </a:t>
+            </a:r>
+            <a:r>
               <a:rPr lang="pt-BR" sz="2000" b="1" dirty="0">
+                <a:latin typeface="Times New Roman" panose="02020603050405020304" pitchFamily="18" charset="0"/>
+                <a:cs typeface="Times New Roman" panose="02020603050405020304" pitchFamily="18" charset="0"/>
+              </a:rPr>
+              <a:t>multidimensionais</a:t>
+            </a:r>
+            <a:r>
+              <a:rPr lang="pt-BR" sz="2000" dirty="0">
+                <a:latin typeface="Times New Roman" panose="02020603050405020304" pitchFamily="18" charset="0"/>
+                <a:cs typeface="Times New Roman" panose="02020603050405020304" pitchFamily="18" charset="0"/>
+              </a:rPr>
+              <a:t> </a:t>
+            </a:r>
+            <a:r>
+              <a:rPr lang="pt-BR" sz="2000" b="1" dirty="0">
                 <a:solidFill>
                   <a:srgbClr val="FF0000"/>
                 </a:solidFill>
                 <a:latin typeface="Times New Roman" panose="02020603050405020304" pitchFamily="18" charset="0"/>
                 <a:cs typeface="Times New Roman" panose="02020603050405020304" pitchFamily="18" charset="0"/>
               </a:rPr>
+              <a:t>para cada índice</a:t>
+            </a:r>
+            <a:r>
+              <a:rPr lang="pt-BR" sz="2000" dirty="0">
+                <a:latin typeface="Times New Roman" panose="02020603050405020304" pitchFamily="18" charset="0"/>
+                <a:cs typeface="Times New Roman" panose="02020603050405020304" pitchFamily="18" charset="0"/>
+              </a:rPr>
+              <a:t>. É um dicionário de chaves (termos) que estão associadas a valores (significados dos termos). </a:t>
+            </a:r>
+          </a:p>
+          <a:p>
+            <a:pPr marL="0" indent="0" algn="just">
+              <a:buNone/>
+            </a:pPr>
+            <a:r>
+              <a:rPr lang="pt-BR" sz="2000" b="1" dirty="0">
+                <a:latin typeface="Times New Roman" panose="02020603050405020304" pitchFamily="18" charset="0"/>
+                <a:cs typeface="Times New Roman" panose="02020603050405020304" pitchFamily="18" charset="0"/>
+              </a:rPr>
+              <a:t>Nota</a:t>
+            </a:r>
+            <a:r>
+              <a:rPr lang="pt-BR" sz="2000" dirty="0">
+                <a:latin typeface="Times New Roman" panose="02020603050405020304" pitchFamily="18" charset="0"/>
+                <a:cs typeface="Times New Roman" panose="02020603050405020304" pitchFamily="18" charset="0"/>
+              </a:rPr>
+              <a:t>: </a:t>
+            </a:r>
+            <a:r>
+              <a:rPr lang="pt-BR" sz="2000" b="1" dirty="0">
+                <a:solidFill>
+                  <a:srgbClr val="FF0000"/>
+                </a:solidFill>
+                <a:latin typeface="Times New Roman" panose="02020603050405020304" pitchFamily="18" charset="0"/>
+                <a:cs typeface="Times New Roman" panose="02020603050405020304" pitchFamily="18" charset="0"/>
+              </a:rPr>
+              <a:t>Métodos</a:t>
+            </a:r>
+            <a:r>
+              <a:rPr lang="pt-BR" sz="2000" dirty="0">
+                <a:latin typeface="Times New Roman" panose="02020603050405020304" pitchFamily="18" charset="0"/>
+                <a:cs typeface="Times New Roman" panose="02020603050405020304" pitchFamily="18" charset="0"/>
+              </a:rPr>
+              <a:t>: </a:t>
+            </a:r>
+            <a:r>
+              <a:rPr lang="pt-BR" sz="2000" dirty="0" err="1">
+                <a:latin typeface="Times New Roman" panose="02020603050405020304" pitchFamily="18" charset="0"/>
+                <a:cs typeface="Times New Roman" panose="02020603050405020304" pitchFamily="18" charset="0"/>
+              </a:rPr>
+              <a:t>dic.</a:t>
+            </a:r>
+            <a:r>
+              <a:rPr lang="pt-BR" sz="2000" b="1" dirty="0" err="1">
+                <a:latin typeface="Times New Roman" panose="02020603050405020304" pitchFamily="18" charset="0"/>
+                <a:cs typeface="Times New Roman" panose="02020603050405020304" pitchFamily="18" charset="0"/>
+              </a:rPr>
+              <a:t>get</a:t>
+            </a:r>
+            <a:r>
+              <a:rPr lang="pt-BR" sz="2000" dirty="0">
+                <a:latin typeface="Times New Roman" panose="02020603050405020304" pitchFamily="18" charset="0"/>
+                <a:cs typeface="Times New Roman" panose="02020603050405020304" pitchFamily="18" charset="0"/>
+              </a:rPr>
+              <a:t>(atributo), </a:t>
+            </a:r>
+            <a:r>
+              <a:rPr lang="pt-BR" sz="2000" dirty="0" err="1">
+                <a:latin typeface="Times New Roman" panose="02020603050405020304" pitchFamily="18" charset="0"/>
+                <a:cs typeface="Times New Roman" panose="02020603050405020304" pitchFamily="18" charset="0"/>
+              </a:rPr>
+              <a:t>dic.</a:t>
+            </a:r>
+            <a:r>
+              <a:rPr lang="pt-BR" sz="2000" b="1" dirty="0" err="1">
+                <a:latin typeface="Times New Roman" panose="02020603050405020304" pitchFamily="18" charset="0"/>
+                <a:cs typeface="Times New Roman" panose="02020603050405020304" pitchFamily="18" charset="0"/>
+              </a:rPr>
+              <a:t>keys</a:t>
+            </a:r>
+            <a:r>
+              <a:rPr lang="pt-BR" sz="2000" dirty="0">
+                <a:latin typeface="Times New Roman" panose="02020603050405020304" pitchFamily="18" charset="0"/>
+                <a:cs typeface="Times New Roman" panose="02020603050405020304" pitchFamily="18" charset="0"/>
+              </a:rPr>
+              <a:t>(); </a:t>
+            </a:r>
+            <a:r>
+              <a:rPr lang="pt-BR" sz="2000" dirty="0" err="1">
+                <a:latin typeface="Times New Roman" panose="02020603050405020304" pitchFamily="18" charset="0"/>
+                <a:cs typeface="Times New Roman" panose="02020603050405020304" pitchFamily="18" charset="0"/>
+              </a:rPr>
+              <a:t>dic.</a:t>
+            </a:r>
+            <a:r>
+              <a:rPr lang="pt-BR" sz="2000" b="1" dirty="0" err="1">
+                <a:latin typeface="Times New Roman" panose="02020603050405020304" pitchFamily="18" charset="0"/>
+                <a:cs typeface="Times New Roman" panose="02020603050405020304" pitchFamily="18" charset="0"/>
+              </a:rPr>
+              <a:t>values</a:t>
+            </a:r>
+            <a:r>
+              <a:rPr lang="pt-BR" sz="2000" dirty="0">
+                <a:latin typeface="Times New Roman" panose="02020603050405020304" pitchFamily="18" charset="0"/>
+                <a:cs typeface="Times New Roman" panose="02020603050405020304" pitchFamily="18" charset="0"/>
+              </a:rPr>
+              <a:t>(); </a:t>
+            </a:r>
+            <a:r>
+              <a:rPr lang="pt-BR" sz="2000" b="1" dirty="0">
+                <a:latin typeface="Times New Roman" panose="02020603050405020304" pitchFamily="18" charset="0"/>
+                <a:cs typeface="Times New Roman" panose="02020603050405020304" pitchFamily="18" charset="0"/>
+              </a:rPr>
+              <a:t>update; pop; </a:t>
+            </a:r>
+            <a:r>
+              <a:rPr lang="pt-BR" sz="2000" b="1" dirty="0" err="1">
+                <a:latin typeface="Times New Roman" panose="02020603050405020304" pitchFamily="18" charset="0"/>
+                <a:cs typeface="Times New Roman" panose="02020603050405020304" pitchFamily="18" charset="0"/>
+              </a:rPr>
+              <a:t>len</a:t>
+            </a:r>
+            <a:r>
+              <a:rPr lang="pt-BR" sz="2000" b="1" dirty="0">
+                <a:latin typeface="Times New Roman" panose="02020603050405020304" pitchFamily="18" charset="0"/>
+                <a:cs typeface="Times New Roman" panose="02020603050405020304" pitchFamily="18" charset="0"/>
+              </a:rPr>
+              <a:t>, etc</a:t>
+            </a:r>
+            <a:r>
+              <a:rPr lang="pt-BR" sz="2000" dirty="0">
+                <a:latin typeface="Times New Roman" panose="02020603050405020304" pitchFamily="18" charset="0"/>
+                <a:cs typeface="Times New Roman" panose="02020603050405020304" pitchFamily="18" charset="0"/>
+              </a:rPr>
+              <a:t>.</a:t>
+            </a:r>
+          </a:p>
+          <a:p>
+            <a:pPr marL="0" indent="0" algn="just">
+              <a:buNone/>
+            </a:pPr>
+            <a:r>
+              <a:rPr lang="da-DK" sz="2000" b="1" dirty="0">
+                <a:latin typeface="Times New Roman" panose="02020603050405020304" pitchFamily="18" charset="0"/>
+                <a:cs typeface="Times New Roman" panose="02020603050405020304" pitchFamily="18" charset="0"/>
+              </a:rPr>
+              <a:t>dicAlu = </a:t>
+            </a:r>
+            <a:r>
+              <a:rPr lang="da-DK" sz="2000" dirty="0">
+                <a:latin typeface="Times New Roman" panose="02020603050405020304" pitchFamily="18" charset="0"/>
+                <a:cs typeface="Times New Roman" panose="02020603050405020304" pitchFamily="18" charset="0"/>
+              </a:rPr>
+              <a:t>{</a:t>
+            </a:r>
+            <a:r>
+              <a:rPr lang="en-US" sz="2000" dirty="0">
+                <a:latin typeface="Times New Roman" panose="02020603050405020304" pitchFamily="18" charset="0"/>
+                <a:cs typeface="Times New Roman" panose="02020603050405020304" pitchFamily="18" charset="0"/>
+              </a:rPr>
+              <a:t>'</a:t>
+            </a:r>
+            <a:r>
+              <a:rPr lang="da-DK" sz="2000" dirty="0">
+                <a:latin typeface="Times New Roman" panose="02020603050405020304" pitchFamily="18" charset="0"/>
+                <a:cs typeface="Times New Roman" panose="02020603050405020304" pitchFamily="18" charset="0"/>
+              </a:rPr>
+              <a:t>nome</a:t>
+            </a:r>
+            <a:r>
+              <a:rPr lang="en-US" sz="2000" dirty="0">
+                <a:latin typeface="Times New Roman" panose="02020603050405020304" pitchFamily="18" charset="0"/>
+                <a:cs typeface="Times New Roman" panose="02020603050405020304" pitchFamily="18" charset="0"/>
+              </a:rPr>
+              <a:t>' </a:t>
+            </a:r>
+            <a:r>
+              <a:rPr lang="da-DK" sz="2000" dirty="0">
+                <a:latin typeface="Times New Roman" panose="02020603050405020304" pitchFamily="18" charset="0"/>
+                <a:cs typeface="Times New Roman" panose="02020603050405020304" pitchFamily="18" charset="0"/>
+              </a:rPr>
+              <a:t>: </a:t>
+            </a:r>
+            <a:r>
+              <a:rPr lang="en-US" sz="2000" dirty="0">
+                <a:latin typeface="Times New Roman" panose="02020603050405020304" pitchFamily="18" charset="0"/>
+                <a:cs typeface="Times New Roman" panose="02020603050405020304" pitchFamily="18" charset="0"/>
+              </a:rPr>
+              <a:t>'</a:t>
+            </a:r>
+            <a:r>
+              <a:rPr lang="da-DK" sz="2000" dirty="0">
+                <a:latin typeface="Times New Roman" panose="02020603050405020304" pitchFamily="18" charset="0"/>
+                <a:cs typeface="Times New Roman" panose="02020603050405020304" pitchFamily="18" charset="0"/>
+              </a:rPr>
+              <a:t>Julila’, </a:t>
+            </a:r>
+            <a:r>
+              <a:rPr lang="en-US" sz="2000" dirty="0">
+                <a:latin typeface="Times New Roman" panose="02020603050405020304" pitchFamily="18" charset="0"/>
+                <a:cs typeface="Times New Roman" panose="02020603050405020304" pitchFamily="18" charset="0"/>
+              </a:rPr>
+              <a:t>'</a:t>
+            </a:r>
+            <a:r>
+              <a:rPr lang="da-DK" sz="2000" dirty="0">
+                <a:latin typeface="Times New Roman" panose="02020603050405020304" pitchFamily="18" charset="0"/>
+                <a:cs typeface="Times New Roman" panose="02020603050405020304" pitchFamily="18" charset="0"/>
+              </a:rPr>
+              <a:t>idade</a:t>
+            </a:r>
+            <a:r>
+              <a:rPr lang="en-US" sz="2000" dirty="0">
+                <a:latin typeface="Times New Roman" panose="02020603050405020304" pitchFamily="18" charset="0"/>
+                <a:cs typeface="Times New Roman" panose="02020603050405020304" pitchFamily="18" charset="0"/>
+              </a:rPr>
+              <a:t>' </a:t>
+            </a:r>
+            <a:r>
+              <a:rPr lang="da-DK" sz="2000" dirty="0">
+                <a:latin typeface="Times New Roman" panose="02020603050405020304" pitchFamily="18" charset="0"/>
+                <a:cs typeface="Times New Roman" panose="02020603050405020304" pitchFamily="18" charset="0"/>
+              </a:rPr>
+              <a:t>:17, </a:t>
+            </a:r>
+            <a:r>
+              <a:rPr lang="en-US" sz="2000" dirty="0">
+                <a:latin typeface="Times New Roman" panose="02020603050405020304" pitchFamily="18" charset="0"/>
+                <a:cs typeface="Times New Roman" panose="02020603050405020304" pitchFamily="18" charset="0"/>
+              </a:rPr>
+              <a:t>'</a:t>
+            </a:r>
+            <a:r>
+              <a:rPr lang="da-DK" sz="2000" dirty="0">
+                <a:latin typeface="Times New Roman" panose="02020603050405020304" pitchFamily="18" charset="0"/>
+                <a:cs typeface="Times New Roman" panose="02020603050405020304" pitchFamily="18" charset="0"/>
+              </a:rPr>
+              <a:t>disciplina</a:t>
+            </a:r>
+            <a:r>
+              <a:rPr lang="en-US" sz="2000" dirty="0">
+                <a:latin typeface="Times New Roman" panose="02020603050405020304" pitchFamily="18" charset="0"/>
+                <a:cs typeface="Times New Roman" panose="02020603050405020304" pitchFamily="18" charset="0"/>
+              </a:rPr>
+              <a:t>' </a:t>
+            </a:r>
+            <a:r>
+              <a:rPr lang="da-DK" sz="2000" dirty="0">
+                <a:latin typeface="Times New Roman" panose="02020603050405020304" pitchFamily="18" charset="0"/>
+                <a:cs typeface="Times New Roman" panose="02020603050405020304" pitchFamily="18" charset="0"/>
+              </a:rPr>
+              <a:t>:[</a:t>
+            </a:r>
+            <a:r>
+              <a:rPr lang="en-US" sz="2000" dirty="0">
+                <a:latin typeface="Times New Roman" panose="02020603050405020304" pitchFamily="18" charset="0"/>
+                <a:cs typeface="Times New Roman" panose="02020603050405020304" pitchFamily="18" charset="0"/>
+              </a:rPr>
+              <a:t>'</a:t>
+            </a:r>
+            <a:r>
+              <a:rPr lang="da-DK" sz="2000" dirty="0">
+                <a:latin typeface="Times New Roman" panose="02020603050405020304" pitchFamily="18" charset="0"/>
+                <a:cs typeface="Times New Roman" panose="02020603050405020304" pitchFamily="18" charset="0"/>
+              </a:rPr>
+              <a:t>java</a:t>
+            </a:r>
+            <a:r>
+              <a:rPr lang="en-US" sz="2000" dirty="0">
+                <a:latin typeface="Times New Roman" panose="02020603050405020304" pitchFamily="18" charset="0"/>
+                <a:cs typeface="Times New Roman" panose="02020603050405020304" pitchFamily="18" charset="0"/>
+              </a:rPr>
+              <a:t>'</a:t>
+            </a:r>
+            <a:r>
+              <a:rPr lang="da-DK" sz="2000" dirty="0">
+                <a:latin typeface="Times New Roman" panose="02020603050405020304" pitchFamily="18" charset="0"/>
+                <a:cs typeface="Times New Roman" panose="02020603050405020304" pitchFamily="18" charset="0"/>
+              </a:rPr>
+              <a:t>, </a:t>
+            </a:r>
+            <a:r>
+              <a:rPr lang="en-US" sz="2000" dirty="0">
+                <a:latin typeface="Times New Roman" panose="02020603050405020304" pitchFamily="18" charset="0"/>
+                <a:cs typeface="Times New Roman" panose="02020603050405020304" pitchFamily="18" charset="0"/>
+              </a:rPr>
+              <a:t>'</a:t>
+            </a:r>
+            <a:r>
+              <a:rPr lang="da-DK" sz="2000" dirty="0">
+                <a:latin typeface="Times New Roman" panose="02020603050405020304" pitchFamily="18" charset="0"/>
+                <a:cs typeface="Times New Roman" panose="02020603050405020304" pitchFamily="18" charset="0"/>
+              </a:rPr>
+              <a:t>python</a:t>
+            </a:r>
+            <a:r>
+              <a:rPr lang="en-US" sz="2000" dirty="0">
+                <a:latin typeface="Times New Roman" panose="02020603050405020304" pitchFamily="18" charset="0"/>
+                <a:cs typeface="Times New Roman" panose="02020603050405020304" pitchFamily="18" charset="0"/>
+              </a:rPr>
+              <a:t>'</a:t>
+            </a:r>
+            <a:r>
+              <a:rPr lang="da-DK" sz="2000" dirty="0">
+                <a:latin typeface="Times New Roman" panose="02020603050405020304" pitchFamily="18" charset="0"/>
+                <a:cs typeface="Times New Roman" panose="02020603050405020304" pitchFamily="18" charset="0"/>
+              </a:rPr>
+              <a:t>], </a:t>
+            </a:r>
+            <a:r>
+              <a:rPr lang="en-US" sz="2000" dirty="0">
+                <a:latin typeface="Times New Roman" panose="02020603050405020304" pitchFamily="18" charset="0"/>
+                <a:cs typeface="Times New Roman" panose="02020603050405020304" pitchFamily="18" charset="0"/>
+              </a:rPr>
+              <a:t>'</a:t>
+            </a:r>
+            <a:r>
+              <a:rPr lang="da-DK" sz="2000" dirty="0">
+                <a:latin typeface="Times New Roman" panose="02020603050405020304" pitchFamily="18" charset="0"/>
+                <a:cs typeface="Times New Roman" panose="02020603050405020304" pitchFamily="18" charset="0"/>
+              </a:rPr>
+              <a:t>altura</a:t>
+            </a:r>
+            <a:r>
+              <a:rPr lang="en-US" sz="2000" dirty="0">
+                <a:latin typeface="Times New Roman" panose="02020603050405020304" pitchFamily="18" charset="0"/>
+                <a:cs typeface="Times New Roman" panose="02020603050405020304" pitchFamily="18" charset="0"/>
+              </a:rPr>
+              <a:t>'</a:t>
+            </a:r>
+            <a:r>
+              <a:rPr lang="da-DK" sz="2000" dirty="0">
+                <a:latin typeface="Times New Roman" panose="02020603050405020304" pitchFamily="18" charset="0"/>
+                <a:cs typeface="Times New Roman" panose="02020603050405020304" pitchFamily="18" charset="0"/>
+              </a:rPr>
+              <a:t>:1.55}</a:t>
+            </a:r>
+          </a:p>
+          <a:p>
+            <a:pPr marL="0" indent="0" algn="just">
+              <a:buNone/>
+            </a:pPr>
+            <a:r>
+              <a:rPr lang="en-US" sz="2000" b="1" dirty="0">
+                <a:latin typeface="Times New Roman" panose="02020603050405020304" pitchFamily="18" charset="0"/>
+                <a:cs typeface="Times New Roman" panose="02020603050405020304" pitchFamily="18" charset="0"/>
+              </a:rPr>
+              <a:t>for</a:t>
+            </a:r>
+            <a:r>
+              <a:rPr lang="en-US" sz="2000" dirty="0">
+                <a:latin typeface="Times New Roman" panose="02020603050405020304" pitchFamily="18" charset="0"/>
+                <a:cs typeface="Times New Roman" panose="02020603050405020304" pitchFamily="18" charset="0"/>
+              </a:rPr>
+              <a:t> key </a:t>
+            </a:r>
+            <a:r>
+              <a:rPr lang="en-US" sz="2000" b="1" dirty="0">
+                <a:latin typeface="Times New Roman" panose="02020603050405020304" pitchFamily="18" charset="0"/>
+                <a:cs typeface="Times New Roman" panose="02020603050405020304" pitchFamily="18" charset="0"/>
+              </a:rPr>
+              <a:t>in</a:t>
+            </a:r>
+            <a:r>
+              <a:rPr lang="en-US" sz="2000" dirty="0">
+                <a:latin typeface="Times New Roman" panose="02020603050405020304" pitchFamily="18" charset="0"/>
+                <a:cs typeface="Times New Roman" panose="02020603050405020304" pitchFamily="18" charset="0"/>
+              </a:rPr>
               <a:t> </a:t>
             </a:r>
             <a:r>
-              <a:rPr lang="pt-BR" b="1" dirty="0">
-                <a:latin typeface="Times New Roman" panose="02020603050405020304" pitchFamily="18" charset="0"/>
-                <a:cs typeface="Times New Roman" panose="02020603050405020304" pitchFamily="18" charset="0"/>
-              </a:rPr>
-              <a:t>Dicionários</a:t>
-            </a:r>
-            <a:r>
-              <a:rPr lang="pt-BR" sz="2000" dirty="0">
-                <a:latin typeface="Times New Roman" panose="02020603050405020304" pitchFamily="18" charset="0"/>
-                <a:cs typeface="Times New Roman" panose="02020603050405020304" pitchFamily="18" charset="0"/>
-              </a:rPr>
-              <a:t> </a:t>
-            </a:r>
-          </a:p>
-          <a:p>
-            <a:pPr marL="0" indent="0" algn="just">
-              <a:buNone/>
-            </a:pPr>
-            <a:r>
-              <a:rPr lang="pt-BR" sz="2000" dirty="0">
-                <a:latin typeface="Times New Roman" panose="02020603050405020304" pitchFamily="18" charset="0"/>
-                <a:cs typeface="Times New Roman" panose="02020603050405020304" pitchFamily="18" charset="0"/>
-              </a:rPr>
-              <a:t>São estruturas Python, utilizadas para representar coleções que guarda valores </a:t>
-            </a:r>
-            <a:r>
-              <a:rPr lang="pt-BR" sz="2000" b="1" dirty="0">
-                <a:latin typeface="Times New Roman" panose="02020603050405020304" pitchFamily="18" charset="0"/>
-                <a:cs typeface="Times New Roman" panose="02020603050405020304" pitchFamily="18" charset="0"/>
-              </a:rPr>
-              <a:t>multidimensionais</a:t>
-            </a:r>
-            <a:r>
-              <a:rPr lang="pt-BR" sz="2000" dirty="0">
-                <a:latin typeface="Times New Roman" panose="02020603050405020304" pitchFamily="18" charset="0"/>
-                <a:cs typeface="Times New Roman" panose="02020603050405020304" pitchFamily="18" charset="0"/>
-              </a:rPr>
-              <a:t> </a:t>
-            </a:r>
-            <a:r>
-              <a:rPr lang="pt-BR" sz="2000" b="1" dirty="0">
-                <a:solidFill>
-                  <a:srgbClr val="FF0000"/>
-                </a:solidFill>
-                <a:latin typeface="Times New Roman" panose="02020603050405020304" pitchFamily="18" charset="0"/>
-                <a:cs typeface="Times New Roman" panose="02020603050405020304" pitchFamily="18" charset="0"/>
-              </a:rPr>
-              <a:t>para cada índice</a:t>
-            </a:r>
-            <a:r>
-              <a:rPr lang="pt-BR" sz="2000" dirty="0">
-                <a:latin typeface="Times New Roman" panose="02020603050405020304" pitchFamily="18" charset="0"/>
-                <a:cs typeface="Times New Roman" panose="02020603050405020304" pitchFamily="18" charset="0"/>
-              </a:rPr>
-              <a:t>. É um dicionário de chaves (termos) que estão associadas a valores (significados dos termos). </a:t>
-            </a:r>
-          </a:p>
-          <a:p>
-            <a:pPr marL="0" indent="0" algn="just">
-              <a:buNone/>
-            </a:pPr>
-            <a:r>
-              <a:rPr lang="pt-BR" sz="2000" b="1" dirty="0">
-                <a:latin typeface="Times New Roman" panose="02020603050405020304" pitchFamily="18" charset="0"/>
-                <a:cs typeface="Times New Roman" panose="02020603050405020304" pitchFamily="18" charset="0"/>
-              </a:rPr>
-              <a:t>Nota</a:t>
-            </a:r>
-            <a:r>
-              <a:rPr lang="pt-BR" sz="2000" dirty="0">
-                <a:latin typeface="Times New Roman" panose="02020603050405020304" pitchFamily="18" charset="0"/>
-                <a:cs typeface="Times New Roman" panose="02020603050405020304" pitchFamily="18" charset="0"/>
-              </a:rPr>
-              <a:t>: </a:t>
-            </a:r>
-            <a:r>
-              <a:rPr lang="pt-BR" sz="2000" b="1" dirty="0">
-                <a:solidFill>
-                  <a:srgbClr val="FF0000"/>
-                </a:solidFill>
-                <a:latin typeface="Times New Roman" panose="02020603050405020304" pitchFamily="18" charset="0"/>
-                <a:cs typeface="Times New Roman" panose="02020603050405020304" pitchFamily="18" charset="0"/>
-              </a:rPr>
-              <a:t>Métodos</a:t>
-            </a:r>
-            <a:r>
-              <a:rPr lang="pt-BR" sz="2000" dirty="0">
-                <a:latin typeface="Times New Roman" panose="02020603050405020304" pitchFamily="18" charset="0"/>
-                <a:cs typeface="Times New Roman" panose="02020603050405020304" pitchFamily="18" charset="0"/>
-              </a:rPr>
-              <a:t>: </a:t>
-            </a:r>
-            <a:r>
-              <a:rPr lang="pt-BR" sz="2000" dirty="0" err="1">
-                <a:latin typeface="Times New Roman" panose="02020603050405020304" pitchFamily="18" charset="0"/>
-                <a:cs typeface="Times New Roman" panose="02020603050405020304" pitchFamily="18" charset="0"/>
-              </a:rPr>
-              <a:t>dic.</a:t>
-            </a:r>
-            <a:r>
-              <a:rPr lang="pt-BR" sz="2000" b="1" dirty="0" err="1">
-                <a:latin typeface="Times New Roman" panose="02020603050405020304" pitchFamily="18" charset="0"/>
-                <a:cs typeface="Times New Roman" panose="02020603050405020304" pitchFamily="18" charset="0"/>
-              </a:rPr>
-              <a:t>get</a:t>
-            </a:r>
-            <a:r>
-              <a:rPr lang="pt-BR" sz="2000" dirty="0">
-                <a:latin typeface="Times New Roman" panose="02020603050405020304" pitchFamily="18" charset="0"/>
-                <a:cs typeface="Times New Roman" panose="02020603050405020304" pitchFamily="18" charset="0"/>
-              </a:rPr>
-              <a:t>(atributo), </a:t>
-            </a:r>
-            <a:r>
-              <a:rPr lang="pt-BR" sz="2000" dirty="0" err="1">
-                <a:latin typeface="Times New Roman" panose="02020603050405020304" pitchFamily="18" charset="0"/>
-                <a:cs typeface="Times New Roman" panose="02020603050405020304" pitchFamily="18" charset="0"/>
-              </a:rPr>
-              <a:t>dic.</a:t>
-            </a:r>
-            <a:r>
-              <a:rPr lang="pt-BR" sz="2000" b="1" dirty="0" err="1">
-                <a:latin typeface="Times New Roman" panose="02020603050405020304" pitchFamily="18" charset="0"/>
-                <a:cs typeface="Times New Roman" panose="02020603050405020304" pitchFamily="18" charset="0"/>
-              </a:rPr>
-              <a:t>keys</a:t>
-            </a:r>
-            <a:r>
-              <a:rPr lang="pt-BR" sz="2000" dirty="0">
-                <a:latin typeface="Times New Roman" panose="02020603050405020304" pitchFamily="18" charset="0"/>
-                <a:cs typeface="Times New Roman" panose="02020603050405020304" pitchFamily="18" charset="0"/>
-              </a:rPr>
-              <a:t>(); </a:t>
-            </a:r>
-            <a:r>
-              <a:rPr lang="pt-BR" sz="2000" dirty="0" err="1">
-                <a:latin typeface="Times New Roman" panose="02020603050405020304" pitchFamily="18" charset="0"/>
-                <a:cs typeface="Times New Roman" panose="02020603050405020304" pitchFamily="18" charset="0"/>
-              </a:rPr>
-              <a:t>dic.</a:t>
-            </a:r>
-            <a:r>
-              <a:rPr lang="pt-BR" sz="2000" b="1" dirty="0" err="1">
-                <a:latin typeface="Times New Roman" panose="02020603050405020304" pitchFamily="18" charset="0"/>
-                <a:cs typeface="Times New Roman" panose="02020603050405020304" pitchFamily="18" charset="0"/>
-              </a:rPr>
-              <a:t>values</a:t>
-            </a:r>
-            <a:r>
-              <a:rPr lang="pt-BR" sz="2000" dirty="0">
-                <a:latin typeface="Times New Roman" panose="02020603050405020304" pitchFamily="18" charset="0"/>
-                <a:cs typeface="Times New Roman" panose="02020603050405020304" pitchFamily="18" charset="0"/>
-              </a:rPr>
-              <a:t>(); </a:t>
-            </a:r>
-            <a:r>
-              <a:rPr lang="pt-BR" sz="2000" b="1" dirty="0">
-                <a:latin typeface="Times New Roman" panose="02020603050405020304" pitchFamily="18" charset="0"/>
-                <a:cs typeface="Times New Roman" panose="02020603050405020304" pitchFamily="18" charset="0"/>
-              </a:rPr>
-              <a:t>update; pop; </a:t>
-            </a:r>
-            <a:r>
-              <a:rPr lang="pt-BR" sz="2000" b="1" dirty="0" err="1">
-                <a:latin typeface="Times New Roman" panose="02020603050405020304" pitchFamily="18" charset="0"/>
-                <a:cs typeface="Times New Roman" panose="02020603050405020304" pitchFamily="18" charset="0"/>
-              </a:rPr>
-              <a:t>len</a:t>
-            </a:r>
-            <a:r>
-              <a:rPr lang="pt-BR" sz="2000" b="1" dirty="0">
-                <a:latin typeface="Times New Roman" panose="02020603050405020304" pitchFamily="18" charset="0"/>
-                <a:cs typeface="Times New Roman" panose="02020603050405020304" pitchFamily="18" charset="0"/>
-              </a:rPr>
-              <a:t>, etc</a:t>
-            </a:r>
-            <a:r>
-              <a:rPr lang="pt-BR" sz="2000" dirty="0">
-                <a:latin typeface="Times New Roman" panose="02020603050405020304" pitchFamily="18" charset="0"/>
-                <a:cs typeface="Times New Roman" panose="02020603050405020304" pitchFamily="18" charset="0"/>
-              </a:rPr>
-              <a:t>.</a:t>
-            </a:r>
-          </a:p>
-          <a:p>
-            <a:pPr marL="0" indent="0" algn="just">
-              <a:buNone/>
-            </a:pPr>
-            <a:r>
-              <a:rPr lang="da-DK" sz="2000" b="1" dirty="0">
-                <a:latin typeface="Times New Roman" panose="02020603050405020304" pitchFamily="18" charset="0"/>
-                <a:cs typeface="Times New Roman" panose="02020603050405020304" pitchFamily="18" charset="0"/>
-              </a:rPr>
-              <a:t>dicAlu = </a:t>
-            </a:r>
-            <a:r>
-              <a:rPr lang="da-DK" sz="2000" dirty="0">
-                <a:latin typeface="Times New Roman" panose="02020603050405020304" pitchFamily="18" charset="0"/>
-                <a:cs typeface="Times New Roman" panose="02020603050405020304" pitchFamily="18" charset="0"/>
-              </a:rPr>
-              <a:t>{‘nome’: ‘Julila’, ‘idade’:17, ‘disciplina’:[‘java’, ‘python’], ‘altura’:1.55}</a:t>
-            </a:r>
-          </a:p>
-          <a:p>
-            <a:pPr marL="0" indent="0" algn="just">
-              <a:buNone/>
-            </a:pPr>
-            <a:r>
-              <a:rPr lang="en-US" sz="2000" b="1" dirty="0">
-                <a:latin typeface="Times New Roman" panose="02020603050405020304" pitchFamily="18" charset="0"/>
-                <a:cs typeface="Times New Roman" panose="02020603050405020304" pitchFamily="18" charset="0"/>
-              </a:rPr>
-              <a:t>for</a:t>
-            </a:r>
-            <a:r>
-              <a:rPr lang="en-US" sz="2000" dirty="0">
-                <a:latin typeface="Times New Roman" panose="02020603050405020304" pitchFamily="18" charset="0"/>
-                <a:cs typeface="Times New Roman" panose="02020603050405020304" pitchFamily="18" charset="0"/>
-              </a:rPr>
-              <a:t> key </a:t>
-            </a:r>
-            <a:r>
-              <a:rPr lang="en-US" sz="2000" b="1" dirty="0">
-                <a:latin typeface="Times New Roman" panose="02020603050405020304" pitchFamily="18" charset="0"/>
-                <a:cs typeface="Times New Roman" panose="02020603050405020304" pitchFamily="18" charset="0"/>
-              </a:rPr>
-              <a:t>in</a:t>
-            </a:r>
-            <a:r>
-              <a:rPr lang="en-US" sz="2000" dirty="0">
-                <a:latin typeface="Times New Roman" panose="02020603050405020304" pitchFamily="18" charset="0"/>
-                <a:cs typeface="Times New Roman" panose="02020603050405020304" pitchFamily="18" charset="0"/>
-              </a:rPr>
-              <a:t> </a:t>
-            </a:r>
-            <a:r>
               <a:rPr lang="en-US" sz="2000" dirty="0" err="1">
                 <a:latin typeface="Times New Roman" panose="02020603050405020304" pitchFamily="18" charset="0"/>
                 <a:cs typeface="Times New Roman" panose="02020603050405020304" pitchFamily="18" charset="0"/>
               </a:rPr>
-              <a:t>dicAlu</a:t>
-            </a:r>
-            <a:r>
-              <a:rPr lang="en-US" sz="2000" dirty="0">
-                <a:latin typeface="Times New Roman" panose="02020603050405020304" pitchFamily="18" charset="0"/>
-                <a:cs typeface="Times New Roman" panose="02020603050405020304" pitchFamily="18" charset="0"/>
-              </a:rPr>
-              <a:t>[</a:t>
-            </a:r>
-            <a:r>
-              <a:rPr lang="en-US" sz="2000" dirty="0" err="1">
-                <a:latin typeface="Times New Roman" panose="02020603050405020304" pitchFamily="18" charset="0"/>
-                <a:cs typeface="Times New Roman" panose="02020603050405020304" pitchFamily="18" charset="0"/>
-              </a:rPr>
-              <a:t>i</a:t>
-            </a:r>
-            <a:r>
-              <a:rPr lang="en-US" sz="2000" dirty="0">
-                <a:latin typeface="Times New Roman" panose="02020603050405020304" pitchFamily="18" charset="0"/>
-                <a:cs typeface="Times New Roman" panose="02020603050405020304" pitchFamily="18" charset="0"/>
-              </a:rPr>
-              <a:t>].</a:t>
-            </a:r>
-            <a:r>
-              <a:rPr lang="en-US" sz="2000" b="1" dirty="0">
+              <a:t>dicAlu.</a:t>
+            </a:r>
+            <a:r>
+              <a:rPr lang="en-US" sz="2000" b="1" dirty="0" err="1">
                 <a:latin typeface="Times New Roman" panose="02020603050405020304" pitchFamily="18" charset="0"/>
                 <a:cs typeface="Times New Roman" panose="02020603050405020304" pitchFamily="18" charset="0"/>
               </a:rPr>
@@ -16748,7 +17355,14 @@
                 <a:latin typeface="Times New Roman" panose="02020603050405020304" pitchFamily="18" charset="0"/>
                 <a:cs typeface="Times New Roman" panose="02020603050405020304" pitchFamily="18" charset="0"/>
               </a:rPr>
-              <a:t>Seleciona tudo até o indicado com”</a:t>
+              <a:t>Seleciona tudo até o indicado com</a:t>
+            </a:r>
+            <a:r>
+              <a:rPr lang="en-US" dirty="0">
+                <a:latin typeface="Times New Roman" panose="02020603050405020304" pitchFamily="18" charset="0"/>
+                <a:cs typeface="Times New Roman" panose="02020603050405020304" pitchFamily="18" charset="0"/>
+              </a:rPr>
+              <a:t> '</a:t>
             </a:r>
             <a:r>
               <a:rPr lang="pt-BR" b="1" dirty="0">
@@ -16761,11 +17375,11 @@
               <a:t>:</a:t>
             </a:r>
             <a:r>
-              <a:rPr lang="pt-BR" dirty="0">
-                <a:latin typeface="Times New Roman" panose="02020603050405020304" pitchFamily="18" charset="0"/>
-                <a:cs typeface="Times New Roman" panose="02020603050405020304" pitchFamily="18" charset="0"/>
-              </a:rPr>
-              <a:t>”</a:t>
+              <a:rPr lang="en-US" dirty="0">
+                <a:latin typeface="Times New Roman" panose="02020603050405020304" pitchFamily="18" charset="0"/>
+                <a:cs typeface="Times New Roman" panose="02020603050405020304" pitchFamily="18" charset="0"/>
+              </a:rPr>
+              <a:t>'</a:t>
             </a:r>
             <a:r>
               <a:rPr lang="pt-BR" dirty="0">

</xml_diff>